<commit_message>
Presentation update to layout more of my part
Presentation update to layout more of my part
</commit_message>
<xml_diff>
--- a/Presentation.pptx
+++ b/Presentation.pptx
@@ -7,10 +7,13 @@
   <p:sldIdLst>
     <p:sldId id="256" r:id="rId2"/>
     <p:sldId id="261" r:id="rId3"/>
-    <p:sldId id="260" r:id="rId4"/>
-    <p:sldId id="257" r:id="rId5"/>
-    <p:sldId id="258" r:id="rId6"/>
-    <p:sldId id="259" r:id="rId7"/>
+    <p:sldId id="263" r:id="rId4"/>
+    <p:sldId id="260" r:id="rId5"/>
+    <p:sldId id="257" r:id="rId6"/>
+    <p:sldId id="258" r:id="rId7"/>
+    <p:sldId id="259" r:id="rId8"/>
+    <p:sldId id="264" r:id="rId9"/>
+    <p:sldId id="262" r:id="rId10"/>
   </p:sldIdLst>
   <p:sldSz cx="12192000" cy="6858000"/>
   <p:notesSz cx="6858000" cy="9144000"/>
@@ -6190,6 +6193,13 @@
   <p:clrMapOvr>
     <a:masterClrMapping/>
   </p:clrMapOvr>
+  <p:timing>
+    <p:tnLst>
+      <p:par>
+        <p:cTn id="1" dur="indefinite" restart="never" nodeType="tmRoot"/>
+      </p:par>
+    </p:tnLst>
+  </p:timing>
 </p:sld>
 </file>
 
@@ -6255,7 +6265,7 @@
           <a:graphicData uri="http://schemas.openxmlformats.org/presentationml/2006/ole">
             <mc:AlternateContent xmlns:mc="http://schemas.openxmlformats.org/markup-compatibility/2006">
               <mc:Choice xmlns:v="urn:schemas-microsoft-com:vml" Requires="v">
-                <p:oleObj spid="_x0000_s1026" name="Image" r:id="rId3" imgW="21333240" imgH="12787200" progId="Photoshop.Image.13">
+                <p:oleObj spid="_x0000_s1029" name="Image" r:id="rId3" imgW="21333240" imgH="12787200" progId="Photoshop.Image.13">
                   <p:embed/>
                 </p:oleObj>
               </mc:Choice>
@@ -6300,6 +6310,13 @@
   <p:clrMapOvr>
     <a:masterClrMapping/>
   </p:clrMapOvr>
+  <p:timing>
+    <p:tnLst>
+      <p:par>
+        <p:cTn id="1" dur="indefinite" restart="never" nodeType="tmRoot"/>
+      </p:par>
+    </p:tnLst>
+  </p:timing>
 </p:sld>
 </file>
 
@@ -6337,6 +6354,78 @@
           <a:p>
             <a:r>
               <a:rPr lang="en-US" dirty="0" smtClean="0"/>
+              <a:t>Model View Controller</a:t>
+            </a:r>
+            <a:endParaRPr lang="en-US" dirty="0"/>
+          </a:p>
+        </p:txBody>
+      </p:sp>
+      <p:sp>
+        <p:nvSpPr>
+          <p:cNvPr id="3" name="Content Placeholder 2"/>
+          <p:cNvSpPr>
+            <a:spLocks noGrp="1"/>
+          </p:cNvSpPr>
+          <p:nvPr>
+            <p:ph idx="1"/>
+          </p:nvPr>
+        </p:nvSpPr>
+        <p:spPr/>
+        <p:txBody>
+          <a:bodyPr/>
+          <a:lstStyle/>
+          <a:p>
+            <a:endParaRPr lang="en-US"/>
+          </a:p>
+        </p:txBody>
+      </p:sp>
+    </p:spTree>
+    <p:extLst>
+      <p:ext uri="{BB962C8B-B14F-4D97-AF65-F5344CB8AC3E}">
+        <p14:creationId xmlns:p14="http://schemas.microsoft.com/office/powerpoint/2010/main" val="2077223260"/>
+      </p:ext>
+    </p:extLst>
+  </p:cSld>
+  <p:clrMapOvr>
+    <a:masterClrMapping/>
+  </p:clrMapOvr>
+</p:sld>
+</file>
+
+<file path=ppt/slides/slide4.xml><?xml version="1.0" encoding="utf-8"?>
+<p:sld xmlns:a="http://schemas.openxmlformats.org/drawingml/2006/main" xmlns:r="http://schemas.openxmlformats.org/officeDocument/2006/relationships" xmlns:p="http://schemas.openxmlformats.org/presentationml/2006/main">
+  <p:cSld>
+    <p:spTree>
+      <p:nvGrpSpPr>
+        <p:cNvPr id="1" name=""/>
+        <p:cNvGrpSpPr/>
+        <p:nvPr/>
+      </p:nvGrpSpPr>
+      <p:grpSpPr>
+        <a:xfrm>
+          <a:off x="0" y="0"/>
+          <a:ext cx="0" cy="0"/>
+          <a:chOff x="0" y="0"/>
+          <a:chExt cx="0" cy="0"/>
+        </a:xfrm>
+      </p:grpSpPr>
+      <p:sp>
+        <p:nvSpPr>
+          <p:cNvPr id="2" name="Title 1"/>
+          <p:cNvSpPr>
+            <a:spLocks noGrp="1"/>
+          </p:cNvSpPr>
+          <p:nvPr>
+            <p:ph type="title"/>
+          </p:nvPr>
+        </p:nvSpPr>
+        <p:spPr/>
+        <p:txBody>
+          <a:bodyPr/>
+          <a:lstStyle/>
+          <a:p>
+            <a:r>
+              <a:rPr lang="en-US" dirty="0" smtClean="0"/>
               <a:t>Structure</a:t>
             </a:r>
             <a:endParaRPr lang="en-US" dirty="0"/>
@@ -6365,7 +6454,7 @@
           <a:graphicData uri="http://schemas.openxmlformats.org/presentationml/2006/ole">
             <mc:AlternateContent xmlns:mc="http://schemas.openxmlformats.org/markup-compatibility/2006">
               <mc:Choice xmlns:v="urn:schemas-microsoft-com:vml" Requires="v">
-                <p:oleObj spid="_x0000_s2050" name="Image" r:id="rId3" imgW="8596800" imgH="4533120" progId="Photoshop.Image.13">
+                <p:oleObj spid="_x0000_s2053" name="Image" r:id="rId3" imgW="8596800" imgH="4533120" progId="Photoshop.Image.13">
                   <p:embed/>
                 </p:oleObj>
               </mc:Choice>
@@ -6415,10 +6504,17 @@
   <p:clrMapOvr>
     <a:masterClrMapping/>
   </p:clrMapOvr>
+  <p:timing>
+    <p:tnLst>
+      <p:par>
+        <p:cTn id="1" dur="indefinite" restart="never" nodeType="tmRoot"/>
+      </p:par>
+    </p:tnLst>
+  </p:timing>
 </p:sld>
 </file>
 
-<file path=ppt/slides/slide4.xml><?xml version="1.0" encoding="utf-8"?>
+<file path=ppt/slides/slide5.xml><?xml version="1.0" encoding="utf-8"?>
 <p:sld xmlns:a="http://schemas.openxmlformats.org/drawingml/2006/main" xmlns:r="http://schemas.openxmlformats.org/officeDocument/2006/relationships" xmlns:p="http://schemas.openxmlformats.org/presentationml/2006/main">
   <p:cSld>
     <p:spTree>
@@ -6480,7 +6576,7 @@
           <a:graphicData uri="http://schemas.openxmlformats.org/presentationml/2006/ole">
             <mc:AlternateContent xmlns:mc="http://schemas.openxmlformats.org/markup-compatibility/2006">
               <mc:Choice xmlns:v="urn:schemas-microsoft-com:vml" Requires="v">
-                <p:oleObj spid="_x0000_s3074" name="Image" r:id="rId3" imgW="17587080" imgH="3212640" progId="Photoshop.Image.13">
+                <p:oleObj spid="_x0000_s3077" name="Image" r:id="rId3" imgW="17587080" imgH="3212640" progId="Photoshop.Image.13">
                   <p:embed/>
                 </p:oleObj>
               </mc:Choice>
@@ -6530,10 +6626,17 @@
   <p:clrMapOvr>
     <a:masterClrMapping/>
   </p:clrMapOvr>
+  <p:timing>
+    <p:tnLst>
+      <p:par>
+        <p:cTn id="1" dur="indefinite" restart="never" nodeType="tmRoot"/>
+      </p:par>
+    </p:tnLst>
+  </p:timing>
 </p:sld>
 </file>
 
-<file path=ppt/slides/slide5.xml><?xml version="1.0" encoding="utf-8"?>
+<file path=ppt/slides/slide6.xml><?xml version="1.0" encoding="utf-8"?>
 <p:sld xmlns:a="http://schemas.openxmlformats.org/drawingml/2006/main" xmlns:r="http://schemas.openxmlformats.org/officeDocument/2006/relationships" xmlns:p="http://schemas.openxmlformats.org/presentationml/2006/main">
   <p:cSld>
     <p:spTree>
@@ -6595,7 +6698,7 @@
           <a:graphicData uri="http://schemas.openxmlformats.org/presentationml/2006/ole">
             <mc:AlternateContent xmlns:mc="http://schemas.openxmlformats.org/markup-compatibility/2006">
               <mc:Choice xmlns:v="urn:schemas-microsoft-com:vml" Requires="v">
-                <p:oleObj spid="_x0000_s4098" name="Image" r:id="rId3" imgW="4634640" imgH="8164800" progId="Photoshop.Image.13">
+                <p:oleObj spid="_x0000_s4104" name="Image" r:id="rId3" imgW="4634640" imgH="8164800" progId="Photoshop.Image.13">
                   <p:embed/>
                 </p:oleObj>
               </mc:Choice>
@@ -6657,7 +6760,7 @@
           <a:graphicData uri="http://schemas.openxmlformats.org/presentationml/2006/ole">
             <mc:AlternateContent xmlns:mc="http://schemas.openxmlformats.org/markup-compatibility/2006">
               <mc:Choice xmlns:v="urn:schemas-microsoft-com:vml" Requires="v">
-                <p:oleObj spid="_x0000_s4099" name="Image" r:id="rId5" imgW="3529800" imgH="11619000" progId="Photoshop.Image.13">
+                <p:oleObj spid="_x0000_s4105" name="Image" r:id="rId5" imgW="3529800" imgH="11619000" progId="Photoshop.Image.13">
                   <p:embed/>
                 </p:oleObj>
               </mc:Choice>
@@ -6707,10 +6810,17 @@
   <p:clrMapOvr>
     <a:masterClrMapping/>
   </p:clrMapOvr>
+  <p:timing>
+    <p:tnLst>
+      <p:par>
+        <p:cTn id="1" dur="indefinite" restart="never" nodeType="tmRoot"/>
+      </p:par>
+    </p:tnLst>
+  </p:timing>
 </p:sld>
 </file>
 
-<file path=ppt/slides/slide6.xml><?xml version="1.0" encoding="utf-8"?>
+<file path=ppt/slides/slide7.xml><?xml version="1.0" encoding="utf-8"?>
 <p:sld xmlns:a="http://schemas.openxmlformats.org/drawingml/2006/main" xmlns:r="http://schemas.openxmlformats.org/officeDocument/2006/relationships" xmlns:p="http://schemas.openxmlformats.org/presentationml/2006/main">
   <p:cSld>
     <p:spTree>
@@ -6749,7 +6859,7 @@
           <a:graphicData uri="http://schemas.openxmlformats.org/presentationml/2006/ole">
             <mc:AlternateContent xmlns:mc="http://schemas.openxmlformats.org/markup-compatibility/2006">
               <mc:Choice xmlns:v="urn:schemas-microsoft-com:vml" Requires="v">
-                <p:oleObj spid="_x0000_s5122" name="Image" r:id="rId3" imgW="8291880" imgH="7403040" progId="Photoshop.Image.13">
+                <p:oleObj spid="_x0000_s5125" name="Image" r:id="rId3" imgW="8291880" imgH="7403040" progId="Photoshop.Image.13">
                   <p:embed/>
                 </p:oleObj>
               </mc:Choice>
@@ -6816,6 +6926,225 @@
     <p:extLst>
       <p:ext uri="{BB962C8B-B14F-4D97-AF65-F5344CB8AC3E}">
         <p14:creationId xmlns:p14="http://schemas.microsoft.com/office/powerpoint/2010/main" val="3052568234"/>
+      </p:ext>
+    </p:extLst>
+  </p:cSld>
+  <p:clrMapOvr>
+    <a:masterClrMapping/>
+  </p:clrMapOvr>
+  <p:timing>
+    <p:tnLst>
+      <p:par>
+        <p:cTn id="1" dur="indefinite" restart="never" nodeType="tmRoot"/>
+      </p:par>
+    </p:tnLst>
+  </p:timing>
+</p:sld>
+</file>
+
+<file path=ppt/slides/slide8.xml><?xml version="1.0" encoding="utf-8"?>
+<p:sld xmlns:a="http://schemas.openxmlformats.org/drawingml/2006/main" xmlns:r="http://schemas.openxmlformats.org/officeDocument/2006/relationships" xmlns:p="http://schemas.openxmlformats.org/presentationml/2006/main">
+  <p:cSld>
+    <p:spTree>
+      <p:nvGrpSpPr>
+        <p:cNvPr id="1" name=""/>
+        <p:cNvGrpSpPr/>
+        <p:nvPr/>
+      </p:nvGrpSpPr>
+      <p:grpSpPr>
+        <a:xfrm>
+          <a:off x="0" y="0"/>
+          <a:ext cx="0" cy="0"/>
+          <a:chOff x="0" y="0"/>
+          <a:chExt cx="0" cy="0"/>
+        </a:xfrm>
+      </p:grpSpPr>
+      <p:sp>
+        <p:nvSpPr>
+          <p:cNvPr id="2" name="Title 1"/>
+          <p:cNvSpPr>
+            <a:spLocks noGrp="1"/>
+          </p:cNvSpPr>
+          <p:nvPr>
+            <p:ph type="title"/>
+          </p:nvPr>
+        </p:nvSpPr>
+        <p:spPr/>
+        <p:txBody>
+          <a:bodyPr/>
+          <a:lstStyle/>
+          <a:p>
+            <a:r>
+              <a:rPr lang="en-US" dirty="0" smtClean="0"/>
+              <a:t>Unit &amp; </a:t>
+            </a:r>
+            <a:r>
+              <a:rPr lang="en-US" smtClean="0"/>
+              <a:t>Integration Testing</a:t>
+            </a:r>
+            <a:endParaRPr lang="en-US"/>
+          </a:p>
+        </p:txBody>
+      </p:sp>
+      <p:sp>
+        <p:nvSpPr>
+          <p:cNvPr id="3" name="Content Placeholder 2"/>
+          <p:cNvSpPr>
+            <a:spLocks noGrp="1"/>
+          </p:cNvSpPr>
+          <p:nvPr>
+            <p:ph idx="1"/>
+          </p:nvPr>
+        </p:nvSpPr>
+        <p:spPr/>
+        <p:txBody>
+          <a:bodyPr/>
+          <a:lstStyle/>
+          <a:p>
+            <a:endParaRPr lang="en-US"/>
+          </a:p>
+        </p:txBody>
+      </p:sp>
+    </p:spTree>
+    <p:extLst>
+      <p:ext uri="{BB962C8B-B14F-4D97-AF65-F5344CB8AC3E}">
+        <p14:creationId xmlns:p14="http://schemas.microsoft.com/office/powerpoint/2010/main" val="2901842547"/>
+      </p:ext>
+    </p:extLst>
+  </p:cSld>
+  <p:clrMapOvr>
+    <a:masterClrMapping/>
+  </p:clrMapOvr>
+</p:sld>
+</file>
+
+<file path=ppt/slides/slide9.xml><?xml version="1.0" encoding="utf-8"?>
+<p:sld xmlns:a="http://schemas.openxmlformats.org/drawingml/2006/main" xmlns:r="http://schemas.openxmlformats.org/officeDocument/2006/relationships" xmlns:p="http://schemas.openxmlformats.org/presentationml/2006/main">
+  <p:cSld>
+    <p:spTree>
+      <p:nvGrpSpPr>
+        <p:cNvPr id="1" name=""/>
+        <p:cNvGrpSpPr/>
+        <p:nvPr/>
+      </p:nvGrpSpPr>
+      <p:grpSpPr>
+        <a:xfrm>
+          <a:off x="0" y="0"/>
+          <a:ext cx="0" cy="0"/>
+          <a:chOff x="0" y="0"/>
+          <a:chExt cx="0" cy="0"/>
+        </a:xfrm>
+      </p:grpSpPr>
+      <p:sp>
+        <p:nvSpPr>
+          <p:cNvPr id="2" name="Title 1"/>
+          <p:cNvSpPr>
+            <a:spLocks noGrp="1"/>
+          </p:cNvSpPr>
+          <p:nvPr>
+            <p:ph type="title"/>
+          </p:nvPr>
+        </p:nvSpPr>
+        <p:spPr/>
+        <p:txBody>
+          <a:bodyPr/>
+          <a:lstStyle/>
+          <a:p>
+            <a:r>
+              <a:rPr lang="en-US" dirty="0" smtClean="0"/>
+              <a:t>References</a:t>
+            </a:r>
+            <a:endParaRPr lang="en-US" dirty="0"/>
+          </a:p>
+        </p:txBody>
+      </p:sp>
+      <p:sp>
+        <p:nvSpPr>
+          <p:cNvPr id="3" name="Content Placeholder 2"/>
+          <p:cNvSpPr>
+            <a:spLocks noGrp="1"/>
+          </p:cNvSpPr>
+          <p:nvPr>
+            <p:ph idx="1"/>
+          </p:nvPr>
+        </p:nvSpPr>
+        <p:spPr/>
+        <p:txBody>
+          <a:bodyPr/>
+          <a:lstStyle/>
+          <a:p>
+            <a:r>
+              <a:rPr lang="en-US" dirty="0" smtClean="0">
+                <a:hlinkClick r:id="rId2"/>
+              </a:rPr>
+              <a:t>https://www.draw.io</a:t>
+            </a:r>
+            <a:r>
+              <a:rPr lang="en-US" dirty="0" smtClean="0"/>
+              <a:t> – UML Diagram system used for DD</a:t>
+            </a:r>
+          </a:p>
+          <a:p>
+            <a:r>
+              <a:rPr lang="en-US" dirty="0" err="1" smtClean="0"/>
+              <a:t>yWorks</a:t>
+            </a:r>
+            <a:r>
+              <a:rPr lang="en-US" dirty="0" smtClean="0"/>
+              <a:t> </a:t>
+            </a:r>
+            <a:r>
+              <a:rPr lang="en-US" dirty="0" err="1" smtClean="0"/>
+              <a:t>Doclet</a:t>
+            </a:r>
+            <a:r>
+              <a:rPr lang="en-US" dirty="0" smtClean="0"/>
+              <a:t> – Auto-documentation system designed for Java</a:t>
+            </a:r>
+          </a:p>
+          <a:p>
+            <a:r>
+              <a:rPr lang="en-US" dirty="0" smtClean="0">
+                <a:hlinkClick r:id="rId3"/>
+              </a:rPr>
+              <a:t>www.gradle.org</a:t>
+            </a:r>
+            <a:r>
+              <a:rPr lang="en-US" dirty="0" smtClean="0"/>
+              <a:t> – Automated Unit Testing Environment</a:t>
+            </a:r>
+          </a:p>
+          <a:p>
+            <a:r>
+              <a:rPr lang="en-US" dirty="0" err="1" smtClean="0"/>
+              <a:t>Pegdown</a:t>
+            </a:r>
+            <a:r>
+              <a:rPr lang="en-US" dirty="0" smtClean="0"/>
+              <a:t> </a:t>
+            </a:r>
+            <a:r>
+              <a:rPr lang="en-US" dirty="0" err="1" smtClean="0"/>
+              <a:t>Doclet</a:t>
+            </a:r>
+            <a:r>
+              <a:rPr lang="en-US" dirty="0"/>
+              <a:t> </a:t>
+            </a:r>
+            <a:r>
+              <a:rPr lang="en-US" dirty="0" smtClean="0"/>
+              <a:t>project - Replaces comments with Markdown</a:t>
+            </a:r>
+          </a:p>
+          <a:p>
+            <a:endParaRPr lang="en-US" dirty="0"/>
+          </a:p>
+        </p:txBody>
+      </p:sp>
+    </p:spTree>
+    <p:extLst>
+      <p:ext uri="{BB962C8B-B14F-4D97-AF65-F5344CB8AC3E}">
+        <p14:creationId xmlns:p14="http://schemas.microsoft.com/office/powerpoint/2010/main" val="3873660262"/>
       </p:ext>
     </p:extLst>
   </p:cSld>

</xml_diff>

<commit_message>
PDP - SDD Update
Project Documentation Package Update : Software Design Descriptions are
just about finished now.
</commit_message>
<xml_diff>
--- a/Presentation.pptx
+++ b/Presentation.pptx
@@ -6265,7 +6265,7 @@
           <a:graphicData uri="http://schemas.openxmlformats.org/presentationml/2006/ole">
             <mc:AlternateContent xmlns:mc="http://schemas.openxmlformats.org/markup-compatibility/2006">
               <mc:Choice xmlns:v="urn:schemas-microsoft-com:vml" Requires="v">
-                <p:oleObj spid="_x0000_s1029" name="Image" r:id="rId3" imgW="21333240" imgH="12787200" progId="Photoshop.Image.13">
+                <p:oleObj spid="_x0000_s1030" name="Image" r:id="rId3" imgW="21333240" imgH="12787200" progId="Photoshop.Image.13">
                   <p:embed/>
                 </p:oleObj>
               </mc:Choice>
@@ -6454,7 +6454,7 @@
           <a:graphicData uri="http://schemas.openxmlformats.org/presentationml/2006/ole">
             <mc:AlternateContent xmlns:mc="http://schemas.openxmlformats.org/markup-compatibility/2006">
               <mc:Choice xmlns:v="urn:schemas-microsoft-com:vml" Requires="v">
-                <p:oleObj spid="_x0000_s2053" name="Image" r:id="rId3" imgW="8596800" imgH="4533120" progId="Photoshop.Image.13">
+                <p:oleObj spid="_x0000_s2054" name="Image" r:id="rId3" imgW="8596800" imgH="4533120" progId="Photoshop.Image.13">
                   <p:embed/>
                 </p:oleObj>
               </mc:Choice>
@@ -6576,7 +6576,7 @@
           <a:graphicData uri="http://schemas.openxmlformats.org/presentationml/2006/ole">
             <mc:AlternateContent xmlns:mc="http://schemas.openxmlformats.org/markup-compatibility/2006">
               <mc:Choice xmlns:v="urn:schemas-microsoft-com:vml" Requires="v">
-                <p:oleObj spid="_x0000_s3077" name="Image" r:id="rId3" imgW="17587080" imgH="3212640" progId="Photoshop.Image.13">
+                <p:oleObj spid="_x0000_s3078" name="Image" r:id="rId3" imgW="17587080" imgH="3212640" progId="Photoshop.Image.13">
                   <p:embed/>
                 </p:oleObj>
               </mc:Choice>
@@ -6698,7 +6698,7 @@
           <a:graphicData uri="http://schemas.openxmlformats.org/presentationml/2006/ole">
             <mc:AlternateContent xmlns:mc="http://schemas.openxmlformats.org/markup-compatibility/2006">
               <mc:Choice xmlns:v="urn:schemas-microsoft-com:vml" Requires="v">
-                <p:oleObj spid="_x0000_s4104" name="Image" r:id="rId3" imgW="4634640" imgH="8164800" progId="Photoshop.Image.13">
+                <p:oleObj spid="_x0000_s4106" name="Image" r:id="rId3" imgW="4634640" imgH="8164800" progId="Photoshop.Image.13">
                   <p:embed/>
                 </p:oleObj>
               </mc:Choice>
@@ -6760,7 +6760,7 @@
           <a:graphicData uri="http://schemas.openxmlformats.org/presentationml/2006/ole">
             <mc:AlternateContent xmlns:mc="http://schemas.openxmlformats.org/markup-compatibility/2006">
               <mc:Choice xmlns:v="urn:schemas-microsoft-com:vml" Requires="v">
-                <p:oleObj spid="_x0000_s4105" name="Image" r:id="rId5" imgW="3529800" imgH="11619000" progId="Photoshop.Image.13">
+                <p:oleObj spid="_x0000_s4107" name="Image" r:id="rId5" imgW="3529800" imgH="11619000" progId="Photoshop.Image.13">
                   <p:embed/>
                 </p:oleObj>
               </mc:Choice>
@@ -6859,7 +6859,7 @@
           <a:graphicData uri="http://schemas.openxmlformats.org/presentationml/2006/ole">
             <mc:AlternateContent xmlns:mc="http://schemas.openxmlformats.org/markup-compatibility/2006">
               <mc:Choice xmlns:v="urn:schemas-microsoft-com:vml" Requires="v">
-                <p:oleObj spid="_x0000_s5125" name="Image" r:id="rId3" imgW="8291880" imgH="7403040" progId="Photoshop.Image.13">
+                <p:oleObj spid="_x0000_s5126" name="Image" r:id="rId3" imgW="8291880" imgH="7403040" progId="Photoshop.Image.13">
                   <p:embed/>
                 </p:oleObj>
               </mc:Choice>
@@ -6976,13 +6976,9 @@
           <a:p>
             <a:r>
               <a:rPr lang="en-US" dirty="0" smtClean="0"/>
-              <a:t>Unit &amp; </a:t>
-            </a:r>
-            <a:r>
-              <a:rPr lang="en-US" smtClean="0"/>
-              <a:t>Integration Testing</a:t>
-            </a:r>
-            <a:endParaRPr lang="en-US"/>
+              <a:t>Unit &amp; Integration Testing</a:t>
+            </a:r>
+            <a:endParaRPr lang="en-US" dirty="0"/>
           </a:p>
         </p:txBody>
       </p:sp>

</xml_diff>

<commit_message>
Presentation is now 4:3 because of projector
Also added descriptions of where everyone's slides will be
</commit_message>
<xml_diff>
--- a/Presentation.pptx
+++ b/Presentation.pptx
@@ -2,20 +2,24 @@
 <file path=ppt/presentation.xml><?xml version="1.0" encoding="utf-8"?>
 <p:presentation xmlns:a="http://schemas.openxmlformats.org/drawingml/2006/main" xmlns:r="http://schemas.openxmlformats.org/officeDocument/2006/relationships" xmlns:p="http://schemas.openxmlformats.org/presentationml/2006/main" autoCompressPictures="0">
   <p:sldMasterIdLst>
-    <p:sldMasterId id="2147483648" r:id="rId1"/>
+    <p:sldMasterId id="2147483668" r:id="rId1"/>
   </p:sldMasterIdLst>
   <p:sldIdLst>
     <p:sldId id="256" r:id="rId2"/>
-    <p:sldId id="261" r:id="rId3"/>
-    <p:sldId id="263" r:id="rId4"/>
-    <p:sldId id="260" r:id="rId5"/>
-    <p:sldId id="257" r:id="rId6"/>
-    <p:sldId id="258" r:id="rId7"/>
-    <p:sldId id="259" r:id="rId8"/>
-    <p:sldId id="264" r:id="rId9"/>
-    <p:sldId id="262" r:id="rId10"/>
+    <p:sldId id="266" r:id="rId3"/>
+    <p:sldId id="261" r:id="rId4"/>
+    <p:sldId id="265" r:id="rId5"/>
+    <p:sldId id="267" r:id="rId6"/>
+    <p:sldId id="260" r:id="rId7"/>
+    <p:sldId id="268" r:id="rId8"/>
+    <p:sldId id="263" r:id="rId9"/>
+    <p:sldId id="257" r:id="rId10"/>
+    <p:sldId id="258" r:id="rId11"/>
+    <p:sldId id="259" r:id="rId12"/>
+    <p:sldId id="264" r:id="rId13"/>
+    <p:sldId id="262" r:id="rId14"/>
   </p:sldIdLst>
-  <p:sldSz cx="12192000" cy="6858000"/>
+  <p:sldSz cx="9144000" cy="6858000" type="screen4x3"/>
   <p:notesSz cx="6858000" cy="9144000"/>
   <p:defaultTextStyle>
     <a:defPPr>
@@ -112,6 +116,11 @@
       </a:defRPr>
     </a:lvl9pPr>
   </p:defaultTextStyle>
+  <p:extLst>
+    <p:ext uri="{EFAFB233-063F-42B5-8137-9DF3F51BA10A}">
+      <p15:sldGuideLst xmlns:p15="http://schemas.microsoft.com/office/powerpoint/2012/main"/>
+    </p:ext>
+  </p:extLst>
 </p:presentation>
 </file>
 
@@ -134,28 +143,28 @@
       </p:grpSpPr>
       <p:grpSp>
         <p:nvGrpSpPr>
-          <p:cNvPr id="19" name="Group 18"/>
+          <p:cNvPr id="25" name="Group 24"/>
           <p:cNvGrpSpPr/>
           <p:nvPr/>
         </p:nvGrpSpPr>
         <p:grpSpPr>
           <a:xfrm>
-            <a:off x="546100" y="-4763"/>
-            <a:ext cx="5014912" cy="6862763"/>
-            <a:chOff x="2928938" y="-4763"/>
-            <a:chExt cx="5014912" cy="6862763"/>
+            <a:off x="203200" y="0"/>
+            <a:ext cx="3778250" cy="6858001"/>
+            <a:chOff x="203200" y="0"/>
+            <a:chExt cx="3778250" cy="6858001"/>
           </a:xfrm>
         </p:grpSpPr>
         <p:sp>
           <p:nvSpPr>
-            <p:cNvPr id="22" name="Freeform 6"/>
+            <p:cNvPr id="14" name="Freeform 6"/>
             <p:cNvSpPr/>
             <p:nvPr/>
           </p:nvSpPr>
           <p:spPr bwMode="auto">
             <a:xfrm>
-              <a:off x="3367088" y="-4763"/>
-              <a:ext cx="1063625" cy="2782888"/>
+              <a:off x="641350" y="0"/>
+              <a:ext cx="1365250" cy="3971925"/>
             </a:xfrm>
             <a:custGeom>
               <a:avLst/>
@@ -164,21 +173,21 @@
               <a:cxnLst/>
               <a:rect l="0" t="0" r="r" b="b"/>
               <a:pathLst>
-                <a:path w="670" h="1753">
+                <a:path w="860" h="2502">
                   <a:moveTo>
-                    <a:pt x="0" y="1696"/>
+                    <a:pt x="0" y="2445"/>
                   </a:moveTo>
                   <a:lnTo>
-                    <a:pt x="225" y="1753"/>
+                    <a:pt x="228" y="2502"/>
                   </a:lnTo>
                   <a:lnTo>
-                    <a:pt x="670" y="0"/>
+                    <a:pt x="860" y="0"/>
                   </a:lnTo>
                   <a:lnTo>
-                    <a:pt x="430" y="0"/>
+                    <a:pt x="620" y="0"/>
                   </a:lnTo>
                   <a:lnTo>
-                    <a:pt x="0" y="1696"/>
+                    <a:pt x="0" y="2445"/>
                   </a:lnTo>
                   <a:close/>
                 </a:path>
@@ -194,14 +203,14 @@
         </p:sp>
         <p:sp>
           <p:nvSpPr>
-            <p:cNvPr id="23" name="Freeform 7"/>
+            <p:cNvPr id="15" name="Freeform 7"/>
             <p:cNvSpPr/>
             <p:nvPr/>
           </p:nvSpPr>
           <p:spPr bwMode="auto">
             <a:xfrm>
-              <a:off x="2928938" y="-4763"/>
-              <a:ext cx="1035050" cy="2673350"/>
+              <a:off x="203200" y="0"/>
+              <a:ext cx="1336675" cy="3862388"/>
             </a:xfrm>
             <a:custGeom>
               <a:avLst/>
@@ -210,24 +219,21 @@
               <a:cxnLst/>
               <a:rect l="0" t="0" r="r" b="b"/>
               <a:pathLst>
-                <a:path w="652" h="1684">
+                <a:path w="842" h="2433">
                   <a:moveTo>
-                    <a:pt x="225" y="1684"/>
+                    <a:pt x="842" y="0"/>
                   </a:moveTo>
                   <a:lnTo>
-                    <a:pt x="652" y="0"/>
+                    <a:pt x="602" y="0"/>
                   </a:lnTo>
                   <a:lnTo>
-                    <a:pt x="411" y="0"/>
+                    <a:pt x="0" y="2376"/>
                   </a:lnTo>
                   <a:lnTo>
-                    <a:pt x="0" y="1627"/>
+                    <a:pt x="228" y="2433"/>
                   </a:lnTo>
                   <a:lnTo>
-                    <a:pt x="219" y="1681"/>
-                  </a:lnTo>
-                  <a:lnTo>
-                    <a:pt x="225" y="1684"/>
+                    <a:pt x="842" y="0"/>
                   </a:lnTo>
                   <a:close/>
                 </a:path>
@@ -246,14 +252,14 @@
         </p:sp>
         <p:sp>
           <p:nvSpPr>
-            <p:cNvPr id="24" name="Freeform 9"/>
+            <p:cNvPr id="16" name="Freeform 8"/>
             <p:cNvSpPr/>
             <p:nvPr/>
           </p:nvSpPr>
           <p:spPr bwMode="auto">
             <a:xfrm>
-              <a:off x="2928938" y="2582862"/>
-              <a:ext cx="2693987" cy="4275138"/>
+              <a:off x="207963" y="3776663"/>
+              <a:ext cx="1936750" cy="3081338"/>
             </a:xfrm>
             <a:custGeom>
               <a:avLst/>
@@ -262,15 +268,15 @@
               <a:cxnLst/>
               <a:rect l="0" t="0" r="r" b="b"/>
               <a:pathLst>
-                <a:path w="1697" h="2693">
+                <a:path w="1220" h="1941">
                   <a:moveTo>
                     <a:pt x="0" y="0"/>
                   </a:moveTo>
                   <a:lnTo>
-                    <a:pt x="1622" y="2693"/>
+                    <a:pt x="1166" y="1941"/>
                   </a:lnTo>
                   <a:lnTo>
-                    <a:pt x="1697" y="2693"/>
+                    <a:pt x="1220" y="1941"/>
                   </a:lnTo>
                   <a:lnTo>
                     <a:pt x="0" y="0"/>
@@ -292,14 +298,14 @@
         </p:sp>
         <p:sp>
           <p:nvSpPr>
-            <p:cNvPr id="25" name="Freeform 10"/>
+            <p:cNvPr id="20" name="Freeform 9"/>
             <p:cNvSpPr/>
             <p:nvPr/>
           </p:nvSpPr>
           <p:spPr bwMode="auto">
             <a:xfrm>
-              <a:off x="3371850" y="2692400"/>
-              <a:ext cx="3332162" cy="4165600"/>
+              <a:off x="646113" y="3886200"/>
+              <a:ext cx="2373313" cy="2971800"/>
             </a:xfrm>
             <a:custGeom>
               <a:avLst/>
@@ -308,18 +314,18 @@
               <a:cxnLst/>
               <a:rect l="0" t="0" r="r" b="b"/>
               <a:pathLst>
-                <a:path w="2099" h="2624">
+                <a:path w="1495" h="1872">
                   <a:moveTo>
-                    <a:pt x="2099" y="2624"/>
+                    <a:pt x="1495" y="1872"/>
                   </a:moveTo>
                   <a:lnTo>
                     <a:pt x="0" y="0"/>
                   </a:lnTo>
                   <a:lnTo>
-                    <a:pt x="2021" y="2624"/>
+                    <a:pt x="1442" y="1872"/>
                   </a:lnTo>
                   <a:lnTo>
-                    <a:pt x="2099" y="2624"/>
+                    <a:pt x="1495" y="1872"/>
                   </a:lnTo>
                   <a:close/>
                 </a:path>
@@ -337,14 +343,14 @@
         </p:sp>
         <p:sp>
           <p:nvSpPr>
-            <p:cNvPr id="26" name="Freeform 11"/>
+            <p:cNvPr id="21" name="Freeform 10"/>
             <p:cNvSpPr/>
             <p:nvPr/>
           </p:nvSpPr>
           <p:spPr bwMode="auto">
             <a:xfrm>
-              <a:off x="3367088" y="2687637"/>
-              <a:ext cx="4576762" cy="4170363"/>
+              <a:off x="641350" y="3881438"/>
+              <a:ext cx="3340100" cy="2976563"/>
             </a:xfrm>
             <a:custGeom>
               <a:avLst/>
@@ -353,7 +359,7 @@
               <a:cxnLst/>
               <a:rect l="0" t="0" r="r" b="b"/>
               <a:pathLst>
-                <a:path w="2883" h="2627">
+                <a:path w="2104" h="1875">
                   <a:moveTo>
                     <a:pt x="0" y="0"/>
                   </a:moveTo>
@@ -361,13 +367,13 @@
                     <a:pt x="3" y="3"/>
                   </a:lnTo>
                   <a:lnTo>
-                    <a:pt x="2102" y="2627"/>
+                    <a:pt x="1498" y="1875"/>
                   </a:lnTo>
                   <a:lnTo>
-                    <a:pt x="2883" y="2627"/>
+                    <a:pt x="2104" y="1875"/>
                   </a:lnTo>
                   <a:lnTo>
-                    <a:pt x="225" y="57"/>
+                    <a:pt x="228" y="57"/>
                   </a:lnTo>
                   <a:lnTo>
                     <a:pt x="0" y="0"/>
@@ -388,14 +394,14 @@
         </p:sp>
         <p:sp>
           <p:nvSpPr>
-            <p:cNvPr id="27" name="Freeform 12"/>
+            <p:cNvPr id="22" name="Freeform 11"/>
             <p:cNvSpPr/>
             <p:nvPr/>
           </p:nvSpPr>
           <p:spPr bwMode="auto">
             <a:xfrm>
-              <a:off x="2928938" y="2578100"/>
-              <a:ext cx="3584575" cy="4279900"/>
+              <a:off x="203200" y="3771900"/>
+              <a:ext cx="2660650" cy="3086100"/>
             </a:xfrm>
             <a:custGeom>
               <a:avLst/>
@@ -404,30 +410,42 @@
               <a:cxnLst/>
               <a:rect l="0" t="0" r="r" b="b"/>
               <a:pathLst>
-                <a:path w="2258" h="2696">
+                <a:path w="1676" h="1944">
                   <a:moveTo>
-                    <a:pt x="2258" y="2696"/>
+                    <a:pt x="1676" y="1944"/>
                   </a:moveTo>
                   <a:lnTo>
                     <a:pt x="264" y="111"/>
                   </a:lnTo>
                   <a:lnTo>
+                    <a:pt x="225" y="60"/>
+                  </a:lnTo>
+                  <a:lnTo>
                     <a:pt x="228" y="60"/>
                   </a:lnTo>
                   <a:lnTo>
-                    <a:pt x="225" y="57"/>
+                    <a:pt x="264" y="111"/>
+                  </a:lnTo>
+                  <a:lnTo>
+                    <a:pt x="234" y="69"/>
+                  </a:lnTo>
+                  <a:lnTo>
+                    <a:pt x="228" y="57"/>
+                  </a:lnTo>
+                  <a:lnTo>
+                    <a:pt x="222" y="54"/>
                   </a:lnTo>
                   <a:lnTo>
                     <a:pt x="0" y="0"/>
                   </a:lnTo>
                   <a:lnTo>
-                    <a:pt x="0" y="3"/>
+                    <a:pt x="3" y="3"/>
                   </a:lnTo>
                   <a:lnTo>
-                    <a:pt x="1697" y="2696"/>
+                    <a:pt x="1223" y="1944"/>
                   </a:lnTo>
                   <a:lnTo>
-                    <a:pt x="2258" y="2696"/>
+                    <a:pt x="1676" y="1944"/>
                   </a:lnTo>
                   <a:close/>
                 </a:path>
@@ -457,8 +475,8 @@
         </p:nvSpPr>
         <p:spPr>
           <a:xfrm>
-            <a:off x="2928401" y="1380068"/>
-            <a:ext cx="8574622" cy="2616199"/>
+            <a:off x="1739673" y="914401"/>
+            <a:ext cx="6947127" cy="3488266"/>
           </a:xfrm>
         </p:spPr>
         <p:txBody>
@@ -467,7 +485,7 @@
           </a:bodyPr>
           <a:lstStyle>
             <a:lvl1pPr algn="r">
-              <a:defRPr sz="6000">
+              <a:defRPr sz="5400">
                 <a:effectLst/>
               </a:defRPr>
             </a:lvl1pPr>
@@ -493,8 +511,8 @@
         </p:nvSpPr>
         <p:spPr>
           <a:xfrm>
-            <a:off x="4515377" y="3996267"/>
-            <a:ext cx="6987645" cy="1388534"/>
+            <a:off x="2924238" y="4402666"/>
+            <a:ext cx="5762563" cy="1364531"/>
           </a:xfrm>
         </p:spPr>
         <p:txBody>
@@ -504,7 +522,7 @@
           <a:lstStyle>
             <a:lvl1pPr marL="0" indent="0" algn="r">
               <a:buNone/>
-              <a:defRPr sz="2100">
+              <a:defRPr sz="1800">
                 <a:solidFill>
                   <a:schemeClr val="tx1"/>
                 </a:solidFill>
@@ -610,15 +628,20 @@
             <p:ph type="dt" sz="half" idx="10"/>
           </p:nvPr>
         </p:nvSpPr>
-        <p:spPr/>
+        <p:spPr>
+          <a:xfrm>
+            <a:off x="7325773" y="6117336"/>
+            <a:ext cx="857473" cy="365125"/>
+          </a:xfrm>
+        </p:spPr>
         <p:txBody>
           <a:bodyPr/>
           <a:lstStyle/>
           <a:p>
             <a:fld id="{B61BEF0D-F0BB-DE4B-95CE-6DB70DBA9567}" type="datetimeFigureOut">
-              <a:rPr lang="en-US" dirty="0"/>
+              <a:rPr lang="en-US" smtClean="0"/>
               <a:pPr/>
-              <a:t>5/2/2014</a:t>
+              <a:t>5/6/2014</a:t>
             </a:fld>
             <a:endParaRPr lang="en-US" dirty="0"/>
           </a:p>
@@ -636,8 +659,8 @@
         </p:nvSpPr>
         <p:spPr>
           <a:xfrm>
-            <a:off x="5332412" y="5883275"/>
-            <a:ext cx="4324044" cy="365125"/>
+            <a:off x="3623733" y="6117336"/>
+            <a:ext cx="3609438" cy="365125"/>
           </a:xfrm>
         </p:spPr>
         <p:txBody>
@@ -658,13 +681,18 @@
             <p:ph type="sldNum" sz="quarter" idx="12"/>
           </p:nvPr>
         </p:nvSpPr>
-        <p:spPr/>
+        <p:spPr>
+          <a:xfrm>
+            <a:off x="8275320" y="6117336"/>
+            <a:ext cx="411480" cy="365125"/>
+          </a:xfrm>
+        </p:spPr>
         <p:txBody>
           <a:bodyPr/>
           <a:lstStyle/>
           <a:p>
             <a:fld id="{D57F1E4F-1CFF-5643-939E-217C01CDF565}" type="slidenum">
-              <a:rPr lang="en-US" dirty="0"/>
+              <a:rPr lang="en-US" smtClean="0"/>
               <a:pPr/>
               <a:t>‹#›</a:t>
             </a:fld>
@@ -672,7 +700,122 @@
           </a:p>
         </p:txBody>
       </p:sp>
+      <p:sp>
+        <p:nvSpPr>
+          <p:cNvPr id="23" name="Freeform 12"/>
+          <p:cNvSpPr/>
+          <p:nvPr/>
+        </p:nvSpPr>
+        <p:spPr bwMode="auto">
+          <a:xfrm>
+            <a:off x="203200" y="3771900"/>
+            <a:ext cx="361950" cy="90488"/>
+          </a:xfrm>
+          <a:custGeom>
+            <a:avLst/>
+            <a:gdLst/>
+            <a:ahLst/>
+            <a:cxnLst/>
+            <a:rect l="0" t="0" r="r" b="b"/>
+            <a:pathLst>
+              <a:path w="228" h="57">
+                <a:moveTo>
+                  <a:pt x="228" y="57"/>
+                </a:moveTo>
+                <a:lnTo>
+                  <a:pt x="0" y="0"/>
+                </a:lnTo>
+                <a:lnTo>
+                  <a:pt x="222" y="54"/>
+                </a:lnTo>
+                <a:lnTo>
+                  <a:pt x="228" y="57"/>
+                </a:lnTo>
+                <a:close/>
+              </a:path>
+            </a:pathLst>
+          </a:custGeom>
+          <a:solidFill>
+            <a:srgbClr val="29ABE2"/>
+          </a:solidFill>
+          <a:ln>
+            <a:noFill/>
+          </a:ln>
+          <a:extLst>
+            <a:ext uri="{91240B29-F687-4f45-9708-019B960494DF}">
+              <a14:hiddenLine xmlns="" xmlns:a14="http://schemas.microsoft.com/office/drawing/2010/main" w="9525">
+                <a:solidFill>
+                  <a:srgbClr val="000000"/>
+                </a:solidFill>
+                <a:round/>
+                <a:headEnd/>
+                <a:tailEnd/>
+              </a14:hiddenLine>
+            </a:ext>
+          </a:extLst>
+        </p:spPr>
+      </p:sp>
+      <p:sp>
+        <p:nvSpPr>
+          <p:cNvPr id="24" name="Freeform 13"/>
+          <p:cNvSpPr/>
+          <p:nvPr/>
+        </p:nvSpPr>
+        <p:spPr bwMode="auto">
+          <a:xfrm>
+            <a:off x="560388" y="3867150"/>
+            <a:ext cx="61913" cy="80963"/>
+          </a:xfrm>
+          <a:custGeom>
+            <a:avLst/>
+            <a:gdLst/>
+            <a:ahLst/>
+            <a:cxnLst/>
+            <a:rect l="0" t="0" r="r" b="b"/>
+            <a:pathLst>
+              <a:path w="39" h="51">
+                <a:moveTo>
+                  <a:pt x="0" y="0"/>
+                </a:moveTo>
+                <a:lnTo>
+                  <a:pt x="39" y="51"/>
+                </a:lnTo>
+                <a:lnTo>
+                  <a:pt x="3" y="0"/>
+                </a:lnTo>
+                <a:lnTo>
+                  <a:pt x="0" y="0"/>
+                </a:lnTo>
+                <a:close/>
+              </a:path>
+            </a:pathLst>
+          </a:custGeom>
+          <a:solidFill>
+            <a:srgbClr val="29ABE2"/>
+          </a:solidFill>
+          <a:ln>
+            <a:noFill/>
+          </a:ln>
+          <a:extLst>
+            <a:ext uri="{91240B29-F687-4f45-9708-019B960494DF}">
+              <a14:hiddenLine xmlns="" xmlns:a14="http://schemas.microsoft.com/office/drawing/2010/main" w="9525">
+                <a:solidFill>
+                  <a:srgbClr val="000000"/>
+                </a:solidFill>
+                <a:round/>
+                <a:headEnd/>
+                <a:tailEnd/>
+              </a14:hiddenLine>
+            </a:ext>
+          </a:extLst>
+        </p:spPr>
+      </p:sp>
     </p:spTree>
+    <p:extLst>
+      <p:ext uri="{BB962C8B-B14F-4D97-AF65-F5344CB8AC3E}">
+        <p14:creationId xmlns:p14="http://schemas.microsoft.com/office/powerpoint/2010/main" val="3302874319"/>
+      </p:ext>
+    </p:extLst>
   </p:cSld>
   <p:clrMapOvr>
     <a:masterClrMapping/>
@@ -709,8 +852,8 @@
         </p:nvSpPr>
         <p:spPr>
           <a:xfrm>
-            <a:off x="1484311" y="4732865"/>
-            <a:ext cx="10018711" cy="566738"/>
+            <a:off x="1113523" y="4732865"/>
+            <a:ext cx="7515991" cy="566738"/>
           </a:xfrm>
         </p:spPr>
         <p:txBody>
@@ -743,8 +886,8 @@
         </p:nvSpPr>
         <p:spPr>
           <a:xfrm>
-            <a:off x="2386012" y="932112"/>
-            <a:ext cx="8225944" cy="3164976"/>
+            <a:off x="1789975" y="932112"/>
+            <a:ext cx="6171065" cy="3164976"/>
           </a:xfrm>
           <a:prstGeom prst="roundRect">
             <a:avLst>
@@ -838,8 +981,8 @@
         </p:nvSpPr>
         <p:spPr>
           <a:xfrm>
-            <a:off x="1484311" y="5299603"/>
-            <a:ext cx="10018711" cy="493712"/>
+            <a:off x="1113523" y="5299603"/>
+            <a:ext cx="7515991" cy="493712"/>
           </a:xfrm>
         </p:spPr>
         <p:txBody>
@@ -909,9 +1052,9 @@
           <a:lstStyle/>
           <a:p>
             <a:fld id="{B61BEF0D-F0BB-DE4B-95CE-6DB70DBA9567}" type="datetimeFigureOut">
-              <a:rPr lang="en-US" dirty="0"/>
+              <a:rPr lang="en-US" smtClean="0"/>
               <a:pPr/>
-              <a:t>5/2/2014</a:t>
+              <a:t>5/6/2014</a:t>
             </a:fld>
             <a:endParaRPr lang="en-US" dirty="0"/>
           </a:p>
@@ -952,7 +1095,7 @@
           <a:lstStyle/>
           <a:p>
             <a:fld id="{D57F1E4F-1CFF-5643-939E-217C01CDF565}" type="slidenum">
-              <a:rPr lang="en-US" dirty="0"/>
+              <a:rPr lang="en-US" smtClean="0"/>
               <a:pPr/>
               <a:t>‹#›</a:t>
             </a:fld>
@@ -961,6 +1104,11 @@
         </p:txBody>
       </p:sp>
     </p:spTree>
+    <p:extLst>
+      <p:ext uri="{BB962C8B-B14F-4D97-AF65-F5344CB8AC3E}">
+        <p14:creationId xmlns:p14="http://schemas.microsoft.com/office/powerpoint/2010/main" val="1717203686"/>
+      </p:ext>
+    </p:extLst>
   </p:cSld>
   <p:clrMapOvr>
     <a:masterClrMapping/>
@@ -997,8 +1145,8 @@
         </p:nvSpPr>
         <p:spPr>
           <a:xfrm>
-            <a:off x="1484312" y="685800"/>
-            <a:ext cx="10018711" cy="3048000"/>
+            <a:off x="1113524" y="685800"/>
+            <a:ext cx="7515991" cy="3048000"/>
           </a:xfrm>
         </p:spPr>
         <p:txBody>
@@ -1031,8 +1179,8 @@
         </p:nvSpPr>
         <p:spPr>
           <a:xfrm>
-            <a:off x="1484312" y="4343400"/>
-            <a:ext cx="10018713" cy="1447800"/>
+            <a:off x="1113524" y="4343400"/>
+            <a:ext cx="7515992" cy="1447800"/>
           </a:xfrm>
         </p:spPr>
         <p:txBody>
@@ -1154,9 +1302,9 @@
           <a:lstStyle/>
           <a:p>
             <a:fld id="{B61BEF0D-F0BB-DE4B-95CE-6DB70DBA9567}" type="datetimeFigureOut">
-              <a:rPr lang="en-US" dirty="0"/>
+              <a:rPr lang="en-US" smtClean="0"/>
               <a:pPr/>
-              <a:t>5/2/2014</a:t>
+              <a:t>5/6/2014</a:t>
             </a:fld>
             <a:endParaRPr lang="en-US" dirty="0"/>
           </a:p>
@@ -1197,7 +1345,7 @@
           <a:lstStyle/>
           <a:p>
             <a:fld id="{D57F1E4F-1CFF-5643-939E-217C01CDF565}" type="slidenum">
-              <a:rPr lang="en-US" dirty="0"/>
+              <a:rPr lang="en-US" smtClean="0"/>
               <a:pPr/>
               <a:t>‹#›</a:t>
             </a:fld>
@@ -1206,6 +1354,11 @@
         </p:txBody>
       </p:sp>
     </p:spTree>
+    <p:extLst>
+      <p:ext uri="{BB962C8B-B14F-4D97-AF65-F5344CB8AC3E}">
+        <p14:creationId xmlns:p14="http://schemas.microsoft.com/office/powerpoint/2010/main" val="2462506097"/>
+      </p:ext>
+    </p:extLst>
   </p:cSld>
   <p:clrMapOvr>
     <a:masterClrMapping/>
@@ -1238,8 +1391,8 @@
         </p:nvSpPr>
         <p:spPr>
           <a:xfrm>
-            <a:off x="1598612" y="863023"/>
-            <a:ext cx="609600" cy="584776"/>
+            <a:off x="969421" y="863023"/>
+            <a:ext cx="457319" cy="584776"/>
           </a:xfrm>
           <a:prstGeom prst="rect">
             <a:avLst/>
@@ -1354,8 +1507,8 @@
         </p:nvSpPr>
         <p:spPr>
           <a:xfrm>
-            <a:off x="10893425" y="2819399"/>
-            <a:ext cx="609600" cy="584776"/>
+            <a:off x="8172197" y="2819399"/>
+            <a:ext cx="457319" cy="584776"/>
           </a:xfrm>
           <a:prstGeom prst="rect">
             <a:avLst/>
@@ -1474,8 +1627,8 @@
         </p:nvSpPr>
         <p:spPr>
           <a:xfrm>
-            <a:off x="2208212" y="685800"/>
-            <a:ext cx="8990012" cy="2743199"/>
+            <a:off x="1426741" y="685801"/>
+            <a:ext cx="6974115" cy="2743199"/>
           </a:xfrm>
         </p:spPr>
         <p:txBody>
@@ -1512,8 +1665,8 @@
         </p:nvSpPr>
         <p:spPr>
           <a:xfrm>
-            <a:off x="2436811" y="3428999"/>
-            <a:ext cx="8532815" cy="381000"/>
+            <a:off x="1598235" y="3428999"/>
+            <a:ext cx="6631128" cy="381000"/>
           </a:xfrm>
         </p:spPr>
         <p:txBody>
@@ -1568,8 +1721,8 @@
         </p:nvSpPr>
         <p:spPr>
           <a:xfrm>
-            <a:off x="1484311" y="4343400"/>
-            <a:ext cx="10018711" cy="1447800"/>
+            <a:off x="1113523" y="4343400"/>
+            <a:ext cx="7515991" cy="1447800"/>
           </a:xfrm>
         </p:spPr>
         <p:txBody>
@@ -1691,9 +1844,9 @@
           <a:lstStyle/>
           <a:p>
             <a:fld id="{B61BEF0D-F0BB-DE4B-95CE-6DB70DBA9567}" type="datetimeFigureOut">
-              <a:rPr lang="en-US" dirty="0"/>
+              <a:rPr lang="en-US" smtClean="0"/>
               <a:pPr/>
-              <a:t>5/2/2014</a:t>
+              <a:t>5/6/2014</a:t>
             </a:fld>
             <a:endParaRPr lang="en-US" dirty="0"/>
           </a:p>
@@ -1734,7 +1887,7 @@
           <a:lstStyle/>
           <a:p>
             <a:fld id="{D57F1E4F-1CFF-5643-939E-217C01CDF565}" type="slidenum">
-              <a:rPr lang="en-US" dirty="0"/>
+              <a:rPr lang="en-US" smtClean="0"/>
               <a:pPr/>
               <a:t>‹#›</a:t>
             </a:fld>
@@ -1743,6 +1896,11 @@
         </p:txBody>
       </p:sp>
     </p:spTree>
+    <p:extLst>
+      <p:ext uri="{BB962C8B-B14F-4D97-AF65-F5344CB8AC3E}">
+        <p14:creationId xmlns:p14="http://schemas.microsoft.com/office/powerpoint/2010/main" val="2570049524"/>
+      </p:ext>
+    </p:extLst>
   </p:cSld>
   <p:clrMapOvr>
     <a:masterClrMapping/>
@@ -1779,8 +1937,8 @@
         </p:nvSpPr>
         <p:spPr>
           <a:xfrm>
-            <a:off x="1484313" y="3308581"/>
-            <a:ext cx="10018709" cy="1468800"/>
+            <a:off x="1113525" y="3308581"/>
+            <a:ext cx="7515989" cy="1468800"/>
           </a:xfrm>
         </p:spPr>
         <p:txBody>
@@ -1813,8 +1971,8 @@
         </p:nvSpPr>
         <p:spPr>
           <a:xfrm>
-            <a:off x="1484312" y="4777381"/>
-            <a:ext cx="10018710" cy="860400"/>
+            <a:off x="1113524" y="4777381"/>
+            <a:ext cx="7515990" cy="860400"/>
           </a:xfrm>
         </p:spPr>
         <p:txBody>
@@ -1936,9 +2094,9 @@
           <a:lstStyle/>
           <a:p>
             <a:fld id="{B61BEF0D-F0BB-DE4B-95CE-6DB70DBA9567}" type="datetimeFigureOut">
-              <a:rPr lang="en-US" dirty="0"/>
+              <a:rPr lang="en-US" smtClean="0"/>
               <a:pPr/>
-              <a:t>5/2/2014</a:t>
+              <a:t>5/6/2014</a:t>
             </a:fld>
             <a:endParaRPr lang="en-US" dirty="0"/>
           </a:p>
@@ -1979,7 +2137,7 @@
           <a:lstStyle/>
           <a:p>
             <a:fld id="{D57F1E4F-1CFF-5643-939E-217C01CDF565}" type="slidenum">
-              <a:rPr lang="en-US" dirty="0"/>
+              <a:rPr lang="en-US" smtClean="0"/>
               <a:pPr/>
               <a:t>‹#›</a:t>
             </a:fld>
@@ -1988,6 +2146,11 @@
         </p:txBody>
       </p:sp>
     </p:spTree>
+    <p:extLst>
+      <p:ext uri="{BB962C8B-B14F-4D97-AF65-F5344CB8AC3E}">
+        <p14:creationId xmlns:p14="http://schemas.microsoft.com/office/powerpoint/2010/main" val="3648804200"/>
+      </p:ext>
+    </p:extLst>
   </p:cSld>
   <p:clrMapOvr>
     <a:masterClrMapping/>
@@ -2020,8 +2183,8 @@
         </p:nvSpPr>
         <p:spPr>
           <a:xfrm>
-            <a:off x="1598612" y="863023"/>
-            <a:ext cx="609600" cy="584776"/>
+            <a:off x="969421" y="863023"/>
+            <a:ext cx="457319" cy="584776"/>
           </a:xfrm>
           <a:prstGeom prst="rect">
             <a:avLst/>
@@ -2136,8 +2299,8 @@
         </p:nvSpPr>
         <p:spPr>
           <a:xfrm>
-            <a:off x="10893425" y="2819399"/>
-            <a:ext cx="609600" cy="584776"/>
+            <a:off x="8172197" y="2819399"/>
+            <a:ext cx="457319" cy="584776"/>
           </a:xfrm>
           <a:prstGeom prst="rect">
             <a:avLst/>
@@ -2256,8 +2419,8 @@
         </p:nvSpPr>
         <p:spPr>
           <a:xfrm>
-            <a:off x="2208212" y="685800"/>
-            <a:ext cx="8990012" cy="2743199"/>
+            <a:off x="1426741" y="685801"/>
+            <a:ext cx="6974115" cy="2743199"/>
           </a:xfrm>
         </p:spPr>
         <p:txBody>
@@ -2294,8 +2457,8 @@
         </p:nvSpPr>
         <p:spPr>
           <a:xfrm>
-            <a:off x="1484313" y="3886200"/>
-            <a:ext cx="10018710" cy="889000"/>
+            <a:off x="1113525" y="3886200"/>
+            <a:ext cx="7515990" cy="889000"/>
           </a:xfrm>
         </p:spPr>
         <p:txBody>
@@ -2342,8 +2505,8 @@
         </p:nvSpPr>
         <p:spPr>
           <a:xfrm>
-            <a:off x="1484312" y="4775200"/>
-            <a:ext cx="10018710" cy="1016000"/>
+            <a:off x="1113524" y="4775200"/>
+            <a:ext cx="7515990" cy="1016000"/>
           </a:xfrm>
         </p:spPr>
         <p:txBody>
@@ -2465,9 +2628,9 @@
           <a:lstStyle/>
           <a:p>
             <a:fld id="{B61BEF0D-F0BB-DE4B-95CE-6DB70DBA9567}" type="datetimeFigureOut">
-              <a:rPr lang="en-US" dirty="0"/>
+              <a:rPr lang="en-US" smtClean="0"/>
               <a:pPr/>
-              <a:t>5/2/2014</a:t>
+              <a:t>5/6/2014</a:t>
             </a:fld>
             <a:endParaRPr lang="en-US" dirty="0"/>
           </a:p>
@@ -2508,7 +2671,7 @@
           <a:lstStyle/>
           <a:p>
             <a:fld id="{D57F1E4F-1CFF-5643-939E-217C01CDF565}" type="slidenum">
-              <a:rPr lang="en-US" dirty="0"/>
+              <a:rPr lang="en-US" smtClean="0"/>
               <a:pPr/>
               <a:t>‹#›</a:t>
             </a:fld>
@@ -2517,6 +2680,11 @@
         </p:txBody>
       </p:sp>
     </p:spTree>
+    <p:extLst>
+      <p:ext uri="{BB962C8B-B14F-4D97-AF65-F5344CB8AC3E}">
+        <p14:creationId xmlns:p14="http://schemas.microsoft.com/office/powerpoint/2010/main" val="1903447461"/>
+      </p:ext>
+    </p:extLst>
   </p:cSld>
   <p:clrMapOvr>
     <a:masterClrMapping/>
@@ -2553,8 +2721,8 @@
         </p:nvSpPr>
         <p:spPr>
           <a:xfrm>
-            <a:off x="1484313" y="685800"/>
-            <a:ext cx="10018712" cy="2727325"/>
+            <a:off x="1113525" y="685801"/>
+            <a:ext cx="7515991" cy="2727325"/>
           </a:xfrm>
         </p:spPr>
         <p:txBody>
@@ -2588,8 +2756,8 @@
         </p:nvSpPr>
         <p:spPr>
           <a:xfrm>
-            <a:off x="1484312" y="3505200"/>
-            <a:ext cx="10018713" cy="838200"/>
+            <a:off x="1113524" y="3505200"/>
+            <a:ext cx="7515992" cy="838200"/>
           </a:xfrm>
         </p:spPr>
         <p:txBody>
@@ -2636,8 +2804,8 @@
         </p:nvSpPr>
         <p:spPr>
           <a:xfrm>
-            <a:off x="1484311" y="4343400"/>
-            <a:ext cx="10018713" cy="1447800"/>
+            <a:off x="1113524" y="4343400"/>
+            <a:ext cx="7515992" cy="1447800"/>
           </a:xfrm>
         </p:spPr>
         <p:txBody>
@@ -2759,9 +2927,9 @@
           <a:lstStyle/>
           <a:p>
             <a:fld id="{B61BEF0D-F0BB-DE4B-95CE-6DB70DBA9567}" type="datetimeFigureOut">
-              <a:rPr lang="en-US" dirty="0"/>
+              <a:rPr lang="en-US" smtClean="0"/>
               <a:pPr/>
-              <a:t>5/2/2014</a:t>
+              <a:t>5/6/2014</a:t>
             </a:fld>
             <a:endParaRPr lang="en-US" dirty="0"/>
           </a:p>
@@ -2802,7 +2970,7 @@
           <a:lstStyle/>
           <a:p>
             <a:fld id="{D57F1E4F-1CFF-5643-939E-217C01CDF565}" type="slidenum">
-              <a:rPr lang="en-US" dirty="0"/>
+              <a:rPr lang="en-US" smtClean="0"/>
               <a:pPr/>
               <a:t>‹#›</a:t>
             </a:fld>
@@ -2811,6 +2979,11 @@
         </p:txBody>
       </p:sp>
     </p:spTree>
+    <p:extLst>
+      <p:ext uri="{BB962C8B-B14F-4D97-AF65-F5344CB8AC3E}">
+        <p14:creationId xmlns:p14="http://schemas.microsoft.com/office/powerpoint/2010/main" val="2584954959"/>
+      </p:ext>
+    </p:extLst>
   </p:cSld>
   <p:clrMapOvr>
     <a:masterClrMapping/>
@@ -2930,9 +3103,9 @@
           <a:lstStyle/>
           <a:p>
             <a:fld id="{B61BEF0D-F0BB-DE4B-95CE-6DB70DBA9567}" type="datetimeFigureOut">
-              <a:rPr lang="en-US" dirty="0"/>
+              <a:rPr lang="en-US" smtClean="0"/>
               <a:pPr/>
-              <a:t>5/2/2014</a:t>
+              <a:t>5/6/2014</a:t>
             </a:fld>
             <a:endParaRPr lang="en-US" dirty="0"/>
           </a:p>
@@ -2973,7 +3146,7 @@
           <a:lstStyle/>
           <a:p>
             <a:fld id="{D57F1E4F-1CFF-5643-939E-217C01CDF565}" type="slidenum">
-              <a:rPr lang="en-US" dirty="0"/>
+              <a:rPr lang="en-US" smtClean="0"/>
               <a:pPr/>
               <a:t>‹#›</a:t>
             </a:fld>
@@ -2982,6 +3155,11 @@
         </p:txBody>
       </p:sp>
     </p:spTree>
+    <p:extLst>
+      <p:ext uri="{BB962C8B-B14F-4D97-AF65-F5344CB8AC3E}">
+        <p14:creationId xmlns:p14="http://schemas.microsoft.com/office/powerpoint/2010/main" val="3105936072"/>
+      </p:ext>
+    </p:extLst>
   </p:cSld>
   <p:clrMapOvr>
     <a:masterClrMapping/>
@@ -3018,8 +3196,8 @@
         </p:nvSpPr>
         <p:spPr>
           <a:xfrm>
-            <a:off x="9732655" y="685800"/>
-            <a:ext cx="1770369" cy="5105400"/>
+            <a:off x="7301393" y="685800"/>
+            <a:ext cx="1328123" cy="5105400"/>
           </a:xfrm>
         </p:spPr>
         <p:txBody>
@@ -3046,8 +3224,8 @@
         </p:nvSpPr>
         <p:spPr>
           <a:xfrm>
-            <a:off x="1484312" y="685800"/>
-            <a:ext cx="8019742" cy="5105400"/>
+            <a:off x="1113524" y="685800"/>
+            <a:ext cx="6016373" cy="5105400"/>
           </a:xfrm>
         </p:spPr>
         <p:txBody>
@@ -3107,9 +3285,9 @@
           <a:lstStyle/>
           <a:p>
             <a:fld id="{B61BEF0D-F0BB-DE4B-95CE-6DB70DBA9567}" type="datetimeFigureOut">
-              <a:rPr lang="en-US" dirty="0"/>
+              <a:rPr lang="en-US" smtClean="0"/>
               <a:pPr/>
-              <a:t>5/2/2014</a:t>
+              <a:t>5/6/2014</a:t>
             </a:fld>
             <a:endParaRPr lang="en-US" dirty="0"/>
           </a:p>
@@ -3150,7 +3328,7 @@
           <a:lstStyle/>
           <a:p>
             <a:fld id="{D57F1E4F-1CFF-5643-939E-217C01CDF565}" type="slidenum">
-              <a:rPr lang="en-US" dirty="0"/>
+              <a:rPr lang="en-US" smtClean="0"/>
               <a:pPr/>
               <a:t>‹#›</a:t>
             </a:fld>
@@ -3159,6 +3337,11 @@
         </p:txBody>
       </p:sp>
     </p:spTree>
+    <p:extLst>
+      <p:ext uri="{BB962C8B-B14F-4D97-AF65-F5344CB8AC3E}">
+        <p14:creationId xmlns:p14="http://schemas.microsoft.com/office/powerpoint/2010/main" val="2358067853"/>
+      </p:ext>
+    </p:extLst>
   </p:cSld>
   <p:clrMapOvr>
     <a:masterClrMapping/>
@@ -3193,7 +3376,12 @@
             <p:ph type="title"/>
           </p:nvPr>
         </p:nvSpPr>
-        <p:spPr/>
+        <p:spPr>
+          <a:xfrm>
+            <a:off x="982133" y="457201"/>
+            <a:ext cx="7704667" cy="1981200"/>
+          </a:xfrm>
+        </p:spPr>
         <p:txBody>
           <a:bodyPr/>
           <a:lstStyle/>
@@ -3216,7 +3404,12 @@
             <p:ph idx="1"/>
           </p:nvPr>
         </p:nvSpPr>
-        <p:spPr/>
+        <p:spPr>
+          <a:xfrm>
+            <a:off x="982133" y="2667000"/>
+            <a:ext cx="7704667" cy="3332816"/>
+          </a:xfrm>
+        </p:spPr>
         <p:txBody>
           <a:bodyPr anchor="ctr"/>
           <a:lstStyle/>
@@ -3268,15 +3461,20 @@
             <p:ph type="dt" sz="half" idx="10"/>
           </p:nvPr>
         </p:nvSpPr>
-        <p:spPr/>
+        <p:spPr>
+          <a:xfrm>
+            <a:off x="7344329" y="6108173"/>
+            <a:ext cx="857473" cy="365125"/>
+          </a:xfrm>
+        </p:spPr>
         <p:txBody>
           <a:bodyPr/>
           <a:lstStyle/>
           <a:p>
             <a:fld id="{B61BEF0D-F0BB-DE4B-95CE-6DB70DBA9567}" type="datetimeFigureOut">
-              <a:rPr lang="en-US" dirty="0"/>
+              <a:rPr lang="en-US" smtClean="0"/>
               <a:pPr/>
-              <a:t>5/2/2014</a:t>
+              <a:t>5/6/2014</a:t>
             </a:fld>
             <a:endParaRPr lang="en-US" dirty="0"/>
           </a:p>
@@ -3292,7 +3490,12 @@
             <p:ph type="ftr" sz="quarter" idx="11"/>
           </p:nvPr>
         </p:nvSpPr>
-        <p:spPr/>
+        <p:spPr>
+          <a:xfrm>
+            <a:off x="1972647" y="6108173"/>
+            <a:ext cx="5314517" cy="365125"/>
+          </a:xfrm>
+        </p:spPr>
         <p:txBody>
           <a:bodyPr/>
           <a:lstStyle/>
@@ -3313,8 +3516,8 @@
         </p:nvSpPr>
         <p:spPr>
           <a:xfrm>
-            <a:off x="10951856" y="5867131"/>
-            <a:ext cx="551167" cy="365125"/>
+            <a:off x="8258967" y="6108173"/>
+            <a:ext cx="427833" cy="365125"/>
           </a:xfrm>
         </p:spPr>
         <p:txBody>
@@ -3322,7 +3525,7 @@
           <a:lstStyle/>
           <a:p>
             <a:fld id="{D57F1E4F-1CFF-5643-939E-217C01CDF565}" type="slidenum">
-              <a:rPr lang="en-US" dirty="0"/>
+              <a:rPr lang="en-US" smtClean="0"/>
               <a:pPr/>
               <a:t>‹#›</a:t>
             </a:fld>
@@ -3331,6 +3534,11 @@
         </p:txBody>
       </p:sp>
     </p:spTree>
+    <p:extLst>
+      <p:ext uri="{BB962C8B-B14F-4D97-AF65-F5344CB8AC3E}">
+        <p14:creationId xmlns:p14="http://schemas.microsoft.com/office/powerpoint/2010/main" val="1986642893"/>
+      </p:ext>
+    </p:extLst>
   </p:cSld>
   <p:clrMapOvr>
     <a:masterClrMapping/>
@@ -3367,8 +3575,8 @@
         </p:nvSpPr>
         <p:spPr>
           <a:xfrm>
-            <a:off x="2572279" y="2666999"/>
-            <a:ext cx="8930747" cy="2110382"/>
+            <a:off x="1986995" y="2666998"/>
+            <a:ext cx="6699805" cy="2360071"/>
           </a:xfrm>
         </p:spPr>
         <p:txBody>
@@ -3399,8 +3607,8 @@
         </p:nvSpPr>
         <p:spPr>
           <a:xfrm>
-            <a:off x="2572278" y="4777381"/>
-            <a:ext cx="8930748" cy="860400"/>
+            <a:off x="1986998" y="5027070"/>
+            <a:ext cx="6699802" cy="860400"/>
           </a:xfrm>
         </p:spPr>
         <p:txBody>
@@ -3522,9 +3730,9 @@
           <a:lstStyle/>
           <a:p>
             <a:fld id="{B61BEF0D-F0BB-DE4B-95CE-6DB70DBA9567}" type="datetimeFigureOut">
-              <a:rPr lang="en-US" dirty="0"/>
+              <a:rPr lang="en-US" smtClean="0"/>
               <a:pPr/>
-              <a:t>5/2/2014</a:t>
+              <a:t>5/6/2014</a:t>
             </a:fld>
             <a:endParaRPr lang="en-US" dirty="0"/>
           </a:p>
@@ -3559,13 +3767,18 @@
             <p:ph type="sldNum" sz="quarter" idx="12"/>
           </p:nvPr>
         </p:nvSpPr>
-        <p:spPr/>
+        <p:spPr>
+          <a:xfrm>
+            <a:off x="8273317" y="6116070"/>
+            <a:ext cx="413483" cy="365125"/>
+          </a:xfrm>
+        </p:spPr>
         <p:txBody>
           <a:bodyPr/>
           <a:lstStyle/>
           <a:p>
             <a:fld id="{D57F1E4F-1CFF-5643-939E-217C01CDF565}" type="slidenum">
-              <a:rPr lang="en-US" dirty="0"/>
+              <a:rPr lang="en-US" smtClean="0"/>
               <a:pPr/>
               <a:t>‹#›</a:t>
             </a:fld>
@@ -3574,6 +3787,11 @@
         </p:txBody>
       </p:sp>
     </p:spTree>
+    <p:extLst>
+      <p:ext uri="{BB962C8B-B14F-4D97-AF65-F5344CB8AC3E}">
+        <p14:creationId xmlns:p14="http://schemas.microsoft.com/office/powerpoint/2010/main" val="2963097456"/>
+      </p:ext>
+    </p:extLst>
   </p:cSld>
   <p:clrMapOvr>
     <a:masterClrMapping/>
@@ -3610,8 +3828,8 @@
         </p:nvSpPr>
         <p:spPr>
           <a:xfrm>
-            <a:off x="1484311" y="685800"/>
-            <a:ext cx="10018713" cy="1752599"/>
+            <a:off x="982133" y="685801"/>
+            <a:ext cx="7704667" cy="1752599"/>
           </a:xfrm>
         </p:spPr>
         <p:txBody>
@@ -3638,8 +3856,8 @@
         </p:nvSpPr>
         <p:spPr>
           <a:xfrm>
-            <a:off x="1484312" y="2666999"/>
-            <a:ext cx="4895055" cy="3124201"/>
+            <a:off x="982133" y="2667000"/>
+            <a:ext cx="3739896" cy="3368674"/>
           </a:xfrm>
         </p:spPr>
         <p:txBody>
@@ -3725,8 +3943,8 @@
         </p:nvSpPr>
         <p:spPr>
           <a:xfrm>
-            <a:off x="6607967" y="2667000"/>
-            <a:ext cx="4895056" cy="3124200"/>
+            <a:off x="4946904" y="2667000"/>
+            <a:ext cx="3739896" cy="3346824"/>
           </a:xfrm>
         </p:spPr>
         <p:txBody>
@@ -3816,9 +4034,9 @@
           <a:lstStyle/>
           <a:p>
             <a:fld id="{B61BEF0D-F0BB-DE4B-95CE-6DB70DBA9567}" type="datetimeFigureOut">
-              <a:rPr lang="en-US" dirty="0"/>
+              <a:rPr lang="en-US" smtClean="0"/>
               <a:pPr/>
-              <a:t>5/2/2014</a:t>
+              <a:t>5/6/2014</a:t>
             </a:fld>
             <a:endParaRPr lang="en-US" dirty="0"/>
           </a:p>
@@ -3859,7 +4077,7 @@
           <a:lstStyle/>
           <a:p>
             <a:fld id="{D57F1E4F-1CFF-5643-939E-217C01CDF565}" type="slidenum">
-              <a:rPr lang="en-US" dirty="0"/>
+              <a:rPr lang="en-US" smtClean="0"/>
               <a:pPr/>
               <a:t>‹#›</a:t>
             </a:fld>
@@ -3868,6 +4086,11 @@
         </p:txBody>
       </p:sp>
     </p:spTree>
+    <p:extLst>
+      <p:ext uri="{BB962C8B-B14F-4D97-AF65-F5344CB8AC3E}">
+        <p14:creationId xmlns:p14="http://schemas.microsoft.com/office/powerpoint/2010/main" val="1059825076"/>
+      </p:ext>
+    </p:extLst>
   </p:cSld>
   <p:clrMapOvr>
     <a:masterClrMapping/>
@@ -3931,8 +4154,8 @@
         </p:nvSpPr>
         <p:spPr>
           <a:xfrm>
-            <a:off x="1772179" y="2658533"/>
-            <a:ext cx="4607188" cy="576262"/>
+            <a:off x="1329481" y="2658533"/>
+            <a:ext cx="3456291" cy="576262"/>
           </a:xfrm>
         </p:spPr>
         <p:txBody>
@@ -4004,8 +4227,8 @@
         </p:nvSpPr>
         <p:spPr>
           <a:xfrm>
-            <a:off x="1484311" y="3335337"/>
-            <a:ext cx="4895056" cy="2455862"/>
+            <a:off x="1113523" y="3335336"/>
+            <a:ext cx="3672248" cy="2665259"/>
           </a:xfrm>
         </p:spPr>
         <p:txBody>
@@ -4091,8 +4314,8 @@
         </p:nvSpPr>
         <p:spPr>
           <a:xfrm>
-            <a:off x="6880487" y="2667000"/>
-            <a:ext cx="4622537" cy="576262"/>
+            <a:off x="5161710" y="2667000"/>
+            <a:ext cx="3467806" cy="576262"/>
           </a:xfrm>
         </p:spPr>
         <p:txBody>
@@ -4164,8 +4387,8 @@
         </p:nvSpPr>
         <p:spPr>
           <a:xfrm>
-            <a:off x="6607967" y="3335337"/>
-            <a:ext cx="4895056" cy="2455862"/>
+            <a:off x="4957266" y="3335336"/>
+            <a:ext cx="3672248" cy="2665259"/>
           </a:xfrm>
         </p:spPr>
         <p:txBody>
@@ -4255,9 +4478,9 @@
           <a:lstStyle/>
           <a:p>
             <a:fld id="{B61BEF0D-F0BB-DE4B-95CE-6DB70DBA9567}" type="datetimeFigureOut">
-              <a:rPr lang="en-US" dirty="0"/>
+              <a:rPr lang="en-US" smtClean="0"/>
               <a:pPr/>
-              <a:t>5/2/2014</a:t>
+              <a:t>5/6/2014</a:t>
             </a:fld>
             <a:endParaRPr lang="en-US" dirty="0"/>
           </a:p>
@@ -4298,7 +4521,7 @@
           <a:lstStyle/>
           <a:p>
             <a:fld id="{D57F1E4F-1CFF-5643-939E-217C01CDF565}" type="slidenum">
-              <a:rPr lang="en-US" dirty="0"/>
+              <a:rPr lang="en-US" smtClean="0"/>
               <a:pPr/>
               <a:t>‹#›</a:t>
             </a:fld>
@@ -4307,6 +4530,11 @@
         </p:txBody>
       </p:sp>
     </p:spTree>
+    <p:extLst>
+      <p:ext uri="{BB962C8B-B14F-4D97-AF65-F5344CB8AC3E}">
+        <p14:creationId xmlns:p14="http://schemas.microsoft.com/office/powerpoint/2010/main" val="3178302943"/>
+      </p:ext>
+    </p:extLst>
   </p:cSld>
   <p:clrMapOvr>
     <a:masterClrMapping/>
@@ -4370,9 +4598,9 @@
           <a:lstStyle/>
           <a:p>
             <a:fld id="{B61BEF0D-F0BB-DE4B-95CE-6DB70DBA9567}" type="datetimeFigureOut">
-              <a:rPr lang="en-US" dirty="0"/>
+              <a:rPr lang="en-US" smtClean="0"/>
               <a:pPr/>
-              <a:t>5/2/2014</a:t>
+              <a:t>5/6/2014</a:t>
             </a:fld>
             <a:endParaRPr lang="en-US" dirty="0"/>
           </a:p>
@@ -4413,7 +4641,7 @@
           <a:lstStyle/>
           <a:p>
             <a:fld id="{D57F1E4F-1CFF-5643-939E-217C01CDF565}" type="slidenum">
-              <a:rPr lang="en-US" dirty="0"/>
+              <a:rPr lang="en-US" smtClean="0"/>
               <a:pPr/>
               <a:t>‹#›</a:t>
             </a:fld>
@@ -4422,6 +4650,11 @@
         </p:txBody>
       </p:sp>
     </p:spTree>
+    <p:extLst>
+      <p:ext uri="{BB962C8B-B14F-4D97-AF65-F5344CB8AC3E}">
+        <p14:creationId xmlns:p14="http://schemas.microsoft.com/office/powerpoint/2010/main" val="1598489277"/>
+      </p:ext>
+    </p:extLst>
   </p:cSld>
   <p:clrMapOvr>
     <a:masterClrMapping/>
@@ -4462,9 +4695,9 @@
           <a:lstStyle/>
           <a:p>
             <a:fld id="{B61BEF0D-F0BB-DE4B-95CE-6DB70DBA9567}" type="datetimeFigureOut">
-              <a:rPr lang="en-US" dirty="0"/>
+              <a:rPr lang="en-US" smtClean="0"/>
               <a:pPr/>
-              <a:t>5/2/2014</a:t>
+              <a:t>5/6/2014</a:t>
             </a:fld>
             <a:endParaRPr lang="en-US" dirty="0"/>
           </a:p>
@@ -4505,7 +4738,7 @@
           <a:lstStyle/>
           <a:p>
             <a:fld id="{D57F1E4F-1CFF-5643-939E-217C01CDF565}" type="slidenum">
-              <a:rPr lang="en-US" dirty="0"/>
+              <a:rPr lang="en-US" smtClean="0"/>
               <a:pPr/>
               <a:t>‹#›</a:t>
             </a:fld>
@@ -4514,6 +4747,11 @@
         </p:txBody>
       </p:sp>
     </p:spTree>
+    <p:extLst>
+      <p:ext uri="{BB962C8B-B14F-4D97-AF65-F5344CB8AC3E}">
+        <p14:creationId xmlns:p14="http://schemas.microsoft.com/office/powerpoint/2010/main" val="780724408"/>
+      </p:ext>
+    </p:extLst>
   </p:cSld>
   <p:clrMapOvr>
     <a:masterClrMapping/>
@@ -4550,8 +4788,8 @@
         </p:nvSpPr>
         <p:spPr>
           <a:xfrm>
-            <a:off x="1484312" y="1600200"/>
-            <a:ext cx="3549121" cy="1371600"/>
+            <a:off x="1113524" y="1600200"/>
+            <a:ext cx="2662534" cy="1371600"/>
           </a:xfrm>
         </p:spPr>
         <p:txBody>
@@ -4584,8 +4822,8 @@
         </p:nvSpPr>
         <p:spPr>
           <a:xfrm>
-            <a:off x="5262033" y="685799"/>
-            <a:ext cx="6240990" cy="5105401"/>
+            <a:off x="3947553" y="685800"/>
+            <a:ext cx="4681962" cy="5105401"/>
           </a:xfrm>
         </p:spPr>
         <p:txBody>
@@ -4671,8 +4909,8 @@
         </p:nvSpPr>
         <p:spPr>
           <a:xfrm>
-            <a:off x="1484312" y="2971800"/>
-            <a:ext cx="3549121" cy="1828800"/>
+            <a:off x="1113524" y="2971800"/>
+            <a:ext cx="2662534" cy="1828800"/>
           </a:xfrm>
         </p:spPr>
         <p:txBody>
@@ -4742,9 +4980,9 @@
           <a:lstStyle/>
           <a:p>
             <a:fld id="{B61BEF0D-F0BB-DE4B-95CE-6DB70DBA9567}" type="datetimeFigureOut">
-              <a:rPr lang="en-US" dirty="0"/>
+              <a:rPr lang="en-US" smtClean="0"/>
               <a:pPr/>
-              <a:t>5/2/2014</a:t>
+              <a:t>5/6/2014</a:t>
             </a:fld>
             <a:endParaRPr lang="en-US" dirty="0"/>
           </a:p>
@@ -4785,7 +5023,7 @@
           <a:lstStyle/>
           <a:p>
             <a:fld id="{D57F1E4F-1CFF-5643-939E-217C01CDF565}" type="slidenum">
-              <a:rPr lang="en-US" dirty="0"/>
+              <a:rPr lang="en-US" smtClean="0"/>
               <a:pPr/>
               <a:t>‹#›</a:t>
             </a:fld>
@@ -4794,6 +5032,11 @@
         </p:txBody>
       </p:sp>
     </p:spTree>
+    <p:extLst>
+      <p:ext uri="{BB962C8B-B14F-4D97-AF65-F5344CB8AC3E}">
+        <p14:creationId xmlns:p14="http://schemas.microsoft.com/office/powerpoint/2010/main" val="3935668395"/>
+      </p:ext>
+    </p:extLst>
   </p:cSld>
   <p:clrMapOvr>
     <a:masterClrMapping/>
@@ -4830,8 +5073,8 @@
         </p:nvSpPr>
         <p:spPr>
           <a:xfrm>
-            <a:off x="1482724" y="1752599"/>
-            <a:ext cx="5426158" cy="1371600"/>
+            <a:off x="1112332" y="1752599"/>
+            <a:ext cx="4070679" cy="1371600"/>
           </a:xfrm>
         </p:spPr>
         <p:txBody>
@@ -4864,8 +5107,8 @@
         </p:nvSpPr>
         <p:spPr>
           <a:xfrm>
-            <a:off x="7594682" y="914400"/>
-            <a:ext cx="3280974" cy="4572000"/>
+            <a:off x="5697495" y="914400"/>
+            <a:ext cx="2461371" cy="4572000"/>
           </a:xfrm>
           <a:prstGeom prst="roundRect">
             <a:avLst>
@@ -4959,8 +5202,8 @@
         </p:nvSpPr>
         <p:spPr>
           <a:xfrm>
-            <a:off x="1482724" y="3124199"/>
-            <a:ext cx="5426158" cy="1828800"/>
+            <a:off x="1112332" y="3124199"/>
+            <a:ext cx="4070679" cy="1828800"/>
           </a:xfrm>
         </p:spPr>
         <p:txBody>
@@ -5030,9 +5273,9 @@
           <a:lstStyle/>
           <a:p>
             <a:fld id="{B61BEF0D-F0BB-DE4B-95CE-6DB70DBA9567}" type="datetimeFigureOut">
-              <a:rPr lang="en-US" dirty="0"/>
+              <a:rPr lang="en-US" smtClean="0"/>
               <a:pPr/>
-              <a:t>5/2/2014</a:t>
+              <a:t>5/6/2014</a:t>
             </a:fld>
             <a:endParaRPr lang="en-US" dirty="0"/>
           </a:p>
@@ -5073,7 +5316,7 @@
           <a:lstStyle/>
           <a:p>
             <a:fld id="{D57F1E4F-1CFF-5643-939E-217C01CDF565}" type="slidenum">
-              <a:rPr lang="en-US" dirty="0"/>
+              <a:rPr lang="en-US" smtClean="0"/>
               <a:pPr/>
               <a:t>‹#›</a:t>
             </a:fld>
@@ -5082,6 +5325,11 @@
         </p:txBody>
       </p:sp>
     </p:spTree>
+    <p:extLst>
+      <p:ext uri="{BB962C8B-B14F-4D97-AF65-F5344CB8AC3E}">
+        <p14:creationId xmlns:p14="http://schemas.microsoft.com/office/powerpoint/2010/main" val="2218148649"/>
+      </p:ext>
+    </p:extLst>
   </p:cSld>
   <p:clrMapOvr>
     <a:masterClrMapping/>
@@ -5113,28 +5361,28 @@
       </p:grpSpPr>
       <p:grpSp>
         <p:nvGrpSpPr>
-          <p:cNvPr id="7" name="Group 6"/>
+          <p:cNvPr id="14" name="Group 13"/>
           <p:cNvGrpSpPr/>
           <p:nvPr/>
         </p:nvGrpSpPr>
         <p:grpSpPr>
           <a:xfrm>
-            <a:off x="150812" y="0"/>
-            <a:ext cx="2436813" cy="6858001"/>
-            <a:chOff x="1320800" y="0"/>
-            <a:chExt cx="2436813" cy="6858001"/>
+            <a:off x="0" y="0"/>
+            <a:ext cx="2132013" cy="6858001"/>
+            <a:chOff x="0" y="0"/>
+            <a:chExt cx="2132013" cy="6858001"/>
           </a:xfrm>
         </p:grpSpPr>
         <p:sp>
           <p:nvSpPr>
-            <p:cNvPr id="8" name="Freeform 6"/>
+            <p:cNvPr id="15" name="Freeform 6"/>
             <p:cNvSpPr/>
             <p:nvPr/>
           </p:nvSpPr>
           <p:spPr bwMode="auto">
             <a:xfrm>
-              <a:off x="1627188" y="0"/>
-              <a:ext cx="1122363" cy="5329238"/>
+              <a:off x="0" y="0"/>
+              <a:ext cx="1073150" cy="5291138"/>
             </a:xfrm>
             <a:custGeom>
               <a:avLst/>
@@ -5143,21 +5391,24 @@
               <a:cxnLst/>
               <a:rect l="0" t="0" r="r" b="b"/>
               <a:pathLst>
-                <a:path w="707" h="3357">
+                <a:path w="676" h="3333">
                   <a:moveTo>
-                    <a:pt x="0" y="3330"/>
+                    <a:pt x="0" y="3132"/>
                   </a:moveTo>
                   <a:lnTo>
-                    <a:pt x="156" y="3357"/>
+                    <a:pt x="0" y="3312"/>
                   </a:lnTo>
                   <a:lnTo>
-                    <a:pt x="707" y="0"/>
+                    <a:pt x="126" y="3333"/>
                   </a:lnTo>
                   <a:lnTo>
-                    <a:pt x="547" y="0"/>
+                    <a:pt x="676" y="0"/>
                   </a:lnTo>
                   <a:lnTo>
-                    <a:pt x="0" y="3330"/>
+                    <a:pt x="514" y="0"/>
+                  </a:lnTo>
+                  <a:lnTo>
+                    <a:pt x="0" y="3132"/>
                   </a:lnTo>
                   <a:close/>
                 </a:path>
@@ -5173,14 +5424,14 @@
         </p:sp>
         <p:sp>
           <p:nvSpPr>
-            <p:cNvPr id="9" name="Freeform 7"/>
+            <p:cNvPr id="16" name="Freeform 7"/>
             <p:cNvSpPr/>
             <p:nvPr/>
           </p:nvSpPr>
           <p:spPr bwMode="auto">
             <a:xfrm>
-              <a:off x="1320800" y="0"/>
-              <a:ext cx="1117600" cy="5276850"/>
+              <a:off x="0" y="0"/>
+              <a:ext cx="758825" cy="4624388"/>
             </a:xfrm>
             <a:custGeom>
               <a:avLst/>
@@ -5189,21 +5440,21 @@
               <a:cxnLst/>
               <a:rect l="0" t="0" r="r" b="b"/>
               <a:pathLst>
-                <a:path w="704" h="3324">
+                <a:path w="478" h="2913">
                   <a:moveTo>
-                    <a:pt x="704" y="0"/>
+                    <a:pt x="478" y="0"/>
                   </a:moveTo>
                   <a:lnTo>
-                    <a:pt x="545" y="0"/>
+                    <a:pt x="318" y="0"/>
                   </a:lnTo>
                   <a:lnTo>
-                    <a:pt x="0" y="3300"/>
+                    <a:pt x="0" y="1938"/>
                   </a:lnTo>
                   <a:lnTo>
-                    <a:pt x="157" y="3324"/>
+                    <a:pt x="0" y="2913"/>
                   </a:lnTo>
                   <a:lnTo>
-                    <a:pt x="704" y="0"/>
+                    <a:pt x="478" y="0"/>
                   </a:lnTo>
                   <a:close/>
                 </a:path>
@@ -5222,14 +5473,14 @@
         </p:sp>
         <p:sp>
           <p:nvSpPr>
-            <p:cNvPr id="10" name="Freeform 8"/>
+            <p:cNvPr id="17" name="Freeform 8"/>
             <p:cNvSpPr/>
             <p:nvPr/>
           </p:nvSpPr>
           <p:spPr bwMode="auto">
             <a:xfrm>
-              <a:off x="1320800" y="5238750"/>
-              <a:ext cx="1228725" cy="1619250"/>
+              <a:off x="0" y="5662613"/>
+              <a:ext cx="906463" cy="1195388"/>
             </a:xfrm>
             <a:custGeom>
               <a:avLst/>
@@ -5238,15 +5489,18 @@
               <a:cxnLst/>
               <a:rect l="0" t="0" r="r" b="b"/>
               <a:pathLst>
-                <a:path w="774" h="1020">
+                <a:path w="571" h="753">
                   <a:moveTo>
                     <a:pt x="0" y="0"/>
                   </a:moveTo>
                   <a:lnTo>
-                    <a:pt x="740" y="1020"/>
+                    <a:pt x="0" y="12"/>
                   </a:lnTo>
                   <a:lnTo>
-                    <a:pt x="774" y="1020"/>
+                    <a:pt x="538" y="753"/>
+                  </a:lnTo>
+                  <a:lnTo>
+                    <a:pt x="571" y="753"/>
                   </a:lnTo>
                   <a:lnTo>
                     <a:pt x="0" y="0"/>
@@ -5268,14 +5522,14 @@
         </p:sp>
         <p:sp>
           <p:nvSpPr>
-            <p:cNvPr id="11" name="Freeform 9"/>
+            <p:cNvPr id="18" name="Freeform 9"/>
             <p:cNvSpPr/>
             <p:nvPr/>
           </p:nvSpPr>
           <p:spPr bwMode="auto">
             <a:xfrm>
-              <a:off x="1627188" y="5291138"/>
-              <a:ext cx="1495425" cy="1566863"/>
+              <a:off x="0" y="5295900"/>
+              <a:ext cx="1487488" cy="1562100"/>
             </a:xfrm>
             <a:custGeom>
               <a:avLst/>
@@ -5284,15 +5538,18 @@
               <a:cxnLst/>
               <a:rect l="0" t="0" r="r" b="b"/>
               <a:pathLst>
-                <a:path w="942" h="987">
+                <a:path w="937" h="984">
                   <a:moveTo>
                     <a:pt x="0" y="0"/>
                   </a:moveTo>
                   <a:lnTo>
-                    <a:pt x="909" y="987"/>
+                    <a:pt x="0" y="3"/>
                   </a:lnTo>
                   <a:lnTo>
-                    <a:pt x="942" y="987"/>
+                    <a:pt x="901" y="984"/>
+                  </a:lnTo>
+                  <a:lnTo>
+                    <a:pt x="937" y="984"/>
                   </a:lnTo>
                   <a:lnTo>
                     <a:pt x="0" y="0"/>
@@ -5313,14 +5570,14 @@
         </p:sp>
         <p:sp>
           <p:nvSpPr>
-            <p:cNvPr id="12" name="Freeform 10"/>
+            <p:cNvPr id="19" name="Freeform 10"/>
             <p:cNvSpPr/>
             <p:nvPr/>
           </p:nvSpPr>
           <p:spPr bwMode="auto">
             <a:xfrm>
-              <a:off x="1627188" y="5286375"/>
-              <a:ext cx="2130425" cy="1571625"/>
+              <a:off x="0" y="5257800"/>
+              <a:ext cx="2132013" cy="1600200"/>
             </a:xfrm>
             <a:custGeom>
               <a:avLst/>
@@ -5329,24 +5586,24 @@
               <a:cxnLst/>
               <a:rect l="0" t="0" r="r" b="b"/>
               <a:pathLst>
-                <a:path w="1342" h="990">
+                <a:path w="1343" h="1008">
                   <a:moveTo>
-                    <a:pt x="0" y="3"/>
+                    <a:pt x="0" y="24"/>
                   </a:moveTo>
                   <a:lnTo>
-                    <a:pt x="942" y="990"/>
+                    <a:pt x="937" y="1008"/>
                   </a:lnTo>
                   <a:lnTo>
-                    <a:pt x="1342" y="990"/>
+                    <a:pt x="1343" y="1008"/>
                   </a:lnTo>
                   <a:lnTo>
-                    <a:pt x="156" y="27"/>
+                    <a:pt x="126" y="21"/>
                   </a:lnTo>
                   <a:lnTo>
                     <a:pt x="0" y="0"/>
                   </a:lnTo>
                   <a:lnTo>
-                    <a:pt x="0" y="3"/>
+                    <a:pt x="0" y="24"/>
                   </a:lnTo>
                   <a:close/>
                 </a:path>
@@ -5364,14 +5621,14 @@
         </p:sp>
         <p:sp>
           <p:nvSpPr>
-            <p:cNvPr id="13" name="Freeform 11"/>
+            <p:cNvPr id="20" name="Freeform 11"/>
             <p:cNvSpPr/>
             <p:nvPr/>
           </p:nvSpPr>
           <p:spPr bwMode="auto">
             <a:xfrm>
-              <a:off x="1320800" y="5238750"/>
-              <a:ext cx="1695450" cy="1619250"/>
+              <a:off x="0" y="5357813"/>
+              <a:ext cx="1377950" cy="1500188"/>
             </a:xfrm>
             <a:custGeom>
               <a:avLst/>
@@ -5380,36 +5637,21 @@
               <a:cxnLst/>
               <a:rect l="0" t="0" r="r" b="b"/>
               <a:pathLst>
-                <a:path w="1068" h="1020">
+                <a:path w="868" h="945">
                   <a:moveTo>
-                    <a:pt x="1068" y="1020"/>
+                    <a:pt x="0" y="192"/>
                   </a:moveTo>
                   <a:lnTo>
-                    <a:pt x="184" y="60"/>
+                    <a:pt x="571" y="945"/>
                   </a:lnTo>
                   <a:lnTo>
-                    <a:pt x="154" y="27"/>
-                  </a:lnTo>
-                  <a:lnTo>
-                    <a:pt x="157" y="27"/>
-                  </a:lnTo>
-                  <a:lnTo>
-                    <a:pt x="157" y="24"/>
-                  </a:lnTo>
-                  <a:lnTo>
-                    <a:pt x="154" y="24"/>
+                    <a:pt x="868" y="945"/>
                   </a:lnTo>
                   <a:lnTo>
                     <a:pt x="0" y="0"/>
                   </a:lnTo>
                   <a:lnTo>
-                    <a:pt x="0" y="0"/>
-                  </a:lnTo>
-                  <a:lnTo>
-                    <a:pt x="774" y="1020"/>
-                  </a:lnTo>
-                  <a:lnTo>
-                    <a:pt x="1068" y="1020"/>
+                    <a:pt x="0" y="192"/>
                   </a:lnTo>
                   <a:close/>
                 </a:path>
@@ -5439,8 +5681,8 @@
         </p:nvSpPr>
         <p:spPr>
           <a:xfrm>
-            <a:off x="1484311" y="685800"/>
-            <a:ext cx="10018713" cy="1752599"/>
+            <a:off x="982133" y="457201"/>
+            <a:ext cx="7704667" cy="1981200"/>
           </a:xfrm>
           <a:prstGeom prst="rect">
             <a:avLst/>
@@ -5473,8 +5715,8 @@
         </p:nvSpPr>
         <p:spPr>
           <a:xfrm>
-            <a:off x="1484310" y="2666999"/>
-            <a:ext cx="10018713" cy="3124201"/>
+            <a:off x="982134" y="2667000"/>
+            <a:ext cx="7704666" cy="3356995"/>
           </a:xfrm>
           <a:prstGeom prst="rect">
             <a:avLst/>
@@ -5535,8 +5777,8 @@
         </p:nvSpPr>
         <p:spPr>
           <a:xfrm>
-            <a:off x="9732656" y="5883275"/>
-            <a:ext cx="1143000" cy="365125"/>
+            <a:off x="7358679" y="6116070"/>
+            <a:ext cx="857473" cy="365125"/>
           </a:xfrm>
           <a:prstGeom prst="rect">
             <a:avLst/>
@@ -5557,9 +5799,9 @@
           </a:lstStyle>
           <a:p>
             <a:fld id="{B61BEF0D-F0BB-DE4B-95CE-6DB70DBA9567}" type="datetimeFigureOut">
-              <a:rPr lang="en-US" dirty="0"/>
+              <a:rPr lang="en-US" smtClean="0"/>
               <a:pPr/>
-              <a:t>5/2/2014</a:t>
+              <a:t>5/6/2014</a:t>
             </a:fld>
             <a:endParaRPr lang="en-US" dirty="0"/>
           </a:p>
@@ -5577,8 +5819,8 @@
         </p:nvSpPr>
         <p:spPr>
           <a:xfrm>
-            <a:off x="2572279" y="5883275"/>
-            <a:ext cx="7084177" cy="365125"/>
+            <a:off x="1986997" y="6116070"/>
+            <a:ext cx="5314517" cy="365125"/>
           </a:xfrm>
           <a:prstGeom prst="rect">
             <a:avLst/>
@@ -5614,8 +5856,8 @@
         </p:nvSpPr>
         <p:spPr>
           <a:xfrm>
-            <a:off x="10951856" y="5883275"/>
-            <a:ext cx="551167" cy="365125"/>
+            <a:off x="8273317" y="6116070"/>
+            <a:ext cx="413483" cy="365125"/>
           </a:xfrm>
           <a:prstGeom prst="rect">
             <a:avLst/>
@@ -5636,7 +5878,7 @@
           </a:lstStyle>
           <a:p>
             <a:fld id="{D57F1E4F-1CFF-5643-939E-217C01CDF565}" type="slidenum">
-              <a:rPr lang="en-US" dirty="0"/>
+              <a:rPr lang="en-US" smtClean="0"/>
               <a:pPr/>
               <a:t>‹#›</a:t>
             </a:fld>
@@ -5645,26 +5887,31 @@
         </p:txBody>
       </p:sp>
     </p:spTree>
+    <p:extLst>
+      <p:ext uri="{BB962C8B-B14F-4D97-AF65-F5344CB8AC3E}">
+        <p14:creationId xmlns:p14="http://schemas.microsoft.com/office/powerpoint/2010/main" val="2907623968"/>
+      </p:ext>
+    </p:extLst>
   </p:cSld>
   <p:clrMap bg1="lt1" tx1="dk1" bg2="lt2" tx2="dk2" accent1="accent1" accent2="accent2" accent3="accent3" accent4="accent4" accent5="accent5" accent6="accent6" hlink="hlink" folHlink="folHlink"/>
   <p:sldLayoutIdLst>
-    <p:sldLayoutId id="2147483649" r:id="rId1"/>
-    <p:sldLayoutId id="2147483650" r:id="rId2"/>
-    <p:sldLayoutId id="2147483651" r:id="rId3"/>
-    <p:sldLayoutId id="2147483652" r:id="rId4"/>
-    <p:sldLayoutId id="2147483653" r:id="rId5"/>
-    <p:sldLayoutId id="2147483654" r:id="rId6"/>
-    <p:sldLayoutId id="2147483655" r:id="rId7"/>
-    <p:sldLayoutId id="2147483656" r:id="rId8"/>
-    <p:sldLayoutId id="2147483660" r:id="rId9"/>
-    <p:sldLayoutId id="2147483657" r:id="rId10"/>
-    <p:sldLayoutId id="2147483663" r:id="rId11"/>
-    <p:sldLayoutId id="2147483664" r:id="rId12"/>
-    <p:sldLayoutId id="2147483665" r:id="rId13"/>
-    <p:sldLayoutId id="2147483666" r:id="rId14"/>
-    <p:sldLayoutId id="2147483667" r:id="rId15"/>
-    <p:sldLayoutId id="2147483658" r:id="rId16"/>
-    <p:sldLayoutId id="2147483659" r:id="rId17"/>
+    <p:sldLayoutId id="2147483669" r:id="rId1"/>
+    <p:sldLayoutId id="2147483670" r:id="rId2"/>
+    <p:sldLayoutId id="2147483671" r:id="rId3"/>
+    <p:sldLayoutId id="2147483672" r:id="rId4"/>
+    <p:sldLayoutId id="2147483673" r:id="rId5"/>
+    <p:sldLayoutId id="2147483674" r:id="rId6"/>
+    <p:sldLayoutId id="2147483675" r:id="rId7"/>
+    <p:sldLayoutId id="2147483676" r:id="rId8"/>
+    <p:sldLayoutId id="2147483677" r:id="rId9"/>
+    <p:sldLayoutId id="2147483678" r:id="rId10"/>
+    <p:sldLayoutId id="2147483679" r:id="rId11"/>
+    <p:sldLayoutId id="2147483680" r:id="rId12"/>
+    <p:sldLayoutId id="2147483681" r:id="rId13"/>
+    <p:sldLayoutId id="2147483682" r:id="rId14"/>
+    <p:sldLayoutId id="2147483683" r:id="rId15"/>
+    <p:sldLayoutId id="2147483684" r:id="rId16"/>
+    <p:sldLayoutId id="2147483685" r:id="rId17"/>
   </p:sldLayoutIdLst>
   <p:txStyles>
     <p:titleStyle>
@@ -6099,7 +6346,7 @@
         <p:spPr/>
         <p:txBody>
           <a:bodyPr>
-            <a:normAutofit fontScale="90000"/>
+            <a:normAutofit/>
           </a:bodyPr>
           <a:lstStyle/>
           <a:p>
@@ -6137,8 +6384,8 @@
         </p:nvSpPr>
         <p:spPr>
           <a:xfrm>
-            <a:off x="4515377" y="4720167"/>
-            <a:ext cx="6987645" cy="1388534"/>
+            <a:off x="2991379" y="4720167"/>
+            <a:ext cx="5695422" cy="1388534"/>
           </a:xfrm>
         </p:spPr>
         <p:txBody>
@@ -6203,7 +6450,7 @@
 </p:sld>
 </file>
 
-<file path=ppt/slides/slide2.xml><?xml version="1.0" encoding="utf-8"?>
+<file path=ppt/slides/slide10.xml><?xml version="1.0" encoding="utf-8"?>
 <p:sld xmlns:a="http://schemas.openxmlformats.org/drawingml/2006/main" xmlns:r="http://schemas.openxmlformats.org/officeDocument/2006/relationships" xmlns:p="http://schemas.openxmlformats.org/presentationml/2006/main">
   <p:cSld>
     <p:spTree>
@@ -6237,439 +6484,6 @@
           <a:p>
             <a:r>
               <a:rPr lang="en-US" dirty="0" smtClean="0"/>
-              <a:t>Design</a:t>
-            </a:r>
-            <a:endParaRPr lang="en-US" dirty="0"/>
-          </a:p>
-        </p:txBody>
-      </p:sp>
-      <p:graphicFrame>
-        <p:nvGraphicFramePr>
-          <p:cNvPr id="4" name="Object 3"/>
-          <p:cNvGraphicFramePr>
-            <a:graphicFrameLocks noChangeAspect="1"/>
-          </p:cNvGraphicFramePr>
-          <p:nvPr>
-            <p:extLst>
-              <p:ext uri="{D42A27DB-BD31-4B8C-83A1-F6EECF244321}">
-                <p14:modId xmlns:p14="http://schemas.microsoft.com/office/powerpoint/2010/main" val="611458238"/>
-              </p:ext>
-            </p:extLst>
-          </p:nvPr>
-        </p:nvGraphicFramePr>
-        <p:xfrm>
-          <a:off x="2793257" y="2022702"/>
-          <a:ext cx="7400820" cy="4436155"/>
-        </p:xfrm>
-        <a:graphic>
-          <a:graphicData uri="http://schemas.openxmlformats.org/presentationml/2006/ole">
-            <mc:AlternateContent xmlns:mc="http://schemas.openxmlformats.org/markup-compatibility/2006">
-              <mc:Choice xmlns:v="urn:schemas-microsoft-com:vml" Requires="v">
-                <p:oleObj spid="_x0000_s1030" name="Image" r:id="rId3" imgW="21333240" imgH="12787200" progId="Photoshop.Image.13">
-                  <p:embed/>
-                </p:oleObj>
-              </mc:Choice>
-              <mc:Fallback>
-                <p:oleObj name="Image" r:id="rId3" imgW="21333240" imgH="12787200" progId="Photoshop.Image.13">
-                  <p:embed/>
-                  <p:pic>
-                    <p:nvPicPr>
-                      <p:cNvPr id="0" name=""/>
-                      <p:cNvPicPr/>
-                      <p:nvPr/>
-                    </p:nvPicPr>
-                    <p:blipFill>
-                      <a:blip r:embed="rId4"/>
-                      <a:stretch>
-                        <a:fillRect/>
-                      </a:stretch>
-                    </p:blipFill>
-                    <p:spPr>
-                      <a:xfrm>
-                        <a:off x="2793257" y="2022702"/>
-                        <a:ext cx="7400820" cy="4436155"/>
-                      </a:xfrm>
-                      <a:prstGeom prst="rect">
-                        <a:avLst/>
-                      </a:prstGeom>
-                    </p:spPr>
-                  </p:pic>
-                </p:oleObj>
-              </mc:Fallback>
-            </mc:AlternateContent>
-          </a:graphicData>
-        </a:graphic>
-      </p:graphicFrame>
-    </p:spTree>
-    <p:extLst>
-      <p:ext uri="{BB962C8B-B14F-4D97-AF65-F5344CB8AC3E}">
-        <p14:creationId xmlns:p14="http://schemas.microsoft.com/office/powerpoint/2010/main" val="1953110351"/>
-      </p:ext>
-    </p:extLst>
-  </p:cSld>
-  <p:clrMapOvr>
-    <a:masterClrMapping/>
-  </p:clrMapOvr>
-  <p:timing>
-    <p:tnLst>
-      <p:par>
-        <p:cTn id="1" dur="indefinite" restart="never" nodeType="tmRoot"/>
-      </p:par>
-    </p:tnLst>
-  </p:timing>
-</p:sld>
-</file>
-
-<file path=ppt/slides/slide3.xml><?xml version="1.0" encoding="utf-8"?>
-<p:sld xmlns:a="http://schemas.openxmlformats.org/drawingml/2006/main" xmlns:r="http://schemas.openxmlformats.org/officeDocument/2006/relationships" xmlns:p="http://schemas.openxmlformats.org/presentationml/2006/main">
-  <p:cSld>
-    <p:spTree>
-      <p:nvGrpSpPr>
-        <p:cNvPr id="1" name=""/>
-        <p:cNvGrpSpPr/>
-        <p:nvPr/>
-      </p:nvGrpSpPr>
-      <p:grpSpPr>
-        <a:xfrm>
-          <a:off x="0" y="0"/>
-          <a:ext cx="0" cy="0"/>
-          <a:chOff x="0" y="0"/>
-          <a:chExt cx="0" cy="0"/>
-        </a:xfrm>
-      </p:grpSpPr>
-      <p:sp>
-        <p:nvSpPr>
-          <p:cNvPr id="2" name="Title 1"/>
-          <p:cNvSpPr>
-            <a:spLocks noGrp="1"/>
-          </p:cNvSpPr>
-          <p:nvPr>
-            <p:ph type="title"/>
-          </p:nvPr>
-        </p:nvSpPr>
-        <p:spPr/>
-        <p:txBody>
-          <a:bodyPr/>
-          <a:lstStyle/>
-          <a:p>
-            <a:r>
-              <a:rPr lang="en-US" dirty="0" smtClean="0"/>
-              <a:t>Model View Controller</a:t>
-            </a:r>
-            <a:endParaRPr lang="en-US" dirty="0"/>
-          </a:p>
-        </p:txBody>
-      </p:sp>
-      <p:sp>
-        <p:nvSpPr>
-          <p:cNvPr id="3" name="Content Placeholder 2"/>
-          <p:cNvSpPr>
-            <a:spLocks noGrp="1"/>
-          </p:cNvSpPr>
-          <p:nvPr>
-            <p:ph idx="1"/>
-          </p:nvPr>
-        </p:nvSpPr>
-        <p:spPr/>
-        <p:txBody>
-          <a:bodyPr/>
-          <a:lstStyle/>
-          <a:p>
-            <a:endParaRPr lang="en-US"/>
-          </a:p>
-        </p:txBody>
-      </p:sp>
-    </p:spTree>
-    <p:extLst>
-      <p:ext uri="{BB962C8B-B14F-4D97-AF65-F5344CB8AC3E}">
-        <p14:creationId xmlns:p14="http://schemas.microsoft.com/office/powerpoint/2010/main" val="2077223260"/>
-      </p:ext>
-    </p:extLst>
-  </p:cSld>
-  <p:clrMapOvr>
-    <a:masterClrMapping/>
-  </p:clrMapOvr>
-</p:sld>
-</file>
-
-<file path=ppt/slides/slide4.xml><?xml version="1.0" encoding="utf-8"?>
-<p:sld xmlns:a="http://schemas.openxmlformats.org/drawingml/2006/main" xmlns:r="http://schemas.openxmlformats.org/officeDocument/2006/relationships" xmlns:p="http://schemas.openxmlformats.org/presentationml/2006/main">
-  <p:cSld>
-    <p:spTree>
-      <p:nvGrpSpPr>
-        <p:cNvPr id="1" name=""/>
-        <p:cNvGrpSpPr/>
-        <p:nvPr/>
-      </p:nvGrpSpPr>
-      <p:grpSpPr>
-        <a:xfrm>
-          <a:off x="0" y="0"/>
-          <a:ext cx="0" cy="0"/>
-          <a:chOff x="0" y="0"/>
-          <a:chExt cx="0" cy="0"/>
-        </a:xfrm>
-      </p:grpSpPr>
-      <p:sp>
-        <p:nvSpPr>
-          <p:cNvPr id="2" name="Title 1"/>
-          <p:cNvSpPr>
-            <a:spLocks noGrp="1"/>
-          </p:cNvSpPr>
-          <p:nvPr>
-            <p:ph type="title"/>
-          </p:nvPr>
-        </p:nvSpPr>
-        <p:spPr/>
-        <p:txBody>
-          <a:bodyPr/>
-          <a:lstStyle/>
-          <a:p>
-            <a:r>
-              <a:rPr lang="en-US" dirty="0" smtClean="0"/>
-              <a:t>Structure</a:t>
-            </a:r>
-            <a:endParaRPr lang="en-US" dirty="0"/>
-          </a:p>
-        </p:txBody>
-      </p:sp>
-      <p:graphicFrame>
-        <p:nvGraphicFramePr>
-          <p:cNvPr id="4" name="Object 3"/>
-          <p:cNvGraphicFramePr>
-            <a:graphicFrameLocks noChangeAspect="1"/>
-          </p:cNvGraphicFramePr>
-          <p:nvPr>
-            <p:extLst>
-              <p:ext uri="{D42A27DB-BD31-4B8C-83A1-F6EECF244321}">
-                <p14:modId xmlns:p14="http://schemas.microsoft.com/office/powerpoint/2010/main" val="1012237935"/>
-              </p:ext>
-            </p:extLst>
-          </p:nvPr>
-        </p:nvGraphicFramePr>
-        <p:xfrm>
-          <a:off x="2195511" y="1929720"/>
-          <a:ext cx="8596312" cy="4533900"/>
-        </p:xfrm>
-        <a:graphic>
-          <a:graphicData uri="http://schemas.openxmlformats.org/presentationml/2006/ole">
-            <mc:AlternateContent xmlns:mc="http://schemas.openxmlformats.org/markup-compatibility/2006">
-              <mc:Choice xmlns:v="urn:schemas-microsoft-com:vml" Requires="v">
-                <p:oleObj spid="_x0000_s2054" name="Image" r:id="rId3" imgW="8596800" imgH="4533120" progId="Photoshop.Image.13">
-                  <p:embed/>
-                </p:oleObj>
-              </mc:Choice>
-              <mc:Fallback>
-                <p:oleObj name="Image" r:id="rId3" imgW="8596800" imgH="4533120" progId="Photoshop.Image.13">
-                  <p:embed/>
-                  <p:pic>
-                    <p:nvPicPr>
-                      <p:cNvPr id="0" name=""/>
-                      <p:cNvPicPr/>
-                      <p:nvPr/>
-                    </p:nvPicPr>
-                    <p:blipFill>
-                      <a:blip r:embed="rId4"/>
-                      <a:stretch>
-                        <a:fillRect/>
-                      </a:stretch>
-                    </p:blipFill>
-                    <p:spPr>
-                      <a:xfrm>
-                        <a:off x="2195511" y="1929720"/>
-                        <a:ext cx="8596312" cy="4533900"/>
-                      </a:xfrm>
-                      <a:prstGeom prst="rect">
-                        <a:avLst/>
-                      </a:prstGeom>
-                      <a:ln w="12700">
-                        <a:solidFill>
-                          <a:schemeClr val="tx1"/>
-                        </a:solidFill>
-                      </a:ln>
-                    </p:spPr>
-                  </p:pic>
-                </p:oleObj>
-              </mc:Fallback>
-            </mc:AlternateContent>
-          </a:graphicData>
-        </a:graphic>
-      </p:graphicFrame>
-    </p:spTree>
-    <p:extLst>
-      <p:ext uri="{BB962C8B-B14F-4D97-AF65-F5344CB8AC3E}">
-        <p14:creationId xmlns:p14="http://schemas.microsoft.com/office/powerpoint/2010/main" val="4097840335"/>
-      </p:ext>
-    </p:extLst>
-  </p:cSld>
-  <p:clrMapOvr>
-    <a:masterClrMapping/>
-  </p:clrMapOvr>
-  <p:timing>
-    <p:tnLst>
-      <p:par>
-        <p:cTn id="1" dur="indefinite" restart="never" nodeType="tmRoot"/>
-      </p:par>
-    </p:tnLst>
-  </p:timing>
-</p:sld>
-</file>
-
-<file path=ppt/slides/slide5.xml><?xml version="1.0" encoding="utf-8"?>
-<p:sld xmlns:a="http://schemas.openxmlformats.org/drawingml/2006/main" xmlns:r="http://schemas.openxmlformats.org/officeDocument/2006/relationships" xmlns:p="http://schemas.openxmlformats.org/presentationml/2006/main">
-  <p:cSld>
-    <p:spTree>
-      <p:nvGrpSpPr>
-        <p:cNvPr id="1" name=""/>
-        <p:cNvGrpSpPr/>
-        <p:nvPr/>
-      </p:nvGrpSpPr>
-      <p:grpSpPr>
-        <a:xfrm>
-          <a:off x="0" y="0"/>
-          <a:ext cx="0" cy="0"/>
-          <a:chOff x="0" y="0"/>
-          <a:chExt cx="0" cy="0"/>
-        </a:xfrm>
-      </p:grpSpPr>
-      <p:sp>
-        <p:nvSpPr>
-          <p:cNvPr id="2" name="Title 1"/>
-          <p:cNvSpPr>
-            <a:spLocks noGrp="1"/>
-          </p:cNvSpPr>
-          <p:nvPr>
-            <p:ph type="title"/>
-          </p:nvPr>
-        </p:nvSpPr>
-        <p:spPr/>
-        <p:txBody>
-          <a:bodyPr/>
-          <a:lstStyle/>
-          <a:p>
-            <a:r>
-              <a:rPr lang="en-US" dirty="0" smtClean="0"/>
-              <a:t>Debugging</a:t>
-            </a:r>
-            <a:endParaRPr lang="en-US" dirty="0"/>
-          </a:p>
-        </p:txBody>
-      </p:sp>
-      <p:graphicFrame>
-        <p:nvGraphicFramePr>
-          <p:cNvPr id="4" name="Object 3"/>
-          <p:cNvGraphicFramePr>
-            <a:graphicFrameLocks noChangeAspect="1"/>
-          </p:cNvGraphicFramePr>
-          <p:nvPr>
-            <p:extLst>
-              <p:ext uri="{D42A27DB-BD31-4B8C-83A1-F6EECF244321}">
-                <p14:modId xmlns:p14="http://schemas.microsoft.com/office/powerpoint/2010/main" val="36510944"/>
-              </p:ext>
-            </p:extLst>
-          </p:nvPr>
-        </p:nvGraphicFramePr>
-        <p:xfrm>
-          <a:off x="2543854" y="2265136"/>
-          <a:ext cx="8128000" cy="1484313"/>
-        </p:xfrm>
-        <a:graphic>
-          <a:graphicData uri="http://schemas.openxmlformats.org/presentationml/2006/ole">
-            <mc:AlternateContent xmlns:mc="http://schemas.openxmlformats.org/markup-compatibility/2006">
-              <mc:Choice xmlns:v="urn:schemas-microsoft-com:vml" Requires="v">
-                <p:oleObj spid="_x0000_s3078" name="Image" r:id="rId3" imgW="17587080" imgH="3212640" progId="Photoshop.Image.13">
-                  <p:embed/>
-                </p:oleObj>
-              </mc:Choice>
-              <mc:Fallback>
-                <p:oleObj name="Image" r:id="rId3" imgW="17587080" imgH="3212640" progId="Photoshop.Image.13">
-                  <p:embed/>
-                  <p:pic>
-                    <p:nvPicPr>
-                      <p:cNvPr id="0" name=""/>
-                      <p:cNvPicPr/>
-                      <p:nvPr/>
-                    </p:nvPicPr>
-                    <p:blipFill>
-                      <a:blip r:embed="rId4"/>
-                      <a:stretch>
-                        <a:fillRect/>
-                      </a:stretch>
-                    </p:blipFill>
-                    <p:spPr>
-                      <a:xfrm>
-                        <a:off x="2543854" y="2265136"/>
-                        <a:ext cx="8128000" cy="1484313"/>
-                      </a:xfrm>
-                      <a:prstGeom prst="rect">
-                        <a:avLst/>
-                      </a:prstGeom>
-                      <a:ln w="12700">
-                        <a:solidFill>
-                          <a:schemeClr val="tx1"/>
-                        </a:solidFill>
-                      </a:ln>
-                    </p:spPr>
-                  </p:pic>
-                </p:oleObj>
-              </mc:Fallback>
-            </mc:AlternateContent>
-          </a:graphicData>
-        </a:graphic>
-      </p:graphicFrame>
-    </p:spTree>
-    <p:extLst>
-      <p:ext uri="{BB962C8B-B14F-4D97-AF65-F5344CB8AC3E}">
-        <p14:creationId xmlns:p14="http://schemas.microsoft.com/office/powerpoint/2010/main" val="674115664"/>
-      </p:ext>
-    </p:extLst>
-  </p:cSld>
-  <p:clrMapOvr>
-    <a:masterClrMapping/>
-  </p:clrMapOvr>
-  <p:timing>
-    <p:tnLst>
-      <p:par>
-        <p:cTn id="1" dur="indefinite" restart="never" nodeType="tmRoot"/>
-      </p:par>
-    </p:tnLst>
-  </p:timing>
-</p:sld>
-</file>
-
-<file path=ppt/slides/slide6.xml><?xml version="1.0" encoding="utf-8"?>
-<p:sld xmlns:a="http://schemas.openxmlformats.org/drawingml/2006/main" xmlns:r="http://schemas.openxmlformats.org/officeDocument/2006/relationships" xmlns:p="http://schemas.openxmlformats.org/presentationml/2006/main">
-  <p:cSld>
-    <p:spTree>
-      <p:nvGrpSpPr>
-        <p:cNvPr id="1" name=""/>
-        <p:cNvGrpSpPr/>
-        <p:nvPr/>
-      </p:nvGrpSpPr>
-      <p:grpSpPr>
-        <a:xfrm>
-          <a:off x="0" y="0"/>
-          <a:ext cx="0" cy="0"/>
-          <a:chOff x="0" y="0"/>
-          <a:chExt cx="0" cy="0"/>
-        </a:xfrm>
-      </p:grpSpPr>
-      <p:sp>
-        <p:nvSpPr>
-          <p:cNvPr id="2" name="Title 1"/>
-          <p:cNvSpPr>
-            <a:spLocks noGrp="1"/>
-          </p:cNvSpPr>
-          <p:nvPr>
-            <p:ph type="title"/>
-          </p:nvPr>
-        </p:nvSpPr>
-        <p:spPr/>
-        <p:txBody>
-          <a:bodyPr/>
-          <a:lstStyle/>
-          <a:p>
-            <a:r>
-              <a:rPr lang="en-US" dirty="0" smtClean="0"/>
               <a:t>Data</a:t>
             </a:r>
             <a:endParaRPr lang="en-US" dirty="0"/>
@@ -6691,14 +6505,14 @@
           </p:nvPr>
         </p:nvGraphicFramePr>
         <p:xfrm>
-          <a:off x="2920774" y="2058655"/>
+          <a:off x="1396774" y="2058656"/>
           <a:ext cx="2565626" cy="4519719"/>
         </p:xfrm>
         <a:graphic>
           <a:graphicData uri="http://schemas.openxmlformats.org/presentationml/2006/ole">
             <mc:AlternateContent xmlns:mc="http://schemas.openxmlformats.org/markup-compatibility/2006">
               <mc:Choice xmlns:v="urn:schemas-microsoft-com:vml" Requires="v">
-                <p:oleObj spid="_x0000_s4106" name="Image" r:id="rId3" imgW="4634640" imgH="8164800" progId="Photoshop.Image.13">
+                <p:oleObj spid="_x0000_s4108" name="Image" r:id="rId3" imgW="4634640" imgH="8164800" progId="Photoshop.Image.13">
                   <p:embed/>
                 </p:oleObj>
               </mc:Choice>
@@ -6719,7 +6533,7 @@
                     </p:blipFill>
                     <p:spPr>
                       <a:xfrm>
-                        <a:off x="2920774" y="2058655"/>
+                        <a:off x="1396774" y="2058656"/>
                         <a:ext cx="2565626" cy="4519719"/>
                       </a:xfrm>
                       <a:prstGeom prst="rect">
@@ -6753,14 +6567,14 @@
           </p:nvPr>
         </p:nvGraphicFramePr>
         <p:xfrm>
-          <a:off x="7855631" y="1160237"/>
+          <a:off x="6331632" y="1160238"/>
           <a:ext cx="1646237" cy="5418137"/>
         </p:xfrm>
         <a:graphic>
           <a:graphicData uri="http://schemas.openxmlformats.org/presentationml/2006/ole">
             <mc:AlternateContent xmlns:mc="http://schemas.openxmlformats.org/markup-compatibility/2006">
               <mc:Choice xmlns:v="urn:schemas-microsoft-com:vml" Requires="v">
-                <p:oleObj spid="_x0000_s4107" name="Image" r:id="rId5" imgW="3529800" imgH="11619000" progId="Photoshop.Image.13">
+                <p:oleObj spid="_x0000_s4109" name="Image" r:id="rId5" imgW="3529800" imgH="11619000" progId="Photoshop.Image.13">
                   <p:embed/>
                 </p:oleObj>
               </mc:Choice>
@@ -6781,7 +6595,7 @@
                     </p:blipFill>
                     <p:spPr>
                       <a:xfrm>
-                        <a:off x="7855631" y="1160237"/>
+                        <a:off x="6331632" y="1160238"/>
                         <a:ext cx="1646237" cy="5418137"/>
                       </a:xfrm>
                       <a:prstGeom prst="rect">
@@ -6820,7 +6634,7 @@
 </p:sld>
 </file>
 
-<file path=ppt/slides/slide7.xml><?xml version="1.0" encoding="utf-8"?>
+<file path=ppt/slides/slide11.xml><?xml version="1.0" encoding="utf-8"?>
 <p:sld xmlns:a="http://schemas.openxmlformats.org/drawingml/2006/main" xmlns:r="http://schemas.openxmlformats.org/officeDocument/2006/relationships" xmlns:p="http://schemas.openxmlformats.org/presentationml/2006/main">
   <p:cSld>
     <p:spTree>
@@ -6852,14 +6666,14 @@
           </p:nvPr>
         </p:nvGraphicFramePr>
         <p:xfrm>
-          <a:off x="2652259" y="1902534"/>
+          <a:off x="1128260" y="1902534"/>
           <a:ext cx="5388655" cy="4811004"/>
         </p:xfrm>
         <a:graphic>
           <a:graphicData uri="http://schemas.openxmlformats.org/presentationml/2006/ole">
             <mc:AlternateContent xmlns:mc="http://schemas.openxmlformats.org/markup-compatibility/2006">
               <mc:Choice xmlns:v="urn:schemas-microsoft-com:vml" Requires="v">
-                <p:oleObj spid="_x0000_s5126" name="Image" r:id="rId3" imgW="8291880" imgH="7403040" progId="Photoshop.Image.13">
+                <p:oleObj spid="_x0000_s5127" name="Image" r:id="rId3" imgW="8291880" imgH="7403040" progId="Photoshop.Image.13">
                   <p:embed/>
                 </p:oleObj>
               </mc:Choice>
@@ -6880,7 +6694,7 @@
                     </p:blipFill>
                     <p:spPr>
                       <a:xfrm>
-                        <a:off x="2652259" y="1902534"/>
+                        <a:off x="1128260" y="1902534"/>
                         <a:ext cx="5388655" cy="4811004"/>
                       </a:xfrm>
                       <a:prstGeom prst="rect">
@@ -6926,6 +6740,799 @@
     <p:extLst>
       <p:ext uri="{BB962C8B-B14F-4D97-AF65-F5344CB8AC3E}">
         <p14:creationId xmlns:p14="http://schemas.microsoft.com/office/powerpoint/2010/main" val="3052568234"/>
+      </p:ext>
+    </p:extLst>
+  </p:cSld>
+  <p:clrMapOvr>
+    <a:masterClrMapping/>
+  </p:clrMapOvr>
+  <p:timing>
+    <p:tnLst>
+      <p:par>
+        <p:cTn id="1" dur="indefinite" restart="never" nodeType="tmRoot"/>
+      </p:par>
+    </p:tnLst>
+  </p:timing>
+</p:sld>
+</file>
+
+<file path=ppt/slides/slide12.xml><?xml version="1.0" encoding="utf-8"?>
+<p:sld xmlns:a="http://schemas.openxmlformats.org/drawingml/2006/main" xmlns:r="http://schemas.openxmlformats.org/officeDocument/2006/relationships" xmlns:p="http://schemas.openxmlformats.org/presentationml/2006/main">
+  <p:cSld>
+    <p:spTree>
+      <p:nvGrpSpPr>
+        <p:cNvPr id="1" name=""/>
+        <p:cNvGrpSpPr/>
+        <p:nvPr/>
+      </p:nvGrpSpPr>
+      <p:grpSpPr>
+        <a:xfrm>
+          <a:off x="0" y="0"/>
+          <a:ext cx="0" cy="0"/>
+          <a:chOff x="0" y="0"/>
+          <a:chExt cx="0" cy="0"/>
+        </a:xfrm>
+      </p:grpSpPr>
+      <p:sp>
+        <p:nvSpPr>
+          <p:cNvPr id="2" name="Title 1"/>
+          <p:cNvSpPr>
+            <a:spLocks noGrp="1"/>
+          </p:cNvSpPr>
+          <p:nvPr>
+            <p:ph type="title"/>
+          </p:nvPr>
+        </p:nvSpPr>
+        <p:spPr/>
+        <p:txBody>
+          <a:bodyPr/>
+          <a:lstStyle/>
+          <a:p>
+            <a:r>
+              <a:rPr lang="en-US" dirty="0" smtClean="0"/>
+              <a:t>Unit &amp; Integration Testing</a:t>
+            </a:r>
+            <a:endParaRPr lang="en-US" dirty="0"/>
+          </a:p>
+        </p:txBody>
+      </p:sp>
+      <p:sp>
+        <p:nvSpPr>
+          <p:cNvPr id="3" name="Content Placeholder 2"/>
+          <p:cNvSpPr>
+            <a:spLocks noGrp="1"/>
+          </p:cNvSpPr>
+          <p:nvPr>
+            <p:ph idx="1"/>
+          </p:nvPr>
+        </p:nvSpPr>
+        <p:spPr/>
+        <p:txBody>
+          <a:bodyPr/>
+          <a:lstStyle/>
+          <a:p>
+            <a:endParaRPr lang="en-US"/>
+          </a:p>
+        </p:txBody>
+      </p:sp>
+    </p:spTree>
+    <p:extLst>
+      <p:ext uri="{BB962C8B-B14F-4D97-AF65-F5344CB8AC3E}">
+        <p14:creationId xmlns:p14="http://schemas.microsoft.com/office/powerpoint/2010/main" val="2901842547"/>
+      </p:ext>
+    </p:extLst>
+  </p:cSld>
+  <p:clrMapOvr>
+    <a:masterClrMapping/>
+  </p:clrMapOvr>
+  <p:timing>
+    <p:tnLst>
+      <p:par>
+        <p:cTn id="1" dur="indefinite" restart="never" nodeType="tmRoot"/>
+      </p:par>
+    </p:tnLst>
+  </p:timing>
+</p:sld>
+</file>
+
+<file path=ppt/slides/slide13.xml><?xml version="1.0" encoding="utf-8"?>
+<p:sld xmlns:a="http://schemas.openxmlformats.org/drawingml/2006/main" xmlns:r="http://schemas.openxmlformats.org/officeDocument/2006/relationships" xmlns:p="http://schemas.openxmlformats.org/presentationml/2006/main">
+  <p:cSld>
+    <p:spTree>
+      <p:nvGrpSpPr>
+        <p:cNvPr id="1" name=""/>
+        <p:cNvGrpSpPr/>
+        <p:nvPr/>
+      </p:nvGrpSpPr>
+      <p:grpSpPr>
+        <a:xfrm>
+          <a:off x="0" y="0"/>
+          <a:ext cx="0" cy="0"/>
+          <a:chOff x="0" y="0"/>
+          <a:chExt cx="0" cy="0"/>
+        </a:xfrm>
+      </p:grpSpPr>
+      <p:sp>
+        <p:nvSpPr>
+          <p:cNvPr id="2" name="Title 1"/>
+          <p:cNvSpPr>
+            <a:spLocks noGrp="1"/>
+          </p:cNvSpPr>
+          <p:nvPr>
+            <p:ph type="title"/>
+          </p:nvPr>
+        </p:nvSpPr>
+        <p:spPr/>
+        <p:txBody>
+          <a:bodyPr/>
+          <a:lstStyle/>
+          <a:p>
+            <a:r>
+              <a:rPr lang="en-US" dirty="0" smtClean="0"/>
+              <a:t>References</a:t>
+            </a:r>
+            <a:endParaRPr lang="en-US" dirty="0"/>
+          </a:p>
+        </p:txBody>
+      </p:sp>
+      <p:sp>
+        <p:nvSpPr>
+          <p:cNvPr id="3" name="Content Placeholder 2"/>
+          <p:cNvSpPr>
+            <a:spLocks noGrp="1"/>
+          </p:cNvSpPr>
+          <p:nvPr>
+            <p:ph idx="1"/>
+          </p:nvPr>
+        </p:nvSpPr>
+        <p:spPr/>
+        <p:txBody>
+          <a:bodyPr/>
+          <a:lstStyle/>
+          <a:p>
+            <a:r>
+              <a:rPr lang="en-US" dirty="0" smtClean="0">
+                <a:hlinkClick r:id="rId2"/>
+              </a:rPr>
+              <a:t>https://www.draw.io</a:t>
+            </a:r>
+            <a:r>
+              <a:rPr lang="en-US" dirty="0" smtClean="0"/>
+              <a:t> – UML Diagram system used for DD</a:t>
+            </a:r>
+          </a:p>
+          <a:p>
+            <a:r>
+              <a:rPr lang="en-US" dirty="0" err="1" smtClean="0"/>
+              <a:t>yWorks</a:t>
+            </a:r>
+            <a:r>
+              <a:rPr lang="en-US" dirty="0" smtClean="0"/>
+              <a:t> </a:t>
+            </a:r>
+            <a:r>
+              <a:rPr lang="en-US" dirty="0" err="1" smtClean="0"/>
+              <a:t>Doclet</a:t>
+            </a:r>
+            <a:r>
+              <a:rPr lang="en-US" dirty="0" smtClean="0"/>
+              <a:t> – Auto-documentation system designed for Java</a:t>
+            </a:r>
+          </a:p>
+          <a:p>
+            <a:r>
+              <a:rPr lang="en-US" dirty="0" smtClean="0">
+                <a:hlinkClick r:id="rId3"/>
+              </a:rPr>
+              <a:t>www.gradle.org</a:t>
+            </a:r>
+            <a:r>
+              <a:rPr lang="en-US" dirty="0" smtClean="0"/>
+              <a:t> – Automated Unit Testing Environment</a:t>
+            </a:r>
+          </a:p>
+          <a:p>
+            <a:r>
+              <a:rPr lang="en-US" dirty="0" err="1" smtClean="0"/>
+              <a:t>Pegdown</a:t>
+            </a:r>
+            <a:r>
+              <a:rPr lang="en-US" dirty="0" smtClean="0"/>
+              <a:t> </a:t>
+            </a:r>
+            <a:r>
+              <a:rPr lang="en-US" dirty="0" err="1" smtClean="0"/>
+              <a:t>Doclet</a:t>
+            </a:r>
+            <a:r>
+              <a:rPr lang="en-US" dirty="0"/>
+              <a:t> </a:t>
+            </a:r>
+            <a:r>
+              <a:rPr lang="en-US" dirty="0" smtClean="0"/>
+              <a:t>project - Replaces comments with Markdown</a:t>
+            </a:r>
+          </a:p>
+          <a:p>
+            <a:endParaRPr lang="en-US" dirty="0"/>
+          </a:p>
+        </p:txBody>
+      </p:sp>
+    </p:spTree>
+    <p:extLst>
+      <p:ext uri="{BB962C8B-B14F-4D97-AF65-F5344CB8AC3E}">
+        <p14:creationId xmlns:p14="http://schemas.microsoft.com/office/powerpoint/2010/main" val="3873660262"/>
+      </p:ext>
+    </p:extLst>
+  </p:cSld>
+  <p:clrMapOvr>
+    <a:masterClrMapping/>
+  </p:clrMapOvr>
+  <p:timing>
+    <p:tnLst>
+      <p:par>
+        <p:cTn id="1" dur="indefinite" restart="never" nodeType="tmRoot"/>
+      </p:par>
+    </p:tnLst>
+  </p:timing>
+</p:sld>
+</file>
+
+<file path=ppt/slides/slide2.xml><?xml version="1.0" encoding="utf-8"?>
+<p:sld xmlns:a="http://schemas.openxmlformats.org/drawingml/2006/main" xmlns:r="http://schemas.openxmlformats.org/officeDocument/2006/relationships" xmlns:p="http://schemas.openxmlformats.org/presentationml/2006/main">
+  <p:cSld>
+    <p:spTree>
+      <p:nvGrpSpPr>
+        <p:cNvPr id="1" name=""/>
+        <p:cNvGrpSpPr/>
+        <p:nvPr/>
+      </p:nvGrpSpPr>
+      <p:grpSpPr>
+        <a:xfrm>
+          <a:off x="0" y="0"/>
+          <a:ext cx="0" cy="0"/>
+          <a:chOff x="0" y="0"/>
+          <a:chExt cx="0" cy="0"/>
+        </a:xfrm>
+      </p:grpSpPr>
+      <p:sp>
+        <p:nvSpPr>
+          <p:cNvPr id="2" name="Title 1"/>
+          <p:cNvSpPr>
+            <a:spLocks noGrp="1"/>
+          </p:cNvSpPr>
+          <p:nvPr>
+            <p:ph type="title"/>
+          </p:nvPr>
+        </p:nvSpPr>
+        <p:spPr/>
+        <p:txBody>
+          <a:bodyPr/>
+          <a:lstStyle/>
+          <a:p>
+            <a:r>
+              <a:rPr lang="en-US" dirty="0" smtClean="0"/>
+              <a:t>Terry’s slides are after this slide</a:t>
+            </a:r>
+            <a:endParaRPr lang="en-US" dirty="0"/>
+          </a:p>
+        </p:txBody>
+      </p:sp>
+      <p:sp>
+        <p:nvSpPr>
+          <p:cNvPr id="3" name="Content Placeholder 2"/>
+          <p:cNvSpPr>
+            <a:spLocks noGrp="1"/>
+          </p:cNvSpPr>
+          <p:nvPr>
+            <p:ph idx="1"/>
+          </p:nvPr>
+        </p:nvSpPr>
+        <p:spPr/>
+        <p:txBody>
+          <a:bodyPr/>
+          <a:lstStyle/>
+          <a:p>
+            <a:r>
+              <a:rPr lang="en-US" dirty="0" smtClean="0"/>
+              <a:t>Terry covers Purpose, GUI, &amp; How to use it</a:t>
+            </a:r>
+            <a:endParaRPr lang="en-US" dirty="0"/>
+          </a:p>
+        </p:txBody>
+      </p:sp>
+    </p:spTree>
+    <p:extLst>
+      <p:ext uri="{BB962C8B-B14F-4D97-AF65-F5344CB8AC3E}">
+        <p14:creationId xmlns:p14="http://schemas.microsoft.com/office/powerpoint/2010/main" val="1930367192"/>
+      </p:ext>
+    </p:extLst>
+  </p:cSld>
+  <p:clrMapOvr>
+    <a:masterClrMapping/>
+  </p:clrMapOvr>
+  <p:timing>
+    <p:tnLst>
+      <p:par>
+        <p:cTn id="1" dur="indefinite" restart="never" nodeType="tmRoot"/>
+      </p:par>
+    </p:tnLst>
+  </p:timing>
+</p:sld>
+</file>
+
+<file path=ppt/slides/slide3.xml><?xml version="1.0" encoding="utf-8"?>
+<p:sld xmlns:a="http://schemas.openxmlformats.org/drawingml/2006/main" xmlns:r="http://schemas.openxmlformats.org/officeDocument/2006/relationships" xmlns:p="http://schemas.openxmlformats.org/presentationml/2006/main">
+  <p:cSld>
+    <p:spTree>
+      <p:nvGrpSpPr>
+        <p:cNvPr id="1" name=""/>
+        <p:cNvGrpSpPr/>
+        <p:nvPr/>
+      </p:nvGrpSpPr>
+      <p:grpSpPr>
+        <a:xfrm>
+          <a:off x="0" y="0"/>
+          <a:ext cx="0" cy="0"/>
+          <a:chOff x="0" y="0"/>
+          <a:chExt cx="0" cy="0"/>
+        </a:xfrm>
+      </p:grpSpPr>
+      <p:sp>
+        <p:nvSpPr>
+          <p:cNvPr id="2" name="Title 1"/>
+          <p:cNvSpPr>
+            <a:spLocks noGrp="1"/>
+          </p:cNvSpPr>
+          <p:nvPr>
+            <p:ph type="title"/>
+          </p:nvPr>
+        </p:nvSpPr>
+        <p:spPr/>
+        <p:txBody>
+          <a:bodyPr/>
+          <a:lstStyle/>
+          <a:p>
+            <a:r>
+              <a:rPr lang="en-US" dirty="0" smtClean="0"/>
+              <a:t>Design</a:t>
+            </a:r>
+            <a:endParaRPr lang="en-US" dirty="0"/>
+          </a:p>
+        </p:txBody>
+      </p:sp>
+      <p:graphicFrame>
+        <p:nvGraphicFramePr>
+          <p:cNvPr id="4" name="Object 3"/>
+          <p:cNvGraphicFramePr>
+            <a:graphicFrameLocks noChangeAspect="1"/>
+          </p:cNvGraphicFramePr>
+          <p:nvPr>
+            <p:extLst>
+              <p:ext uri="{D42A27DB-BD31-4B8C-83A1-F6EECF244321}">
+                <p14:modId xmlns:p14="http://schemas.microsoft.com/office/powerpoint/2010/main" val="611458238"/>
+              </p:ext>
+            </p:extLst>
+          </p:nvPr>
+        </p:nvGraphicFramePr>
+        <p:xfrm>
+          <a:off x="1269257" y="2022703"/>
+          <a:ext cx="7400820" cy="4436155"/>
+        </p:xfrm>
+        <a:graphic>
+          <a:graphicData uri="http://schemas.openxmlformats.org/presentationml/2006/ole">
+            <mc:AlternateContent xmlns:mc="http://schemas.openxmlformats.org/markup-compatibility/2006">
+              <mc:Choice xmlns:v="urn:schemas-microsoft-com:vml" Requires="v">
+                <p:oleObj spid="_x0000_s1031" name="Image" r:id="rId3" imgW="21333240" imgH="12787200" progId="Photoshop.Image.13">
+                  <p:embed/>
+                </p:oleObj>
+              </mc:Choice>
+              <mc:Fallback>
+                <p:oleObj name="Image" r:id="rId3" imgW="21333240" imgH="12787200" progId="Photoshop.Image.13">
+                  <p:embed/>
+                  <p:pic>
+                    <p:nvPicPr>
+                      <p:cNvPr id="0" name=""/>
+                      <p:cNvPicPr/>
+                      <p:nvPr/>
+                    </p:nvPicPr>
+                    <p:blipFill>
+                      <a:blip r:embed="rId4"/>
+                      <a:stretch>
+                        <a:fillRect/>
+                      </a:stretch>
+                    </p:blipFill>
+                    <p:spPr>
+                      <a:xfrm>
+                        <a:off x="1269257" y="2022703"/>
+                        <a:ext cx="7400820" cy="4436155"/>
+                      </a:xfrm>
+                      <a:prstGeom prst="rect">
+                        <a:avLst/>
+                      </a:prstGeom>
+                    </p:spPr>
+                  </p:pic>
+                </p:oleObj>
+              </mc:Fallback>
+            </mc:AlternateContent>
+          </a:graphicData>
+        </a:graphic>
+      </p:graphicFrame>
+    </p:spTree>
+    <p:extLst>
+      <p:ext uri="{BB962C8B-B14F-4D97-AF65-F5344CB8AC3E}">
+        <p14:creationId xmlns:p14="http://schemas.microsoft.com/office/powerpoint/2010/main" val="1953110351"/>
+      </p:ext>
+    </p:extLst>
+  </p:cSld>
+  <p:clrMapOvr>
+    <a:masterClrMapping/>
+  </p:clrMapOvr>
+  <p:timing>
+    <p:tnLst>
+      <p:par>
+        <p:cTn id="1" dur="indefinite" restart="never" nodeType="tmRoot"/>
+      </p:par>
+    </p:tnLst>
+  </p:timing>
+</p:sld>
+</file>
+
+<file path=ppt/slides/slide4.xml><?xml version="1.0" encoding="utf-8"?>
+<p:sld xmlns:a="http://schemas.openxmlformats.org/drawingml/2006/main" xmlns:r="http://schemas.openxmlformats.org/officeDocument/2006/relationships" xmlns:p="http://schemas.openxmlformats.org/presentationml/2006/main">
+  <p:cSld>
+    <p:spTree>
+      <p:nvGrpSpPr>
+        <p:cNvPr id="1" name=""/>
+        <p:cNvGrpSpPr/>
+        <p:nvPr/>
+      </p:nvGrpSpPr>
+      <p:grpSpPr>
+        <a:xfrm>
+          <a:off x="0" y="0"/>
+          <a:ext cx="0" cy="0"/>
+          <a:chOff x="0" y="0"/>
+          <a:chExt cx="0" cy="0"/>
+        </a:xfrm>
+      </p:grpSpPr>
+      <p:sp>
+        <p:nvSpPr>
+          <p:cNvPr id="2" name="Title 1"/>
+          <p:cNvSpPr>
+            <a:spLocks noGrp="1"/>
+          </p:cNvSpPr>
+          <p:nvPr>
+            <p:ph type="title"/>
+          </p:nvPr>
+        </p:nvSpPr>
+        <p:spPr/>
+        <p:txBody>
+          <a:bodyPr/>
+          <a:lstStyle/>
+          <a:p>
+            <a:r>
+              <a:rPr lang="en-US" dirty="0" smtClean="0"/>
+              <a:t>Mike’s slides go after this one</a:t>
+            </a:r>
+            <a:endParaRPr lang="en-US" dirty="0"/>
+          </a:p>
+        </p:txBody>
+      </p:sp>
+      <p:sp>
+        <p:nvSpPr>
+          <p:cNvPr id="3" name="Content Placeholder 2"/>
+          <p:cNvSpPr>
+            <a:spLocks noGrp="1"/>
+          </p:cNvSpPr>
+          <p:nvPr>
+            <p:ph idx="1"/>
+          </p:nvPr>
+        </p:nvSpPr>
+        <p:spPr/>
+        <p:txBody>
+          <a:bodyPr/>
+          <a:lstStyle/>
+          <a:p>
+            <a:r>
+              <a:rPr lang="en-US" dirty="0" smtClean="0"/>
+              <a:t>Mike covers: How it Works, and components</a:t>
+            </a:r>
+            <a:endParaRPr lang="en-US" dirty="0"/>
+          </a:p>
+        </p:txBody>
+      </p:sp>
+    </p:spTree>
+    <p:extLst>
+      <p:ext uri="{BB962C8B-B14F-4D97-AF65-F5344CB8AC3E}">
+        <p14:creationId xmlns:p14="http://schemas.microsoft.com/office/powerpoint/2010/main" val="3677762619"/>
+      </p:ext>
+    </p:extLst>
+  </p:cSld>
+  <p:clrMapOvr>
+    <a:masterClrMapping/>
+  </p:clrMapOvr>
+  <p:timing>
+    <p:tnLst>
+      <p:par>
+        <p:cTn id="1" dur="indefinite" restart="never" nodeType="tmRoot"/>
+      </p:par>
+    </p:tnLst>
+  </p:timing>
+</p:sld>
+</file>
+
+<file path=ppt/slides/slide5.xml><?xml version="1.0" encoding="utf-8"?>
+<p:sld xmlns:a="http://schemas.openxmlformats.org/drawingml/2006/main" xmlns:r="http://schemas.openxmlformats.org/officeDocument/2006/relationships" xmlns:p="http://schemas.openxmlformats.org/presentationml/2006/main">
+  <p:cSld>
+    <p:spTree>
+      <p:nvGrpSpPr>
+        <p:cNvPr id="1" name=""/>
+        <p:cNvGrpSpPr/>
+        <p:nvPr/>
+      </p:nvGrpSpPr>
+      <p:grpSpPr>
+        <a:xfrm>
+          <a:off x="0" y="0"/>
+          <a:ext cx="0" cy="0"/>
+          <a:chOff x="0" y="0"/>
+          <a:chExt cx="0" cy="0"/>
+        </a:xfrm>
+      </p:grpSpPr>
+      <p:sp>
+        <p:nvSpPr>
+          <p:cNvPr id="2" name="Title 1"/>
+          <p:cNvSpPr>
+            <a:spLocks noGrp="1"/>
+          </p:cNvSpPr>
+          <p:nvPr>
+            <p:ph type="title"/>
+          </p:nvPr>
+        </p:nvSpPr>
+        <p:spPr/>
+        <p:txBody>
+          <a:bodyPr/>
+          <a:lstStyle/>
+          <a:p>
+            <a:r>
+              <a:rPr lang="en-US" dirty="0" smtClean="0"/>
+              <a:t>Lucas’s slides go after this</a:t>
+            </a:r>
+            <a:endParaRPr lang="en-US" dirty="0"/>
+          </a:p>
+        </p:txBody>
+      </p:sp>
+      <p:sp>
+        <p:nvSpPr>
+          <p:cNvPr id="3" name="Content Placeholder 2"/>
+          <p:cNvSpPr>
+            <a:spLocks noGrp="1"/>
+          </p:cNvSpPr>
+          <p:nvPr>
+            <p:ph idx="1"/>
+          </p:nvPr>
+        </p:nvSpPr>
+        <p:spPr/>
+        <p:txBody>
+          <a:bodyPr/>
+          <a:lstStyle/>
+          <a:p>
+            <a:r>
+              <a:rPr lang="en-US" dirty="0" smtClean="0"/>
+              <a:t>Lucas covers Architecture, predominately UML diagram’s and some descriptions</a:t>
+            </a:r>
+            <a:endParaRPr lang="en-US" dirty="0"/>
+          </a:p>
+        </p:txBody>
+      </p:sp>
+    </p:spTree>
+    <p:extLst>
+      <p:ext uri="{BB962C8B-B14F-4D97-AF65-F5344CB8AC3E}">
+        <p14:creationId xmlns:p14="http://schemas.microsoft.com/office/powerpoint/2010/main" val="2503385107"/>
+      </p:ext>
+    </p:extLst>
+  </p:cSld>
+  <p:clrMapOvr>
+    <a:masterClrMapping/>
+  </p:clrMapOvr>
+  <p:timing>
+    <p:tnLst>
+      <p:par>
+        <p:cTn id="1" dur="indefinite" restart="never" nodeType="tmRoot"/>
+      </p:par>
+    </p:tnLst>
+  </p:timing>
+</p:sld>
+</file>
+
+<file path=ppt/slides/slide6.xml><?xml version="1.0" encoding="utf-8"?>
+<p:sld xmlns:a="http://schemas.openxmlformats.org/drawingml/2006/main" xmlns:r="http://schemas.openxmlformats.org/officeDocument/2006/relationships" xmlns:p="http://schemas.openxmlformats.org/presentationml/2006/main">
+  <p:cSld>
+    <p:spTree>
+      <p:nvGrpSpPr>
+        <p:cNvPr id="1" name=""/>
+        <p:cNvGrpSpPr/>
+        <p:nvPr/>
+      </p:nvGrpSpPr>
+      <p:grpSpPr>
+        <a:xfrm>
+          <a:off x="0" y="0"/>
+          <a:ext cx="0" cy="0"/>
+          <a:chOff x="0" y="0"/>
+          <a:chExt cx="0" cy="0"/>
+        </a:xfrm>
+      </p:grpSpPr>
+      <p:sp>
+        <p:nvSpPr>
+          <p:cNvPr id="2" name="Title 1"/>
+          <p:cNvSpPr>
+            <a:spLocks noGrp="1"/>
+          </p:cNvSpPr>
+          <p:nvPr>
+            <p:ph type="title"/>
+          </p:nvPr>
+        </p:nvSpPr>
+        <p:spPr/>
+        <p:txBody>
+          <a:bodyPr/>
+          <a:lstStyle/>
+          <a:p>
+            <a:r>
+              <a:rPr lang="en-US" dirty="0" smtClean="0"/>
+              <a:t>Structure</a:t>
+            </a:r>
+            <a:endParaRPr lang="en-US" dirty="0"/>
+          </a:p>
+        </p:txBody>
+      </p:sp>
+      <p:graphicFrame>
+        <p:nvGraphicFramePr>
+          <p:cNvPr id="4" name="Object 3"/>
+          <p:cNvGraphicFramePr>
+            <a:graphicFrameLocks noChangeAspect="1"/>
+          </p:cNvGraphicFramePr>
+          <p:nvPr>
+            <p:extLst>
+              <p:ext uri="{D42A27DB-BD31-4B8C-83A1-F6EECF244321}">
+                <p14:modId xmlns:p14="http://schemas.microsoft.com/office/powerpoint/2010/main" val="2583679832"/>
+              </p:ext>
+            </p:extLst>
+          </p:nvPr>
+        </p:nvGraphicFramePr>
+        <p:xfrm>
+          <a:off x="982133" y="2057907"/>
+          <a:ext cx="7602248" cy="4009607"/>
+        </p:xfrm>
+        <a:graphic>
+          <a:graphicData uri="http://schemas.openxmlformats.org/presentationml/2006/ole">
+            <mc:AlternateContent xmlns:mc="http://schemas.openxmlformats.org/markup-compatibility/2006">
+              <mc:Choice xmlns:v="urn:schemas-microsoft-com:vml" Requires="v">
+                <p:oleObj spid="_x0000_s2055" name="Image" r:id="rId3" imgW="8596800" imgH="4533120" progId="Photoshop.Image.13">
+                  <p:embed/>
+                </p:oleObj>
+              </mc:Choice>
+              <mc:Fallback>
+                <p:oleObj name="Image" r:id="rId3" imgW="8596800" imgH="4533120" progId="Photoshop.Image.13">
+                  <p:embed/>
+                  <p:pic>
+                    <p:nvPicPr>
+                      <p:cNvPr id="0" name=""/>
+                      <p:cNvPicPr/>
+                      <p:nvPr/>
+                    </p:nvPicPr>
+                    <p:blipFill>
+                      <a:blip r:embed="rId4"/>
+                      <a:stretch>
+                        <a:fillRect/>
+                      </a:stretch>
+                    </p:blipFill>
+                    <p:spPr>
+                      <a:xfrm>
+                        <a:off x="982133" y="2057907"/>
+                        <a:ext cx="7602248" cy="4009607"/>
+                      </a:xfrm>
+                      <a:prstGeom prst="rect">
+                        <a:avLst/>
+                      </a:prstGeom>
+                      <a:ln w="12700">
+                        <a:solidFill>
+                          <a:schemeClr val="tx1"/>
+                        </a:solidFill>
+                      </a:ln>
+                    </p:spPr>
+                  </p:pic>
+                </p:oleObj>
+              </mc:Fallback>
+            </mc:AlternateContent>
+          </a:graphicData>
+        </a:graphic>
+      </p:graphicFrame>
+    </p:spTree>
+    <p:extLst>
+      <p:ext uri="{BB962C8B-B14F-4D97-AF65-F5344CB8AC3E}">
+        <p14:creationId xmlns:p14="http://schemas.microsoft.com/office/powerpoint/2010/main" val="4097840335"/>
+      </p:ext>
+    </p:extLst>
+  </p:cSld>
+  <p:clrMapOvr>
+    <a:masterClrMapping/>
+  </p:clrMapOvr>
+  <p:timing>
+    <p:tnLst>
+      <p:par>
+        <p:cTn id="1" dur="indefinite" restart="never" nodeType="tmRoot"/>
+      </p:par>
+    </p:tnLst>
+  </p:timing>
+</p:sld>
+</file>
+
+<file path=ppt/slides/slide7.xml><?xml version="1.0" encoding="utf-8"?>
+<p:sld xmlns:a="http://schemas.openxmlformats.org/drawingml/2006/main" xmlns:r="http://schemas.openxmlformats.org/officeDocument/2006/relationships" xmlns:p="http://schemas.openxmlformats.org/presentationml/2006/main">
+  <p:cSld>
+    <p:spTree>
+      <p:nvGrpSpPr>
+        <p:cNvPr id="1" name=""/>
+        <p:cNvGrpSpPr/>
+        <p:nvPr/>
+      </p:nvGrpSpPr>
+      <p:grpSpPr>
+        <a:xfrm>
+          <a:off x="0" y="0"/>
+          <a:ext cx="0" cy="0"/>
+          <a:chOff x="0" y="0"/>
+          <a:chExt cx="0" cy="0"/>
+        </a:xfrm>
+      </p:grpSpPr>
+      <p:sp>
+        <p:nvSpPr>
+          <p:cNvPr id="2" name="Title 1"/>
+          <p:cNvSpPr>
+            <a:spLocks noGrp="1"/>
+          </p:cNvSpPr>
+          <p:nvPr>
+            <p:ph type="title"/>
+          </p:nvPr>
+        </p:nvSpPr>
+        <p:spPr/>
+        <p:txBody>
+          <a:bodyPr/>
+          <a:lstStyle/>
+          <a:p>
+            <a:r>
+              <a:rPr lang="en-US" dirty="0" smtClean="0"/>
+              <a:t>Nathan’s slides go after this</a:t>
+            </a:r>
+            <a:endParaRPr lang="en-US" dirty="0"/>
+          </a:p>
+        </p:txBody>
+      </p:sp>
+      <p:sp>
+        <p:nvSpPr>
+          <p:cNvPr id="3" name="Content Placeholder 2"/>
+          <p:cNvSpPr>
+            <a:spLocks noGrp="1"/>
+          </p:cNvSpPr>
+          <p:nvPr>
+            <p:ph idx="1"/>
+          </p:nvPr>
+        </p:nvSpPr>
+        <p:spPr/>
+        <p:txBody>
+          <a:bodyPr/>
+          <a:lstStyle/>
+          <a:p>
+            <a:r>
+              <a:rPr lang="en-US" dirty="0" smtClean="0"/>
+              <a:t>Nathan covers architecture p2 and future plans</a:t>
+            </a:r>
+            <a:endParaRPr lang="en-US" dirty="0"/>
+          </a:p>
+        </p:txBody>
+      </p:sp>
+    </p:spTree>
+    <p:extLst>
+      <p:ext uri="{BB962C8B-B14F-4D97-AF65-F5344CB8AC3E}">
+        <p14:creationId xmlns:p14="http://schemas.microsoft.com/office/powerpoint/2010/main" val="2231971645"/>
       </p:ext>
     </p:extLst>
   </p:cSld>
@@ -6976,7 +7583,7 @@
           <a:p>
             <a:r>
               <a:rPr lang="en-US" dirty="0" smtClean="0"/>
-              <a:t>Unit &amp; Integration Testing</a:t>
+              <a:t>Model View Controller</a:t>
             </a:r>
             <a:endParaRPr lang="en-US" dirty="0"/>
           </a:p>
@@ -7004,13 +7611,20 @@
     </p:spTree>
     <p:extLst>
       <p:ext uri="{BB962C8B-B14F-4D97-AF65-F5344CB8AC3E}">
-        <p14:creationId xmlns:p14="http://schemas.microsoft.com/office/powerpoint/2010/main" val="2901842547"/>
+        <p14:creationId xmlns:p14="http://schemas.microsoft.com/office/powerpoint/2010/main" val="2077223260"/>
       </p:ext>
     </p:extLst>
   </p:cSld>
   <p:clrMapOvr>
     <a:masterClrMapping/>
   </p:clrMapOvr>
+  <p:timing>
+    <p:tnLst>
+      <p:par>
+        <p:cTn id="1" dur="indefinite" restart="never" nodeType="tmRoot"/>
+      </p:par>
+    </p:tnLst>
+  </p:timing>
 </p:sld>
 </file>
 
@@ -7048,105 +7662,91 @@
           <a:p>
             <a:r>
               <a:rPr lang="en-US" dirty="0" smtClean="0"/>
-              <a:t>References</a:t>
-            </a:r>
-            <a:endParaRPr lang="en-US" dirty="0"/>
-          </a:p>
-        </p:txBody>
-      </p:sp>
-      <p:sp>
-        <p:nvSpPr>
-          <p:cNvPr id="3" name="Content Placeholder 2"/>
-          <p:cNvSpPr>
-            <a:spLocks noGrp="1"/>
-          </p:cNvSpPr>
-          <p:nvPr>
-            <p:ph idx="1"/>
-          </p:nvPr>
-        </p:nvSpPr>
-        <p:spPr/>
-        <p:txBody>
-          <a:bodyPr/>
-          <a:lstStyle/>
-          <a:p>
-            <a:r>
-              <a:rPr lang="en-US" dirty="0" smtClean="0">
-                <a:hlinkClick r:id="rId2"/>
-              </a:rPr>
-              <a:t>https://www.draw.io</a:t>
-            </a:r>
-            <a:r>
-              <a:rPr lang="en-US" dirty="0" smtClean="0"/>
-              <a:t> – UML Diagram system used for DD</a:t>
-            </a:r>
-          </a:p>
-          <a:p>
-            <a:r>
-              <a:rPr lang="en-US" dirty="0" err="1" smtClean="0"/>
-              <a:t>yWorks</a:t>
-            </a:r>
-            <a:r>
-              <a:rPr lang="en-US" dirty="0" smtClean="0"/>
-              <a:t> </a:t>
-            </a:r>
-            <a:r>
-              <a:rPr lang="en-US" dirty="0" err="1" smtClean="0"/>
-              <a:t>Doclet</a:t>
-            </a:r>
-            <a:r>
-              <a:rPr lang="en-US" dirty="0" smtClean="0"/>
-              <a:t> – Auto-documentation system designed for Java</a:t>
-            </a:r>
-          </a:p>
-          <a:p>
-            <a:r>
-              <a:rPr lang="en-US" dirty="0" smtClean="0">
-                <a:hlinkClick r:id="rId3"/>
-              </a:rPr>
-              <a:t>www.gradle.org</a:t>
-            </a:r>
-            <a:r>
-              <a:rPr lang="en-US" dirty="0" smtClean="0"/>
-              <a:t> – Automated Unit Testing Environment</a:t>
-            </a:r>
-          </a:p>
-          <a:p>
-            <a:r>
-              <a:rPr lang="en-US" dirty="0" err="1" smtClean="0"/>
-              <a:t>Pegdown</a:t>
-            </a:r>
-            <a:r>
-              <a:rPr lang="en-US" dirty="0" smtClean="0"/>
-              <a:t> </a:t>
-            </a:r>
-            <a:r>
-              <a:rPr lang="en-US" dirty="0" err="1" smtClean="0"/>
-              <a:t>Doclet</a:t>
-            </a:r>
-            <a:r>
-              <a:rPr lang="en-US" dirty="0"/>
-              <a:t> </a:t>
-            </a:r>
-            <a:r>
-              <a:rPr lang="en-US" dirty="0" smtClean="0"/>
-              <a:t>project - Replaces comments with Markdown</a:t>
-            </a:r>
-          </a:p>
-          <a:p>
-            <a:endParaRPr lang="en-US" dirty="0"/>
-          </a:p>
-        </p:txBody>
-      </p:sp>
+              <a:t>Debugging</a:t>
+            </a:r>
+            <a:endParaRPr lang="en-US" dirty="0"/>
+          </a:p>
+        </p:txBody>
+      </p:sp>
+      <p:graphicFrame>
+        <p:nvGraphicFramePr>
+          <p:cNvPr id="4" name="Object 3"/>
+          <p:cNvGraphicFramePr>
+            <a:graphicFrameLocks noChangeAspect="1"/>
+          </p:cNvGraphicFramePr>
+          <p:nvPr>
+            <p:extLst>
+              <p:ext uri="{D42A27DB-BD31-4B8C-83A1-F6EECF244321}">
+                <p14:modId xmlns:p14="http://schemas.microsoft.com/office/powerpoint/2010/main" val="36510944"/>
+              </p:ext>
+            </p:extLst>
+          </p:nvPr>
+        </p:nvGraphicFramePr>
+        <p:xfrm>
+          <a:off x="1019854" y="2265137"/>
+          <a:ext cx="8128000" cy="1484313"/>
+        </p:xfrm>
+        <a:graphic>
+          <a:graphicData uri="http://schemas.openxmlformats.org/presentationml/2006/ole">
+            <mc:AlternateContent xmlns:mc="http://schemas.openxmlformats.org/markup-compatibility/2006">
+              <mc:Choice xmlns:v="urn:schemas-microsoft-com:vml" Requires="v">
+                <p:oleObj spid="_x0000_s3079" name="Image" r:id="rId3" imgW="17587080" imgH="3212640" progId="Photoshop.Image.13">
+                  <p:embed/>
+                </p:oleObj>
+              </mc:Choice>
+              <mc:Fallback>
+                <p:oleObj name="Image" r:id="rId3" imgW="17587080" imgH="3212640" progId="Photoshop.Image.13">
+                  <p:embed/>
+                  <p:pic>
+                    <p:nvPicPr>
+                      <p:cNvPr id="0" name=""/>
+                      <p:cNvPicPr/>
+                      <p:nvPr/>
+                    </p:nvPicPr>
+                    <p:blipFill>
+                      <a:blip r:embed="rId4"/>
+                      <a:stretch>
+                        <a:fillRect/>
+                      </a:stretch>
+                    </p:blipFill>
+                    <p:spPr>
+                      <a:xfrm>
+                        <a:off x="1019854" y="2265137"/>
+                        <a:ext cx="8128000" cy="1484313"/>
+                      </a:xfrm>
+                      <a:prstGeom prst="rect">
+                        <a:avLst/>
+                      </a:prstGeom>
+                      <a:ln w="12700">
+                        <a:solidFill>
+                          <a:schemeClr val="tx1"/>
+                        </a:solidFill>
+                      </a:ln>
+                    </p:spPr>
+                  </p:pic>
+                </p:oleObj>
+              </mc:Fallback>
+            </mc:AlternateContent>
+          </a:graphicData>
+        </a:graphic>
+      </p:graphicFrame>
     </p:spTree>
     <p:extLst>
       <p:ext uri="{BB962C8B-B14F-4D97-AF65-F5344CB8AC3E}">
-        <p14:creationId xmlns:p14="http://schemas.microsoft.com/office/powerpoint/2010/main" val="3873660262"/>
+        <p14:creationId xmlns:p14="http://schemas.microsoft.com/office/powerpoint/2010/main" val="674115664"/>
       </p:ext>
     </p:extLst>
   </p:cSld>
   <p:clrMapOvr>
     <a:masterClrMapping/>
   </p:clrMapOvr>
+  <p:timing>
+    <p:tnLst>
+      <p:par>
+        <p:cTn id="1" dur="indefinite" restart="never" nodeType="tmRoot"/>
+      </p:par>
+    </p:tnLst>
+  </p:timing>
 </p:sld>
 </file>
 

</xml_diff>

<commit_message>
My contribution to the presentation
I also ran the program once, so there's a million KCC logs in this
commit...
</commit_message>
<xml_diff>
--- a/Presentation.pptx
+++ b/Presentation.pptx
@@ -4,21 +4,29 @@
   <p:sldMasterIdLst>
     <p:sldMasterId id="2147483668" r:id="rId1"/>
   </p:sldMasterIdLst>
+  <p:notesMasterIdLst>
+    <p:notesMasterId r:id="rId21"/>
+  </p:notesMasterIdLst>
   <p:sldIdLst>
     <p:sldId id="256" r:id="rId2"/>
     <p:sldId id="266" r:id="rId3"/>
     <p:sldId id="261" r:id="rId4"/>
     <p:sldId id="265" r:id="rId5"/>
-    <p:sldId id="267" r:id="rId6"/>
-    <p:sldId id="260" r:id="rId7"/>
-    <p:sldId id="269" r:id="rId8"/>
-    <p:sldId id="268" r:id="rId9"/>
-    <p:sldId id="263" r:id="rId10"/>
-    <p:sldId id="257" r:id="rId11"/>
-    <p:sldId id="258" r:id="rId12"/>
-    <p:sldId id="259" r:id="rId13"/>
-    <p:sldId id="264" r:id="rId14"/>
-    <p:sldId id="262" r:id="rId15"/>
+    <p:sldId id="273" r:id="rId6"/>
+    <p:sldId id="270" r:id="rId7"/>
+    <p:sldId id="271" r:id="rId8"/>
+    <p:sldId id="272" r:id="rId9"/>
+    <p:sldId id="274" r:id="rId10"/>
+    <p:sldId id="267" r:id="rId11"/>
+    <p:sldId id="260" r:id="rId12"/>
+    <p:sldId id="269" r:id="rId13"/>
+    <p:sldId id="268" r:id="rId14"/>
+    <p:sldId id="263" r:id="rId15"/>
+    <p:sldId id="257" r:id="rId16"/>
+    <p:sldId id="258" r:id="rId17"/>
+    <p:sldId id="259" r:id="rId18"/>
+    <p:sldId id="264" r:id="rId19"/>
+    <p:sldId id="262" r:id="rId20"/>
   </p:sldIdLst>
   <p:sldSz cx="9144000" cy="6858000" type="screen4x3"/>
   <p:notesSz cx="6858000" cy="9144000"/>
@@ -119,10 +127,828 @@
   </p:defaultTextStyle>
   <p:extLst>
     <p:ext uri="{EFAFB233-063F-42B5-8137-9DF3F51BA10A}">
-      <p15:sldGuideLst xmlns:p15="http://schemas.microsoft.com/office/powerpoint/2012/main" xmlns=""/>
+      <p15:sldGuideLst xmlns="" xmlns:p15="http://schemas.microsoft.com/office/powerpoint/2012/main"/>
     </p:ext>
   </p:extLst>
 </p:presentation>
+</file>
+
+<file path=ppt/notesMasters/notesMaster1.xml><?xml version="1.0" encoding="utf-8"?>
+<p:notesMaster xmlns:a="http://schemas.openxmlformats.org/drawingml/2006/main" xmlns:r="http://schemas.openxmlformats.org/officeDocument/2006/relationships" xmlns:p="http://schemas.openxmlformats.org/presentationml/2006/main">
+  <p:cSld>
+    <p:bg>
+      <p:bgRef idx="1001">
+        <a:schemeClr val="bg1"/>
+      </p:bgRef>
+    </p:bg>
+    <p:spTree>
+      <p:nvGrpSpPr>
+        <p:cNvPr id="1" name=""/>
+        <p:cNvGrpSpPr/>
+        <p:nvPr/>
+      </p:nvGrpSpPr>
+      <p:grpSpPr>
+        <a:xfrm>
+          <a:off x="0" y="0"/>
+          <a:ext cx="0" cy="0"/>
+          <a:chOff x="0" y="0"/>
+          <a:chExt cx="0" cy="0"/>
+        </a:xfrm>
+      </p:grpSpPr>
+      <p:sp>
+        <p:nvSpPr>
+          <p:cNvPr id="2" name="Header Placeholder 1"/>
+          <p:cNvSpPr>
+            <a:spLocks noGrp="1"/>
+          </p:cNvSpPr>
+          <p:nvPr>
+            <p:ph type="hdr" sz="quarter"/>
+          </p:nvPr>
+        </p:nvSpPr>
+        <p:spPr>
+          <a:xfrm>
+            <a:off x="0" y="0"/>
+            <a:ext cx="2971800" cy="457200"/>
+          </a:xfrm>
+          <a:prstGeom prst="rect">
+            <a:avLst/>
+          </a:prstGeom>
+        </p:spPr>
+        <p:txBody>
+          <a:bodyPr vert="horz" lIns="91440" tIns="45720" rIns="91440" bIns="45720" rtlCol="0"/>
+          <a:lstStyle>
+            <a:lvl1pPr algn="l">
+              <a:defRPr sz="1200"/>
+            </a:lvl1pPr>
+          </a:lstStyle>
+          <a:p>
+            <a:endParaRPr lang="en-US"/>
+          </a:p>
+        </p:txBody>
+      </p:sp>
+      <p:sp>
+        <p:nvSpPr>
+          <p:cNvPr id="3" name="Date Placeholder 2"/>
+          <p:cNvSpPr>
+            <a:spLocks noGrp="1"/>
+          </p:cNvSpPr>
+          <p:nvPr>
+            <p:ph type="dt" idx="1"/>
+          </p:nvPr>
+        </p:nvSpPr>
+        <p:spPr>
+          <a:xfrm>
+            <a:off x="3884613" y="0"/>
+            <a:ext cx="2971800" cy="457200"/>
+          </a:xfrm>
+          <a:prstGeom prst="rect">
+            <a:avLst/>
+          </a:prstGeom>
+        </p:spPr>
+        <p:txBody>
+          <a:bodyPr vert="horz" lIns="91440" tIns="45720" rIns="91440" bIns="45720" rtlCol="0"/>
+          <a:lstStyle>
+            <a:lvl1pPr algn="r">
+              <a:defRPr sz="1200"/>
+            </a:lvl1pPr>
+          </a:lstStyle>
+          <a:p>
+            <a:fld id="{C34D043B-E69E-4CB9-9D86-7B1E030E8BFD}" type="datetimeFigureOut">
+              <a:rPr lang="en-US" smtClean="0"/>
+              <a:t>5/7/2014</a:t>
+            </a:fld>
+            <a:endParaRPr lang="en-US"/>
+          </a:p>
+        </p:txBody>
+      </p:sp>
+      <p:sp>
+        <p:nvSpPr>
+          <p:cNvPr id="4" name="Slide Image Placeholder 3"/>
+          <p:cNvSpPr>
+            <a:spLocks noGrp="1" noRot="1" noChangeAspect="1"/>
+          </p:cNvSpPr>
+          <p:nvPr>
+            <p:ph type="sldImg" idx="2"/>
+          </p:nvPr>
+        </p:nvSpPr>
+        <p:spPr>
+          <a:xfrm>
+            <a:off x="1143000" y="685800"/>
+            <a:ext cx="4572000" cy="3429000"/>
+          </a:xfrm>
+          <a:prstGeom prst="rect">
+            <a:avLst/>
+          </a:prstGeom>
+          <a:noFill/>
+          <a:ln w="12700">
+            <a:solidFill>
+              <a:prstClr val="black"/>
+            </a:solidFill>
+          </a:ln>
+        </p:spPr>
+        <p:txBody>
+          <a:bodyPr vert="horz" lIns="91440" tIns="45720" rIns="91440" bIns="45720" rtlCol="0" anchor="ctr"/>
+          <a:lstStyle/>
+          <a:p>
+            <a:endParaRPr lang="en-US"/>
+          </a:p>
+        </p:txBody>
+      </p:sp>
+      <p:sp>
+        <p:nvSpPr>
+          <p:cNvPr id="5" name="Notes Placeholder 4"/>
+          <p:cNvSpPr>
+            <a:spLocks noGrp="1"/>
+          </p:cNvSpPr>
+          <p:nvPr>
+            <p:ph type="body" sz="quarter" idx="3"/>
+          </p:nvPr>
+        </p:nvSpPr>
+        <p:spPr>
+          <a:xfrm>
+            <a:off x="685800" y="4343400"/>
+            <a:ext cx="5486400" cy="4114800"/>
+          </a:xfrm>
+          <a:prstGeom prst="rect">
+            <a:avLst/>
+          </a:prstGeom>
+        </p:spPr>
+        <p:txBody>
+          <a:bodyPr vert="horz" lIns="91440" tIns="45720" rIns="91440" bIns="45720" rtlCol="0"/>
+          <a:lstStyle/>
+          <a:p>
+            <a:pPr lvl="0"/>
+            <a:r>
+              <a:rPr lang="en-US" smtClean="0"/>
+              <a:t>Click to edit Master text styles</a:t>
+            </a:r>
+          </a:p>
+          <a:p>
+            <a:pPr lvl="1"/>
+            <a:r>
+              <a:rPr lang="en-US" smtClean="0"/>
+              <a:t>Second level</a:t>
+            </a:r>
+          </a:p>
+          <a:p>
+            <a:pPr lvl="2"/>
+            <a:r>
+              <a:rPr lang="en-US" smtClean="0"/>
+              <a:t>Third level</a:t>
+            </a:r>
+          </a:p>
+          <a:p>
+            <a:pPr lvl="3"/>
+            <a:r>
+              <a:rPr lang="en-US" smtClean="0"/>
+              <a:t>Fourth level</a:t>
+            </a:r>
+          </a:p>
+          <a:p>
+            <a:pPr lvl="4"/>
+            <a:r>
+              <a:rPr lang="en-US" smtClean="0"/>
+              <a:t>Fifth level</a:t>
+            </a:r>
+            <a:endParaRPr lang="en-US"/>
+          </a:p>
+        </p:txBody>
+      </p:sp>
+      <p:sp>
+        <p:nvSpPr>
+          <p:cNvPr id="6" name="Footer Placeholder 5"/>
+          <p:cNvSpPr>
+            <a:spLocks noGrp="1"/>
+          </p:cNvSpPr>
+          <p:nvPr>
+            <p:ph type="ftr" sz="quarter" idx="4"/>
+          </p:nvPr>
+        </p:nvSpPr>
+        <p:spPr>
+          <a:xfrm>
+            <a:off x="0" y="8685213"/>
+            <a:ext cx="2971800" cy="457200"/>
+          </a:xfrm>
+          <a:prstGeom prst="rect">
+            <a:avLst/>
+          </a:prstGeom>
+        </p:spPr>
+        <p:txBody>
+          <a:bodyPr vert="horz" lIns="91440" tIns="45720" rIns="91440" bIns="45720" rtlCol="0" anchor="b"/>
+          <a:lstStyle>
+            <a:lvl1pPr algn="l">
+              <a:defRPr sz="1200"/>
+            </a:lvl1pPr>
+          </a:lstStyle>
+          <a:p>
+            <a:endParaRPr lang="en-US"/>
+          </a:p>
+        </p:txBody>
+      </p:sp>
+      <p:sp>
+        <p:nvSpPr>
+          <p:cNvPr id="7" name="Slide Number Placeholder 6"/>
+          <p:cNvSpPr>
+            <a:spLocks noGrp="1"/>
+          </p:cNvSpPr>
+          <p:nvPr>
+            <p:ph type="sldNum" sz="quarter" idx="5"/>
+          </p:nvPr>
+        </p:nvSpPr>
+        <p:spPr>
+          <a:xfrm>
+            <a:off x="3884613" y="8685213"/>
+            <a:ext cx="2971800" cy="457200"/>
+          </a:xfrm>
+          <a:prstGeom prst="rect">
+            <a:avLst/>
+          </a:prstGeom>
+        </p:spPr>
+        <p:txBody>
+          <a:bodyPr vert="horz" lIns="91440" tIns="45720" rIns="91440" bIns="45720" rtlCol="0" anchor="b"/>
+          <a:lstStyle>
+            <a:lvl1pPr algn="r">
+              <a:defRPr sz="1200"/>
+            </a:lvl1pPr>
+          </a:lstStyle>
+          <a:p>
+            <a:fld id="{C14EAC13-16BE-4E85-9F32-63F284C84B82}" type="slidenum">
+              <a:rPr lang="en-US" smtClean="0"/>
+              <a:t>‹#›</a:t>
+            </a:fld>
+            <a:endParaRPr lang="en-US"/>
+          </a:p>
+        </p:txBody>
+      </p:sp>
+    </p:spTree>
+    <p:extLst>
+      <p:ext uri="{BB962C8B-B14F-4D97-AF65-F5344CB8AC3E}">
+        <p14:creationId xmlns:p14="http://schemas.microsoft.com/office/powerpoint/2010/main" val="2698260462"/>
+      </p:ext>
+    </p:extLst>
+  </p:cSld>
+  <p:clrMap bg1="lt1" tx1="dk1" bg2="lt2" tx2="dk2" accent1="accent1" accent2="accent2" accent3="accent3" accent4="accent4" accent5="accent5" accent6="accent6" hlink="hlink" folHlink="folHlink"/>
+  <p:notesStyle>
+    <a:lvl1pPr marL="0" algn="l" defTabSz="914400" rtl="0" eaLnBrk="1" latinLnBrk="0" hangingPunct="1">
+      <a:defRPr sz="1200" kern="1200">
+        <a:solidFill>
+          <a:schemeClr val="tx1"/>
+        </a:solidFill>
+        <a:latin typeface="+mn-lt"/>
+        <a:ea typeface="+mn-ea"/>
+        <a:cs typeface="+mn-cs"/>
+      </a:defRPr>
+    </a:lvl1pPr>
+    <a:lvl2pPr marL="457200" algn="l" defTabSz="914400" rtl="0" eaLnBrk="1" latinLnBrk="0" hangingPunct="1">
+      <a:defRPr sz="1200" kern="1200">
+        <a:solidFill>
+          <a:schemeClr val="tx1"/>
+        </a:solidFill>
+        <a:latin typeface="+mn-lt"/>
+        <a:ea typeface="+mn-ea"/>
+        <a:cs typeface="+mn-cs"/>
+      </a:defRPr>
+    </a:lvl2pPr>
+    <a:lvl3pPr marL="914400" algn="l" defTabSz="914400" rtl="0" eaLnBrk="1" latinLnBrk="0" hangingPunct="1">
+      <a:defRPr sz="1200" kern="1200">
+        <a:solidFill>
+          <a:schemeClr val="tx1"/>
+        </a:solidFill>
+        <a:latin typeface="+mn-lt"/>
+        <a:ea typeface="+mn-ea"/>
+        <a:cs typeface="+mn-cs"/>
+      </a:defRPr>
+    </a:lvl3pPr>
+    <a:lvl4pPr marL="1371600" algn="l" defTabSz="914400" rtl="0" eaLnBrk="1" latinLnBrk="0" hangingPunct="1">
+      <a:defRPr sz="1200" kern="1200">
+        <a:solidFill>
+          <a:schemeClr val="tx1"/>
+        </a:solidFill>
+        <a:latin typeface="+mn-lt"/>
+        <a:ea typeface="+mn-ea"/>
+        <a:cs typeface="+mn-cs"/>
+      </a:defRPr>
+    </a:lvl4pPr>
+    <a:lvl5pPr marL="1828800" algn="l" defTabSz="914400" rtl="0" eaLnBrk="1" latinLnBrk="0" hangingPunct="1">
+      <a:defRPr sz="1200" kern="1200">
+        <a:solidFill>
+          <a:schemeClr val="tx1"/>
+        </a:solidFill>
+        <a:latin typeface="+mn-lt"/>
+        <a:ea typeface="+mn-ea"/>
+        <a:cs typeface="+mn-cs"/>
+      </a:defRPr>
+    </a:lvl5pPr>
+    <a:lvl6pPr marL="2286000" algn="l" defTabSz="914400" rtl="0" eaLnBrk="1" latinLnBrk="0" hangingPunct="1">
+      <a:defRPr sz="1200" kern="1200">
+        <a:solidFill>
+          <a:schemeClr val="tx1"/>
+        </a:solidFill>
+        <a:latin typeface="+mn-lt"/>
+        <a:ea typeface="+mn-ea"/>
+        <a:cs typeface="+mn-cs"/>
+      </a:defRPr>
+    </a:lvl6pPr>
+    <a:lvl7pPr marL="2743200" algn="l" defTabSz="914400" rtl="0" eaLnBrk="1" latinLnBrk="0" hangingPunct="1">
+      <a:defRPr sz="1200" kern="1200">
+        <a:solidFill>
+          <a:schemeClr val="tx1"/>
+        </a:solidFill>
+        <a:latin typeface="+mn-lt"/>
+        <a:ea typeface="+mn-ea"/>
+        <a:cs typeface="+mn-cs"/>
+      </a:defRPr>
+    </a:lvl7pPr>
+    <a:lvl8pPr marL="3200400" algn="l" defTabSz="914400" rtl="0" eaLnBrk="1" latinLnBrk="0" hangingPunct="1">
+      <a:defRPr sz="1200" kern="1200">
+        <a:solidFill>
+          <a:schemeClr val="tx1"/>
+        </a:solidFill>
+        <a:latin typeface="+mn-lt"/>
+        <a:ea typeface="+mn-ea"/>
+        <a:cs typeface="+mn-cs"/>
+      </a:defRPr>
+    </a:lvl8pPr>
+    <a:lvl9pPr marL="3657600" algn="l" defTabSz="914400" rtl="0" eaLnBrk="1" latinLnBrk="0" hangingPunct="1">
+      <a:defRPr sz="1200" kern="1200">
+        <a:solidFill>
+          <a:schemeClr val="tx1"/>
+        </a:solidFill>
+        <a:latin typeface="+mn-lt"/>
+        <a:ea typeface="+mn-ea"/>
+        <a:cs typeface="+mn-cs"/>
+      </a:defRPr>
+    </a:lvl9pPr>
+  </p:notesStyle>
+</p:notesMaster>
+</file>
+
+<file path=ppt/notesSlides/notesSlide1.xml><?xml version="1.0" encoding="utf-8"?>
+<p:notes xmlns:a="http://schemas.openxmlformats.org/drawingml/2006/main" xmlns:r="http://schemas.openxmlformats.org/officeDocument/2006/relationships" xmlns:p="http://schemas.openxmlformats.org/presentationml/2006/main">
+  <p:cSld>
+    <p:spTree>
+      <p:nvGrpSpPr>
+        <p:cNvPr id="1" name=""/>
+        <p:cNvGrpSpPr/>
+        <p:nvPr/>
+      </p:nvGrpSpPr>
+      <p:grpSpPr>
+        <a:xfrm>
+          <a:off x="0" y="0"/>
+          <a:ext cx="0" cy="0"/>
+          <a:chOff x="0" y="0"/>
+          <a:chExt cx="0" cy="0"/>
+        </a:xfrm>
+      </p:grpSpPr>
+      <p:sp>
+        <p:nvSpPr>
+          <p:cNvPr id="2" name="Slide Image Placeholder 1"/>
+          <p:cNvSpPr>
+            <a:spLocks noGrp="1" noRot="1" noChangeAspect="1"/>
+          </p:cNvSpPr>
+          <p:nvPr>
+            <p:ph type="sldImg"/>
+          </p:nvPr>
+        </p:nvSpPr>
+        <p:spPr/>
+      </p:sp>
+      <p:sp>
+        <p:nvSpPr>
+          <p:cNvPr id="3" name="Notes Placeholder 2"/>
+          <p:cNvSpPr>
+            <a:spLocks noGrp="1"/>
+          </p:cNvSpPr>
+          <p:nvPr>
+            <p:ph type="body" idx="1"/>
+          </p:nvPr>
+        </p:nvSpPr>
+        <p:spPr/>
+        <p:txBody>
+          <a:bodyPr/>
+          <a:lstStyle/>
+          <a:p>
+            <a:r>
+              <a:rPr lang="en-US" dirty="0" smtClean="0"/>
+              <a:t>“In the simplest terms, this is what our software does. We’ll go into more detail</a:t>
+            </a:r>
+            <a:r>
+              <a:rPr lang="en-US" baseline="0" dirty="0" smtClean="0"/>
+              <a:t> later.”</a:t>
+            </a:r>
+            <a:endParaRPr lang="en-US" dirty="0"/>
+          </a:p>
+        </p:txBody>
+      </p:sp>
+      <p:sp>
+        <p:nvSpPr>
+          <p:cNvPr id="4" name="Slide Number Placeholder 3"/>
+          <p:cNvSpPr>
+            <a:spLocks noGrp="1"/>
+          </p:cNvSpPr>
+          <p:nvPr>
+            <p:ph type="sldNum" sz="quarter" idx="10"/>
+          </p:nvPr>
+        </p:nvSpPr>
+        <p:spPr/>
+        <p:txBody>
+          <a:bodyPr/>
+          <a:lstStyle/>
+          <a:p>
+            <a:fld id="{C14EAC13-16BE-4E85-9F32-63F284C84B82}" type="slidenum">
+              <a:rPr lang="en-US" smtClean="0"/>
+              <a:t>5</a:t>
+            </a:fld>
+            <a:endParaRPr lang="en-US"/>
+          </a:p>
+        </p:txBody>
+      </p:sp>
+    </p:spTree>
+    <p:extLst>
+      <p:ext uri="{BB962C8B-B14F-4D97-AF65-F5344CB8AC3E}">
+        <p14:creationId xmlns:p14="http://schemas.microsoft.com/office/powerpoint/2010/main" val="762622578"/>
+      </p:ext>
+    </p:extLst>
+  </p:cSld>
+  <p:clrMapOvr>
+    <a:masterClrMapping/>
+  </p:clrMapOvr>
+</p:notes>
+</file>
+
+<file path=ppt/notesSlides/notesSlide2.xml><?xml version="1.0" encoding="utf-8"?>
+<p:notes xmlns:a="http://schemas.openxmlformats.org/drawingml/2006/main" xmlns:r="http://schemas.openxmlformats.org/officeDocument/2006/relationships" xmlns:p="http://schemas.openxmlformats.org/presentationml/2006/main">
+  <p:cSld>
+    <p:spTree>
+      <p:nvGrpSpPr>
+        <p:cNvPr id="1" name=""/>
+        <p:cNvGrpSpPr/>
+        <p:nvPr/>
+      </p:nvGrpSpPr>
+      <p:grpSpPr>
+        <a:xfrm>
+          <a:off x="0" y="0"/>
+          <a:ext cx="0" cy="0"/>
+          <a:chOff x="0" y="0"/>
+          <a:chExt cx="0" cy="0"/>
+        </a:xfrm>
+      </p:grpSpPr>
+      <p:sp>
+        <p:nvSpPr>
+          <p:cNvPr id="2" name="Slide Image Placeholder 1"/>
+          <p:cNvSpPr>
+            <a:spLocks noGrp="1" noRot="1" noChangeAspect="1"/>
+          </p:cNvSpPr>
+          <p:nvPr>
+            <p:ph type="sldImg"/>
+          </p:nvPr>
+        </p:nvSpPr>
+        <p:spPr/>
+      </p:sp>
+      <p:sp>
+        <p:nvSpPr>
+          <p:cNvPr id="3" name="Notes Placeholder 2"/>
+          <p:cNvSpPr>
+            <a:spLocks noGrp="1"/>
+          </p:cNvSpPr>
+          <p:nvPr>
+            <p:ph type="body" idx="1"/>
+          </p:nvPr>
+        </p:nvSpPr>
+        <p:spPr/>
+        <p:txBody>
+          <a:bodyPr/>
+          <a:lstStyle/>
+          <a:p>
+            <a:r>
+              <a:rPr lang="en-US" dirty="0" smtClean="0"/>
+              <a:t>“You’re all probably familiar with this already.”</a:t>
+            </a:r>
+            <a:endParaRPr lang="en-US" dirty="0"/>
+          </a:p>
+        </p:txBody>
+      </p:sp>
+      <p:sp>
+        <p:nvSpPr>
+          <p:cNvPr id="4" name="Slide Number Placeholder 3"/>
+          <p:cNvSpPr>
+            <a:spLocks noGrp="1"/>
+          </p:cNvSpPr>
+          <p:nvPr>
+            <p:ph type="sldNum" sz="quarter" idx="10"/>
+          </p:nvPr>
+        </p:nvSpPr>
+        <p:spPr/>
+        <p:txBody>
+          <a:bodyPr/>
+          <a:lstStyle/>
+          <a:p>
+            <a:fld id="{C14EAC13-16BE-4E85-9F32-63F284C84B82}" type="slidenum">
+              <a:rPr lang="en-US" smtClean="0"/>
+              <a:t>6</a:t>
+            </a:fld>
+            <a:endParaRPr lang="en-US"/>
+          </a:p>
+        </p:txBody>
+      </p:sp>
+    </p:spTree>
+    <p:extLst>
+      <p:ext uri="{BB962C8B-B14F-4D97-AF65-F5344CB8AC3E}">
+        <p14:creationId xmlns:p14="http://schemas.microsoft.com/office/powerpoint/2010/main" val="1602265411"/>
+      </p:ext>
+    </p:extLst>
+  </p:cSld>
+  <p:clrMapOvr>
+    <a:masterClrMapping/>
+  </p:clrMapOvr>
+</p:notes>
+</file>
+
+<file path=ppt/notesSlides/notesSlide3.xml><?xml version="1.0" encoding="utf-8"?>
+<p:notes xmlns:a="http://schemas.openxmlformats.org/drawingml/2006/main" xmlns:r="http://schemas.openxmlformats.org/officeDocument/2006/relationships" xmlns:p="http://schemas.openxmlformats.org/presentationml/2006/main">
+  <p:cSld>
+    <p:spTree>
+      <p:nvGrpSpPr>
+        <p:cNvPr id="1" name=""/>
+        <p:cNvGrpSpPr/>
+        <p:nvPr/>
+      </p:nvGrpSpPr>
+      <p:grpSpPr>
+        <a:xfrm>
+          <a:off x="0" y="0"/>
+          <a:ext cx="0" cy="0"/>
+          <a:chOff x="0" y="0"/>
+          <a:chExt cx="0" cy="0"/>
+        </a:xfrm>
+      </p:grpSpPr>
+      <p:sp>
+        <p:nvSpPr>
+          <p:cNvPr id="2" name="Slide Image Placeholder 1"/>
+          <p:cNvSpPr>
+            <a:spLocks noGrp="1" noRot="1" noChangeAspect="1"/>
+          </p:cNvSpPr>
+          <p:nvPr>
+            <p:ph type="sldImg"/>
+          </p:nvPr>
+        </p:nvSpPr>
+        <p:spPr/>
+      </p:sp>
+      <p:sp>
+        <p:nvSpPr>
+          <p:cNvPr id="3" name="Notes Placeholder 2"/>
+          <p:cNvSpPr>
+            <a:spLocks noGrp="1"/>
+          </p:cNvSpPr>
+          <p:nvPr>
+            <p:ph type="body" idx="1"/>
+          </p:nvPr>
+        </p:nvSpPr>
+        <p:spPr/>
+        <p:txBody>
+          <a:bodyPr/>
+          <a:lstStyle/>
+          <a:p>
+            <a:r>
+              <a:rPr lang="en-US" dirty="0" smtClean="0"/>
+              <a:t>“This is the </a:t>
+            </a:r>
+            <a:r>
+              <a:rPr lang="en-US" dirty="0" err="1" smtClean="0"/>
+              <a:t>NetBeans</a:t>
+            </a:r>
+            <a:r>
+              <a:rPr lang="en-US" dirty="0" smtClean="0"/>
+              <a:t> GUI editor. We were able to design this in a WYSIWYG environment.</a:t>
+            </a:r>
+            <a:r>
+              <a:rPr lang="en-US" baseline="0" dirty="0" smtClean="0"/>
+              <a:t> The highlighted pane is where our main controller class will go, which uses handwritten code.”</a:t>
+            </a:r>
+            <a:endParaRPr lang="en-US" dirty="0"/>
+          </a:p>
+        </p:txBody>
+      </p:sp>
+      <p:sp>
+        <p:nvSpPr>
+          <p:cNvPr id="4" name="Slide Number Placeholder 3"/>
+          <p:cNvSpPr>
+            <a:spLocks noGrp="1"/>
+          </p:cNvSpPr>
+          <p:nvPr>
+            <p:ph type="sldNum" sz="quarter" idx="10"/>
+          </p:nvPr>
+        </p:nvSpPr>
+        <p:spPr/>
+        <p:txBody>
+          <a:bodyPr/>
+          <a:lstStyle/>
+          <a:p>
+            <a:fld id="{C14EAC13-16BE-4E85-9F32-63F284C84B82}" type="slidenum">
+              <a:rPr lang="en-US" smtClean="0"/>
+              <a:t>7</a:t>
+            </a:fld>
+            <a:endParaRPr lang="en-US"/>
+          </a:p>
+        </p:txBody>
+      </p:sp>
+    </p:spTree>
+    <p:extLst>
+      <p:ext uri="{BB962C8B-B14F-4D97-AF65-F5344CB8AC3E}">
+        <p14:creationId xmlns:p14="http://schemas.microsoft.com/office/powerpoint/2010/main" val="3572707574"/>
+      </p:ext>
+    </p:extLst>
+  </p:cSld>
+  <p:clrMapOvr>
+    <a:masterClrMapping/>
+  </p:clrMapOvr>
+</p:notes>
+</file>
+
+<file path=ppt/notesSlides/notesSlide4.xml><?xml version="1.0" encoding="utf-8"?>
+<p:notes xmlns:a="http://schemas.openxmlformats.org/drawingml/2006/main" xmlns:r="http://schemas.openxmlformats.org/officeDocument/2006/relationships" xmlns:p="http://schemas.openxmlformats.org/presentationml/2006/main">
+  <p:cSld>
+    <p:spTree>
+      <p:nvGrpSpPr>
+        <p:cNvPr id="1" name=""/>
+        <p:cNvGrpSpPr/>
+        <p:nvPr/>
+      </p:nvGrpSpPr>
+      <p:grpSpPr>
+        <a:xfrm>
+          <a:off x="0" y="0"/>
+          <a:ext cx="0" cy="0"/>
+          <a:chOff x="0" y="0"/>
+          <a:chExt cx="0" cy="0"/>
+        </a:xfrm>
+      </p:grpSpPr>
+      <p:sp>
+        <p:nvSpPr>
+          <p:cNvPr id="2" name="Slide Image Placeholder 1"/>
+          <p:cNvSpPr>
+            <a:spLocks noGrp="1" noRot="1" noChangeAspect="1"/>
+          </p:cNvSpPr>
+          <p:nvPr>
+            <p:ph type="sldImg"/>
+          </p:nvPr>
+        </p:nvSpPr>
+        <p:spPr/>
+      </p:sp>
+      <p:sp>
+        <p:nvSpPr>
+          <p:cNvPr id="3" name="Notes Placeholder 2"/>
+          <p:cNvSpPr>
+            <a:spLocks noGrp="1"/>
+          </p:cNvSpPr>
+          <p:nvPr>
+            <p:ph type="body" idx="1"/>
+          </p:nvPr>
+        </p:nvSpPr>
+        <p:spPr/>
+        <p:txBody>
+          <a:bodyPr/>
+          <a:lstStyle/>
+          <a:p>
+            <a:r>
+              <a:rPr lang="en-US" dirty="0" smtClean="0"/>
+              <a:t>I’m just going to briefly explain everything here.</a:t>
+            </a:r>
+            <a:endParaRPr lang="en-US" dirty="0"/>
+          </a:p>
+        </p:txBody>
+      </p:sp>
+      <p:sp>
+        <p:nvSpPr>
+          <p:cNvPr id="4" name="Slide Number Placeholder 3"/>
+          <p:cNvSpPr>
+            <a:spLocks noGrp="1"/>
+          </p:cNvSpPr>
+          <p:nvPr>
+            <p:ph type="sldNum" sz="quarter" idx="10"/>
+          </p:nvPr>
+        </p:nvSpPr>
+        <p:spPr/>
+        <p:txBody>
+          <a:bodyPr/>
+          <a:lstStyle/>
+          <a:p>
+            <a:fld id="{C14EAC13-16BE-4E85-9F32-63F284C84B82}" type="slidenum">
+              <a:rPr lang="en-US" smtClean="0"/>
+              <a:t>8</a:t>
+            </a:fld>
+            <a:endParaRPr lang="en-US"/>
+          </a:p>
+        </p:txBody>
+      </p:sp>
+    </p:spTree>
+    <p:extLst>
+      <p:ext uri="{BB962C8B-B14F-4D97-AF65-F5344CB8AC3E}">
+        <p14:creationId xmlns:p14="http://schemas.microsoft.com/office/powerpoint/2010/main" val="2857985355"/>
+      </p:ext>
+    </p:extLst>
+  </p:cSld>
+  <p:clrMapOvr>
+    <a:masterClrMapping/>
+  </p:clrMapOvr>
+</p:notes>
+</file>
+
+<file path=ppt/notesSlides/notesSlide5.xml><?xml version="1.0" encoding="utf-8"?>
+<p:notes xmlns:a="http://schemas.openxmlformats.org/drawingml/2006/main" xmlns:r="http://schemas.openxmlformats.org/officeDocument/2006/relationships" xmlns:p="http://schemas.openxmlformats.org/presentationml/2006/main">
+  <p:cSld>
+    <p:spTree>
+      <p:nvGrpSpPr>
+        <p:cNvPr id="1" name=""/>
+        <p:cNvGrpSpPr/>
+        <p:nvPr/>
+      </p:nvGrpSpPr>
+      <p:grpSpPr>
+        <a:xfrm>
+          <a:off x="0" y="0"/>
+          <a:ext cx="0" cy="0"/>
+          <a:chOff x="0" y="0"/>
+          <a:chExt cx="0" cy="0"/>
+        </a:xfrm>
+      </p:grpSpPr>
+      <p:sp>
+        <p:nvSpPr>
+          <p:cNvPr id="2" name="Slide Image Placeholder 1"/>
+          <p:cNvSpPr>
+            <a:spLocks noGrp="1" noRot="1" noChangeAspect="1"/>
+          </p:cNvSpPr>
+          <p:nvPr>
+            <p:ph type="sldImg"/>
+          </p:nvPr>
+        </p:nvSpPr>
+        <p:spPr/>
+      </p:sp>
+      <p:sp>
+        <p:nvSpPr>
+          <p:cNvPr id="3" name="Notes Placeholder 2"/>
+          <p:cNvSpPr>
+            <a:spLocks noGrp="1"/>
+          </p:cNvSpPr>
+          <p:nvPr>
+            <p:ph type="body" idx="1"/>
+          </p:nvPr>
+        </p:nvSpPr>
+        <p:spPr/>
+        <p:txBody>
+          <a:bodyPr/>
+          <a:lstStyle/>
+          <a:p>
+            <a:r>
+              <a:rPr lang="en-US" dirty="0" smtClean="0"/>
+              <a:t>I’m just going to briefly go over</a:t>
+            </a:r>
+            <a:r>
+              <a:rPr lang="en-US" baseline="0" dirty="0" smtClean="0"/>
+              <a:t> some of the things that gave us </a:t>
+            </a:r>
+            <a:r>
+              <a:rPr lang="en-US" baseline="0" smtClean="0"/>
+              <a:t>(me) the </a:t>
+            </a:r>
+            <a:r>
+              <a:rPr lang="en-US" baseline="0" dirty="0" smtClean="0"/>
+              <a:t>most trouble.</a:t>
+            </a:r>
+            <a:endParaRPr lang="en-US" dirty="0"/>
+          </a:p>
+        </p:txBody>
+      </p:sp>
+      <p:sp>
+        <p:nvSpPr>
+          <p:cNvPr id="4" name="Slide Number Placeholder 3"/>
+          <p:cNvSpPr>
+            <a:spLocks noGrp="1"/>
+          </p:cNvSpPr>
+          <p:nvPr>
+            <p:ph type="sldNum" sz="quarter" idx="10"/>
+          </p:nvPr>
+        </p:nvSpPr>
+        <p:spPr/>
+        <p:txBody>
+          <a:bodyPr/>
+          <a:lstStyle/>
+          <a:p>
+            <a:fld id="{C14EAC13-16BE-4E85-9F32-63F284C84B82}" type="slidenum">
+              <a:rPr lang="en-US" smtClean="0"/>
+              <a:t>9</a:t>
+            </a:fld>
+            <a:endParaRPr lang="en-US"/>
+          </a:p>
+        </p:txBody>
+      </p:sp>
+    </p:spTree>
+    <p:extLst>
+      <p:ext uri="{BB962C8B-B14F-4D97-AF65-F5344CB8AC3E}">
+        <p14:creationId xmlns:p14="http://schemas.microsoft.com/office/powerpoint/2010/main" val="3036325868"/>
+      </p:ext>
+    </p:extLst>
+  </p:cSld>
+  <p:clrMapOvr>
+    <a:masterClrMapping/>
+  </p:clrMapOvr>
+</p:notes>
 </file>
 
 <file path=ppt/slideLayouts/slideLayout1.xml><?xml version="1.0" encoding="utf-8"?>
@@ -642,7 +1468,7 @@
             <a:fld id="{B61BEF0D-F0BB-DE4B-95CE-6DB70DBA9567}" type="datetimeFigureOut">
               <a:rPr lang="en-US" smtClean="0"/>
               <a:pPr/>
-              <a:t>5/6/2014</a:t>
+              <a:t>5/7/2014</a:t>
             </a:fld>
             <a:endParaRPr lang="en-US" dirty="0"/>
           </a:p>
@@ -743,8 +1569,8 @@
             <a:noFill/>
           </a:ln>
           <a:extLst>
-            <a:ext uri="{91240B29-F687-4f45-9708-019B960494DF}">
-              <a14:hiddenLine xmlns:a14="http://schemas.microsoft.com/office/drawing/2010/main" xmlns="" w="9525">
+            <a:ext uri="{91240B29-F687-4F45-9708-019B960494DF}">
+              <a14:hiddenLine xmlns:a14="http://schemas.microsoft.com/office/drawing/2010/main" w="9525">
                 <a:solidFill>
                   <a:srgbClr val="000000"/>
                 </a:solidFill>
@@ -798,8 +1624,8 @@
             <a:noFill/>
           </a:ln>
           <a:extLst>
-            <a:ext uri="{91240B29-F687-4f45-9708-019B960494DF}">
-              <a14:hiddenLine xmlns:a14="http://schemas.microsoft.com/office/drawing/2010/main" xmlns="" w="9525">
+            <a:ext uri="{91240B29-F687-4F45-9708-019B960494DF}">
+              <a14:hiddenLine xmlns:a14="http://schemas.microsoft.com/office/drawing/2010/main" w="9525">
                 <a:solidFill>
                   <a:srgbClr val="000000"/>
                 </a:solidFill>
@@ -814,7 +1640,7 @@
     </p:spTree>
     <p:extLst>
       <p:ext uri="{BB962C8B-B14F-4D97-AF65-F5344CB8AC3E}">
-        <p14:creationId xmlns:p14="http://schemas.microsoft.com/office/powerpoint/2010/main" xmlns="" val="3302874319"/>
+        <p14:creationId xmlns:p14="http://schemas.microsoft.com/office/powerpoint/2010/main" val="3302874319"/>
       </p:ext>
     </p:extLst>
   </p:cSld>
@@ -1055,7 +1881,7 @@
             <a:fld id="{B61BEF0D-F0BB-DE4B-95CE-6DB70DBA9567}" type="datetimeFigureOut">
               <a:rPr lang="en-US" smtClean="0"/>
               <a:pPr/>
-              <a:t>5/6/2014</a:t>
+              <a:t>5/7/2014</a:t>
             </a:fld>
             <a:endParaRPr lang="en-US" dirty="0"/>
           </a:p>
@@ -1107,7 +1933,7 @@
     </p:spTree>
     <p:extLst>
       <p:ext uri="{BB962C8B-B14F-4D97-AF65-F5344CB8AC3E}">
-        <p14:creationId xmlns:p14="http://schemas.microsoft.com/office/powerpoint/2010/main" xmlns="" val="1717203686"/>
+        <p14:creationId xmlns:p14="http://schemas.microsoft.com/office/powerpoint/2010/main" val="1717203686"/>
       </p:ext>
     </p:extLst>
   </p:cSld>
@@ -1305,7 +2131,7 @@
             <a:fld id="{B61BEF0D-F0BB-DE4B-95CE-6DB70DBA9567}" type="datetimeFigureOut">
               <a:rPr lang="en-US" smtClean="0"/>
               <a:pPr/>
-              <a:t>5/6/2014</a:t>
+              <a:t>5/7/2014</a:t>
             </a:fld>
             <a:endParaRPr lang="en-US" dirty="0"/>
           </a:p>
@@ -1357,7 +2183,7 @@
     </p:spTree>
     <p:extLst>
       <p:ext uri="{BB962C8B-B14F-4D97-AF65-F5344CB8AC3E}">
-        <p14:creationId xmlns:p14="http://schemas.microsoft.com/office/powerpoint/2010/main" xmlns="" val="2462506097"/>
+        <p14:creationId xmlns:p14="http://schemas.microsoft.com/office/powerpoint/2010/main" val="2462506097"/>
       </p:ext>
     </p:extLst>
   </p:cSld>
@@ -1847,7 +2673,7 @@
             <a:fld id="{B61BEF0D-F0BB-DE4B-95CE-6DB70DBA9567}" type="datetimeFigureOut">
               <a:rPr lang="en-US" smtClean="0"/>
               <a:pPr/>
-              <a:t>5/6/2014</a:t>
+              <a:t>5/7/2014</a:t>
             </a:fld>
             <a:endParaRPr lang="en-US" dirty="0"/>
           </a:p>
@@ -1899,7 +2725,7 @@
     </p:spTree>
     <p:extLst>
       <p:ext uri="{BB962C8B-B14F-4D97-AF65-F5344CB8AC3E}">
-        <p14:creationId xmlns:p14="http://schemas.microsoft.com/office/powerpoint/2010/main" xmlns="" val="2570049524"/>
+        <p14:creationId xmlns:p14="http://schemas.microsoft.com/office/powerpoint/2010/main" val="2570049524"/>
       </p:ext>
     </p:extLst>
   </p:cSld>
@@ -2097,7 +2923,7 @@
             <a:fld id="{B61BEF0D-F0BB-DE4B-95CE-6DB70DBA9567}" type="datetimeFigureOut">
               <a:rPr lang="en-US" smtClean="0"/>
               <a:pPr/>
-              <a:t>5/6/2014</a:t>
+              <a:t>5/7/2014</a:t>
             </a:fld>
             <a:endParaRPr lang="en-US" dirty="0"/>
           </a:p>
@@ -2149,7 +2975,7 @@
     </p:spTree>
     <p:extLst>
       <p:ext uri="{BB962C8B-B14F-4D97-AF65-F5344CB8AC3E}">
-        <p14:creationId xmlns:p14="http://schemas.microsoft.com/office/powerpoint/2010/main" xmlns="" val="3648804200"/>
+        <p14:creationId xmlns:p14="http://schemas.microsoft.com/office/powerpoint/2010/main" val="3648804200"/>
       </p:ext>
     </p:extLst>
   </p:cSld>
@@ -2631,7 +3457,7 @@
             <a:fld id="{B61BEF0D-F0BB-DE4B-95CE-6DB70DBA9567}" type="datetimeFigureOut">
               <a:rPr lang="en-US" smtClean="0"/>
               <a:pPr/>
-              <a:t>5/6/2014</a:t>
+              <a:t>5/7/2014</a:t>
             </a:fld>
             <a:endParaRPr lang="en-US" dirty="0"/>
           </a:p>
@@ -2683,7 +3509,7 @@
     </p:spTree>
     <p:extLst>
       <p:ext uri="{BB962C8B-B14F-4D97-AF65-F5344CB8AC3E}">
-        <p14:creationId xmlns:p14="http://schemas.microsoft.com/office/powerpoint/2010/main" xmlns="" val="1903447461"/>
+        <p14:creationId xmlns:p14="http://schemas.microsoft.com/office/powerpoint/2010/main" val="1903447461"/>
       </p:ext>
     </p:extLst>
   </p:cSld>
@@ -2930,7 +3756,7 @@
             <a:fld id="{B61BEF0D-F0BB-DE4B-95CE-6DB70DBA9567}" type="datetimeFigureOut">
               <a:rPr lang="en-US" smtClean="0"/>
               <a:pPr/>
-              <a:t>5/6/2014</a:t>
+              <a:t>5/7/2014</a:t>
             </a:fld>
             <a:endParaRPr lang="en-US" dirty="0"/>
           </a:p>
@@ -2982,7 +3808,7 @@
     </p:spTree>
     <p:extLst>
       <p:ext uri="{BB962C8B-B14F-4D97-AF65-F5344CB8AC3E}">
-        <p14:creationId xmlns:p14="http://schemas.microsoft.com/office/powerpoint/2010/main" xmlns="" val="2584954959"/>
+        <p14:creationId xmlns:p14="http://schemas.microsoft.com/office/powerpoint/2010/main" val="2584954959"/>
       </p:ext>
     </p:extLst>
   </p:cSld>
@@ -3106,7 +3932,7 @@
             <a:fld id="{B61BEF0D-F0BB-DE4B-95CE-6DB70DBA9567}" type="datetimeFigureOut">
               <a:rPr lang="en-US" smtClean="0"/>
               <a:pPr/>
-              <a:t>5/6/2014</a:t>
+              <a:t>5/7/2014</a:t>
             </a:fld>
             <a:endParaRPr lang="en-US" dirty="0"/>
           </a:p>
@@ -3158,7 +3984,7 @@
     </p:spTree>
     <p:extLst>
       <p:ext uri="{BB962C8B-B14F-4D97-AF65-F5344CB8AC3E}">
-        <p14:creationId xmlns:p14="http://schemas.microsoft.com/office/powerpoint/2010/main" xmlns="" val="3105936072"/>
+        <p14:creationId xmlns:p14="http://schemas.microsoft.com/office/powerpoint/2010/main" val="3105936072"/>
       </p:ext>
     </p:extLst>
   </p:cSld>
@@ -3288,7 +4114,7 @@
             <a:fld id="{B61BEF0D-F0BB-DE4B-95CE-6DB70DBA9567}" type="datetimeFigureOut">
               <a:rPr lang="en-US" smtClean="0"/>
               <a:pPr/>
-              <a:t>5/6/2014</a:t>
+              <a:t>5/7/2014</a:t>
             </a:fld>
             <a:endParaRPr lang="en-US" dirty="0"/>
           </a:p>
@@ -3340,7 +4166,7 @@
     </p:spTree>
     <p:extLst>
       <p:ext uri="{BB962C8B-B14F-4D97-AF65-F5344CB8AC3E}">
-        <p14:creationId xmlns:p14="http://schemas.microsoft.com/office/powerpoint/2010/main" xmlns="" val="2358067853"/>
+        <p14:creationId xmlns:p14="http://schemas.microsoft.com/office/powerpoint/2010/main" val="2358067853"/>
       </p:ext>
     </p:extLst>
   </p:cSld>
@@ -3475,7 +4301,7 @@
             <a:fld id="{B61BEF0D-F0BB-DE4B-95CE-6DB70DBA9567}" type="datetimeFigureOut">
               <a:rPr lang="en-US" smtClean="0"/>
               <a:pPr/>
-              <a:t>5/6/2014</a:t>
+              <a:t>5/7/2014</a:t>
             </a:fld>
             <a:endParaRPr lang="en-US" dirty="0"/>
           </a:p>
@@ -3537,7 +4363,7 @@
     </p:spTree>
     <p:extLst>
       <p:ext uri="{BB962C8B-B14F-4D97-AF65-F5344CB8AC3E}">
-        <p14:creationId xmlns:p14="http://schemas.microsoft.com/office/powerpoint/2010/main" xmlns="" val="1986642893"/>
+        <p14:creationId xmlns:p14="http://schemas.microsoft.com/office/powerpoint/2010/main" val="1986642893"/>
       </p:ext>
     </p:extLst>
   </p:cSld>
@@ -3733,7 +4559,7 @@
             <a:fld id="{B61BEF0D-F0BB-DE4B-95CE-6DB70DBA9567}" type="datetimeFigureOut">
               <a:rPr lang="en-US" smtClean="0"/>
               <a:pPr/>
-              <a:t>5/6/2014</a:t>
+              <a:t>5/7/2014</a:t>
             </a:fld>
             <a:endParaRPr lang="en-US" dirty="0"/>
           </a:p>
@@ -3790,7 +4616,7 @@
     </p:spTree>
     <p:extLst>
       <p:ext uri="{BB962C8B-B14F-4D97-AF65-F5344CB8AC3E}">
-        <p14:creationId xmlns:p14="http://schemas.microsoft.com/office/powerpoint/2010/main" xmlns="" val="2963097456"/>
+        <p14:creationId xmlns:p14="http://schemas.microsoft.com/office/powerpoint/2010/main" val="2963097456"/>
       </p:ext>
     </p:extLst>
   </p:cSld>
@@ -4037,7 +4863,7 @@
             <a:fld id="{B61BEF0D-F0BB-DE4B-95CE-6DB70DBA9567}" type="datetimeFigureOut">
               <a:rPr lang="en-US" smtClean="0"/>
               <a:pPr/>
-              <a:t>5/6/2014</a:t>
+              <a:t>5/7/2014</a:t>
             </a:fld>
             <a:endParaRPr lang="en-US" dirty="0"/>
           </a:p>
@@ -4089,7 +4915,7 @@
     </p:spTree>
     <p:extLst>
       <p:ext uri="{BB962C8B-B14F-4D97-AF65-F5344CB8AC3E}">
-        <p14:creationId xmlns:p14="http://schemas.microsoft.com/office/powerpoint/2010/main" xmlns="" val="1059825076"/>
+        <p14:creationId xmlns:p14="http://schemas.microsoft.com/office/powerpoint/2010/main" val="1059825076"/>
       </p:ext>
     </p:extLst>
   </p:cSld>
@@ -4481,7 +5307,7 @@
             <a:fld id="{B61BEF0D-F0BB-DE4B-95CE-6DB70DBA9567}" type="datetimeFigureOut">
               <a:rPr lang="en-US" smtClean="0"/>
               <a:pPr/>
-              <a:t>5/6/2014</a:t>
+              <a:t>5/7/2014</a:t>
             </a:fld>
             <a:endParaRPr lang="en-US" dirty="0"/>
           </a:p>
@@ -4533,7 +5359,7 @@
     </p:spTree>
     <p:extLst>
       <p:ext uri="{BB962C8B-B14F-4D97-AF65-F5344CB8AC3E}">
-        <p14:creationId xmlns:p14="http://schemas.microsoft.com/office/powerpoint/2010/main" xmlns="" val="3178302943"/>
+        <p14:creationId xmlns:p14="http://schemas.microsoft.com/office/powerpoint/2010/main" val="3178302943"/>
       </p:ext>
     </p:extLst>
   </p:cSld>
@@ -4601,7 +5427,7 @@
             <a:fld id="{B61BEF0D-F0BB-DE4B-95CE-6DB70DBA9567}" type="datetimeFigureOut">
               <a:rPr lang="en-US" smtClean="0"/>
               <a:pPr/>
-              <a:t>5/6/2014</a:t>
+              <a:t>5/7/2014</a:t>
             </a:fld>
             <a:endParaRPr lang="en-US" dirty="0"/>
           </a:p>
@@ -4653,7 +5479,7 @@
     </p:spTree>
     <p:extLst>
       <p:ext uri="{BB962C8B-B14F-4D97-AF65-F5344CB8AC3E}">
-        <p14:creationId xmlns:p14="http://schemas.microsoft.com/office/powerpoint/2010/main" xmlns="" val="1598489277"/>
+        <p14:creationId xmlns:p14="http://schemas.microsoft.com/office/powerpoint/2010/main" val="1598489277"/>
       </p:ext>
     </p:extLst>
   </p:cSld>
@@ -4698,7 +5524,7 @@
             <a:fld id="{B61BEF0D-F0BB-DE4B-95CE-6DB70DBA9567}" type="datetimeFigureOut">
               <a:rPr lang="en-US" smtClean="0"/>
               <a:pPr/>
-              <a:t>5/6/2014</a:t>
+              <a:t>5/7/2014</a:t>
             </a:fld>
             <a:endParaRPr lang="en-US" dirty="0"/>
           </a:p>
@@ -4750,7 +5576,7 @@
     </p:spTree>
     <p:extLst>
       <p:ext uri="{BB962C8B-B14F-4D97-AF65-F5344CB8AC3E}">
-        <p14:creationId xmlns:p14="http://schemas.microsoft.com/office/powerpoint/2010/main" xmlns="" val="780724408"/>
+        <p14:creationId xmlns:p14="http://schemas.microsoft.com/office/powerpoint/2010/main" val="780724408"/>
       </p:ext>
     </p:extLst>
   </p:cSld>
@@ -4983,7 +5809,7 @@
             <a:fld id="{B61BEF0D-F0BB-DE4B-95CE-6DB70DBA9567}" type="datetimeFigureOut">
               <a:rPr lang="en-US" smtClean="0"/>
               <a:pPr/>
-              <a:t>5/6/2014</a:t>
+              <a:t>5/7/2014</a:t>
             </a:fld>
             <a:endParaRPr lang="en-US" dirty="0"/>
           </a:p>
@@ -5035,7 +5861,7 @@
     </p:spTree>
     <p:extLst>
       <p:ext uri="{BB962C8B-B14F-4D97-AF65-F5344CB8AC3E}">
-        <p14:creationId xmlns:p14="http://schemas.microsoft.com/office/powerpoint/2010/main" xmlns="" val="3935668395"/>
+        <p14:creationId xmlns:p14="http://schemas.microsoft.com/office/powerpoint/2010/main" val="3935668395"/>
       </p:ext>
     </p:extLst>
   </p:cSld>
@@ -5276,7 +6102,7 @@
             <a:fld id="{B61BEF0D-F0BB-DE4B-95CE-6DB70DBA9567}" type="datetimeFigureOut">
               <a:rPr lang="en-US" smtClean="0"/>
               <a:pPr/>
-              <a:t>5/6/2014</a:t>
+              <a:t>5/7/2014</a:t>
             </a:fld>
             <a:endParaRPr lang="en-US" dirty="0"/>
           </a:p>
@@ -5328,7 +6154,7 @@
     </p:spTree>
     <p:extLst>
       <p:ext uri="{BB962C8B-B14F-4D97-AF65-F5344CB8AC3E}">
-        <p14:creationId xmlns:p14="http://schemas.microsoft.com/office/powerpoint/2010/main" xmlns="" val="2218148649"/>
+        <p14:creationId xmlns:p14="http://schemas.microsoft.com/office/powerpoint/2010/main" val="2218148649"/>
       </p:ext>
     </p:extLst>
   </p:cSld>
@@ -5802,7 +6628,7 @@
             <a:fld id="{B61BEF0D-F0BB-DE4B-95CE-6DB70DBA9567}" type="datetimeFigureOut">
               <a:rPr lang="en-US" smtClean="0"/>
               <a:pPr/>
-              <a:t>5/6/2014</a:t>
+              <a:t>5/7/2014</a:t>
             </a:fld>
             <a:endParaRPr lang="en-US" dirty="0"/>
           </a:p>
@@ -5890,7 +6716,7 @@
     </p:spTree>
     <p:extLst>
       <p:ext uri="{BB962C8B-B14F-4D97-AF65-F5344CB8AC3E}">
-        <p14:creationId xmlns:p14="http://schemas.microsoft.com/office/powerpoint/2010/main" xmlns="" val="2907623968"/>
+        <p14:creationId xmlns:p14="http://schemas.microsoft.com/office/powerpoint/2010/main" val="2907623968"/>
       </p:ext>
     </p:extLst>
   </p:cSld>
@@ -6434,7 +7260,7 @@
     </p:spTree>
     <p:extLst>
       <p:ext uri="{BB962C8B-B14F-4D97-AF65-F5344CB8AC3E}">
-        <p14:creationId xmlns:p14="http://schemas.microsoft.com/office/powerpoint/2010/main" xmlns="" val="479819915"/>
+        <p14:creationId xmlns:p14="http://schemas.microsoft.com/office/powerpoint/2010/main" val="479819915"/>
       </p:ext>
     </p:extLst>
   </p:cSld>
@@ -6485,42 +7311,39 @@
           <a:p>
             <a:r>
               <a:rPr lang="en-US" dirty="0" smtClean="0"/>
-              <a:t>Debugging</a:t>
-            </a:r>
-            <a:endParaRPr lang="en-US" dirty="0"/>
-          </a:p>
-        </p:txBody>
-      </p:sp>
-      <p:graphicFrame>
-        <p:nvGraphicFramePr>
-          <p:cNvPr id="4" name="Object 3"/>
-          <p:cNvGraphicFramePr>
-            <a:graphicFrameLocks noChangeAspect="1"/>
-          </p:cNvGraphicFramePr>
-          <p:nvPr>
-            <p:extLst>
-              <p:ext uri="{D42A27DB-BD31-4B8C-83A1-F6EECF244321}">
-                <p14:modId xmlns:p14="http://schemas.microsoft.com/office/powerpoint/2010/main" xmlns="" val="2315985902"/>
-              </p:ext>
-            </p:extLst>
-          </p:nvPr>
-        </p:nvGraphicFramePr>
-        <p:xfrm>
-          <a:off x="703659" y="2350595"/>
-          <a:ext cx="8128000" cy="1484313"/>
-        </p:xfrm>
-        <a:graphic>
-          <a:graphicData uri="http://schemas.openxmlformats.org/presentationml/2006/ole">
-            <p:oleObj spid="_x0000_s3081" name="Image" r:id="rId3" imgW="17587302" imgH="3212698" progId="">
-              <p:embed/>
-            </p:oleObj>
-          </a:graphicData>
-        </a:graphic>
-      </p:graphicFrame>
+              <a:t>Lucas’s slides go after this</a:t>
+            </a:r>
+            <a:endParaRPr lang="en-US" dirty="0"/>
+          </a:p>
+        </p:txBody>
+      </p:sp>
+      <p:sp>
+        <p:nvSpPr>
+          <p:cNvPr id="3" name="Content Placeholder 2"/>
+          <p:cNvSpPr>
+            <a:spLocks noGrp="1"/>
+          </p:cNvSpPr>
+          <p:nvPr>
+            <p:ph idx="1"/>
+          </p:nvPr>
+        </p:nvSpPr>
+        <p:spPr/>
+        <p:txBody>
+          <a:bodyPr/>
+          <a:lstStyle/>
+          <a:p>
+            <a:r>
+              <a:rPr lang="en-US" dirty="0" smtClean="0"/>
+              <a:t>Lucas covers Architecture, predominately UML diagram’s and some descriptions</a:t>
+            </a:r>
+            <a:endParaRPr lang="en-US" dirty="0"/>
+          </a:p>
+        </p:txBody>
+      </p:sp>
     </p:spTree>
     <p:extLst>
       <p:ext uri="{BB962C8B-B14F-4D97-AF65-F5344CB8AC3E}">
-        <p14:creationId xmlns:p14="http://schemas.microsoft.com/office/powerpoint/2010/main" xmlns="" val="674115664"/>
+        <p14:creationId xmlns:p14="http://schemas.microsoft.com/office/powerpoint/2010/main" val="2503385107"/>
       </p:ext>
     </p:extLst>
   </p:cSld>
@@ -6571,7 +7394,7 @@
           <a:p>
             <a:r>
               <a:rPr lang="en-US" dirty="0" smtClean="0"/>
-              <a:t>Data</a:t>
+              <a:t>Structure</a:t>
             </a:r>
             <a:endParaRPr lang="en-US" dirty="0"/>
           </a:p>
@@ -6579,60 +7402,92 @@
       </p:sp>
       <p:graphicFrame>
         <p:nvGraphicFramePr>
-          <p:cNvPr id="5" name="Object 4"/>
+          <p:cNvPr id="4" name="Object 3"/>
           <p:cNvGraphicFramePr>
             <a:graphicFrameLocks noChangeAspect="1"/>
           </p:cNvGraphicFramePr>
           <p:nvPr>
             <p:extLst>
               <p:ext uri="{D42A27DB-BD31-4B8C-83A1-F6EECF244321}">
-                <p14:modId xmlns:p14="http://schemas.microsoft.com/office/powerpoint/2010/main" xmlns="" val="2424924107"/>
+                <p14:modId xmlns:p14="http://schemas.microsoft.com/office/powerpoint/2010/main" val="2583679832"/>
               </p:ext>
             </p:extLst>
           </p:nvPr>
         </p:nvGraphicFramePr>
         <p:xfrm>
-          <a:off x="1396774" y="2058656"/>
-          <a:ext cx="2565626" cy="4519719"/>
+          <a:off x="982133" y="2057907"/>
+          <a:ext cx="7602248" cy="4009607"/>
         </p:xfrm>
         <a:graphic>
           <a:graphicData uri="http://schemas.openxmlformats.org/presentationml/2006/ole">
-            <p:oleObj spid="_x0000_s4112" name="Image" r:id="rId3" imgW="4634921" imgH="8165079" progId="">
-              <p:embed/>
-            </p:oleObj>
-          </a:graphicData>
-        </a:graphic>
-      </p:graphicFrame>
-      <p:graphicFrame>
-        <p:nvGraphicFramePr>
-          <p:cNvPr id="6" name="Object 5"/>
-          <p:cNvGraphicFramePr>
-            <a:graphicFrameLocks noChangeAspect="1"/>
-          </p:cNvGraphicFramePr>
-          <p:nvPr>
-            <p:extLst>
-              <p:ext uri="{D42A27DB-BD31-4B8C-83A1-F6EECF244321}">
-                <p14:modId xmlns:p14="http://schemas.microsoft.com/office/powerpoint/2010/main" xmlns="" val="1863319881"/>
-              </p:ext>
-            </p:extLst>
-          </p:nvPr>
-        </p:nvGraphicFramePr>
-        <p:xfrm>
-          <a:off x="6331632" y="1160238"/>
-          <a:ext cx="1646237" cy="5418137"/>
-        </p:xfrm>
-        <a:graphic>
-          <a:graphicData uri="http://schemas.openxmlformats.org/presentationml/2006/ole">
-            <p:oleObj spid="_x0000_s4113" name="Image" r:id="rId4" imgW="3530159" imgH="11619048" progId="">
-              <p:embed/>
-            </p:oleObj>
+            <mc:AlternateContent xmlns:mc="http://schemas.openxmlformats.org/markup-compatibility/2006">
+              <mc:Choice xmlns:v="urn:schemas-microsoft-com:vml" Requires="v">
+                <p:oleObj spid="_x0000_s2059" name="Image" r:id="rId3" imgW="8596825" imgH="4533333" progId="">
+                  <p:embed/>
+                </p:oleObj>
+              </mc:Choice>
+              <mc:Fallback>
+                <p:oleObj name="Image" r:id="rId3" imgW="8596825" imgH="4533333" progId="">
+                  <p:embed/>
+                  <p:pic>
+                    <p:nvPicPr>
+                      <p:cNvPr id="0" name="Picture 9"/>
+                      <p:cNvPicPr>
+                        <a:picLocks noChangeAspect="1" noChangeArrowheads="1"/>
+                      </p:cNvPicPr>
+                      <p:nvPr/>
+                    </p:nvPicPr>
+                    <p:blipFill>
+                      <a:blip r:embed="rId4">
+                        <a:extLst>
+                          <a:ext uri="{28A0092B-C50C-407E-A947-70E740481C1C}">
+                            <a14:useLocalDpi xmlns:a14="http://schemas.microsoft.com/office/drawing/2010/main" val="0"/>
+                          </a:ext>
+                        </a:extLst>
+                      </a:blip>
+                      <a:srcRect/>
+                      <a:stretch>
+                        <a:fillRect/>
+                      </a:stretch>
+                    </p:blipFill>
+                    <p:spPr bwMode="auto">
+                      <a:xfrm>
+                        <a:off x="982133" y="2057907"/>
+                        <a:ext cx="7602248" cy="4009607"/>
+                      </a:xfrm>
+                      <a:prstGeom prst="rect">
+                        <a:avLst/>
+                      </a:prstGeom>
+                      <a:noFill/>
+                      <a:ln w="12700">
+                        <a:solidFill>
+                          <a:schemeClr val="tx1"/>
+                        </a:solidFill>
+                        <a:miter lim="800000"/>
+                        <a:headEnd/>
+                        <a:tailEnd/>
+                      </a:ln>
+                      <a:extLst>
+                        <a:ext uri="{909E8E84-426E-40DD-AFC4-6F175D3DCCD1}">
+                          <a14:hiddenFill xmlns:a14="http://schemas.microsoft.com/office/drawing/2010/main">
+                            <a:solidFill>
+                              <a:srgbClr val="FFFFFF"/>
+                            </a:solidFill>
+                          </a14:hiddenFill>
+                        </a:ext>
+                      </a:extLst>
+                    </p:spPr>
+                  </p:pic>
+                </p:oleObj>
+              </mc:Fallback>
+            </mc:AlternateContent>
           </a:graphicData>
         </a:graphic>
       </p:graphicFrame>
     </p:spTree>
     <p:extLst>
       <p:ext uri="{BB962C8B-B14F-4D97-AF65-F5344CB8AC3E}">
-        <p14:creationId xmlns:p14="http://schemas.microsoft.com/office/powerpoint/2010/main" xmlns="" val="2375152149"/>
+        <p14:creationId xmlns:p14="http://schemas.microsoft.com/office/powerpoint/2010/main" val="4097840335"/>
       </p:ext>
     </p:extLst>
   </p:cSld>
@@ -6666,35 +7521,9 @@
           <a:chExt cx="0" cy="0"/>
         </a:xfrm>
       </p:grpSpPr>
-      <p:graphicFrame>
-        <p:nvGraphicFramePr>
-          <p:cNvPr id="4" name="Object 3"/>
-          <p:cNvGraphicFramePr>
-            <a:graphicFrameLocks noChangeAspect="1"/>
-          </p:cNvGraphicFramePr>
-          <p:nvPr>
-            <p:extLst>
-              <p:ext uri="{D42A27DB-BD31-4B8C-83A1-F6EECF244321}">
-                <p14:modId xmlns:p14="http://schemas.microsoft.com/office/powerpoint/2010/main" xmlns="" val="1944986822"/>
-              </p:ext>
-            </p:extLst>
-          </p:nvPr>
-        </p:nvGraphicFramePr>
-        <p:xfrm>
-          <a:off x="1128260" y="1902534"/>
-          <a:ext cx="5388655" cy="4811004"/>
-        </p:xfrm>
-        <a:graphic>
-          <a:graphicData uri="http://schemas.openxmlformats.org/presentationml/2006/ole">
-            <p:oleObj spid="_x0000_s5129" name="Image" r:id="rId3" imgW="8292063" imgH="7403175" progId="">
-              <p:embed/>
-            </p:oleObj>
-          </a:graphicData>
-        </a:graphic>
-      </p:graphicFrame>
-      <p:sp>
-        <p:nvSpPr>
-          <p:cNvPr id="2" name="Title 1"/>
+      <p:sp>
+        <p:nvSpPr>
+          <p:cNvPr id="19" name="Title 18"/>
           <p:cNvSpPr>
             <a:spLocks noGrp="1"/>
           </p:cNvSpPr>
@@ -6708,30 +7537,96 @@
           <a:lstStyle/>
           <a:p>
             <a:r>
+              <a:rPr lang="en-US" dirty="0" err="1" smtClean="0"/>
+              <a:t>InventoryController</a:t>
+            </a:r>
+            <a:endParaRPr lang="en-US" dirty="0"/>
+          </a:p>
+        </p:txBody>
+      </p:sp>
+      <p:pic>
+        <p:nvPicPr>
+          <p:cNvPr id="24" name="Content Placeholder 23" descr="inventoryController.jpg"/>
+          <p:cNvPicPr>
+            <a:picLocks noGrp="1" noChangeAspect="1"/>
+          </p:cNvPicPr>
+          <p:nvPr>
+            <p:ph sz="half" idx="2"/>
+          </p:nvPr>
+        </p:nvPicPr>
+        <p:blipFill>
+          <a:blip r:embed="rId2"/>
+          <a:stretch>
+            <a:fillRect/>
+          </a:stretch>
+        </p:blipFill>
+        <p:spPr>
+          <a:xfrm>
+            <a:off x="1255183" y="2529995"/>
+            <a:ext cx="3417485" cy="3560412"/>
+          </a:xfrm>
+        </p:spPr>
+      </p:pic>
+      <p:sp>
+        <p:nvSpPr>
+          <p:cNvPr id="22" name="Text Placeholder 21"/>
+          <p:cNvSpPr>
+            <a:spLocks noGrp="1"/>
+          </p:cNvSpPr>
+          <p:nvPr>
+            <p:ph type="body" sz="quarter" idx="3"/>
+          </p:nvPr>
+        </p:nvSpPr>
+        <p:spPr/>
+        <p:txBody>
+          <a:bodyPr/>
+          <a:lstStyle/>
+          <a:p>
+            <a:r>
               <a:rPr lang="en-US" dirty="0" smtClean="0"/>
-              <a:t>Database Controller</a:t>
-            </a:r>
-            <a:endParaRPr lang="en-US" dirty="0"/>
+              <a:t>What does  it do?</a:t>
+            </a:r>
+            <a:endParaRPr lang="en-US" dirty="0"/>
+          </a:p>
+        </p:txBody>
+      </p:sp>
+      <p:sp>
+        <p:nvSpPr>
+          <p:cNvPr id="23" name="Content Placeholder 22"/>
+          <p:cNvSpPr>
+            <a:spLocks noGrp="1"/>
+          </p:cNvSpPr>
+          <p:nvPr>
+            <p:ph sz="quarter" idx="4"/>
+          </p:nvPr>
+        </p:nvSpPr>
+        <p:spPr/>
+        <p:txBody>
+          <a:bodyPr/>
+          <a:lstStyle/>
+          <a:p>
+            <a:r>
+              <a:rPr lang="en-US" dirty="0" smtClean="0"/>
+              <a:t>It controls the main aspects of an inventory.</a:t>
+            </a:r>
+          </a:p>
+          <a:p>
+            <a:r>
+              <a:rPr lang="en-US" dirty="0" err="1" smtClean="0"/>
+              <a:t>InventoryController</a:t>
+            </a:r>
+            <a:r>
+              <a:rPr lang="en-US" dirty="0" smtClean="0"/>
+              <a:t> gets the ID, Name, Price, Wholesale, Category, Vendor ID, Royalty ID, Description, Picture, and Preferred Stock, </a:t>
+            </a:r>
           </a:p>
         </p:txBody>
       </p:sp>
     </p:spTree>
-    <p:extLst>
-      <p:ext uri="{BB962C8B-B14F-4D97-AF65-F5344CB8AC3E}">
-        <p14:creationId xmlns:p14="http://schemas.microsoft.com/office/powerpoint/2010/main" xmlns="" val="3052568234"/>
-      </p:ext>
-    </p:extLst>
   </p:cSld>
   <p:clrMapOvr>
     <a:masterClrMapping/>
   </p:clrMapOvr>
-  <p:timing>
-    <p:tnLst>
-      <p:par>
-        <p:cTn id="1" dur="indefinite" restart="never" nodeType="tmRoot"/>
-      </p:par>
-    </p:tnLst>
-  </p:timing>
 </p:sld>
 </file>
 
@@ -6769,7 +7664,7 @@
           <a:p>
             <a:r>
               <a:rPr lang="en-US" dirty="0" smtClean="0"/>
-              <a:t>Unit &amp; Integration Testing</a:t>
+              <a:t>Nathan’s slides go after this</a:t>
             </a:r>
             <a:endParaRPr lang="en-US" dirty="0"/>
           </a:p>
@@ -6790,14 +7685,18 @@
           <a:bodyPr/>
           <a:lstStyle/>
           <a:p>
-            <a:endParaRPr lang="en-US"/>
+            <a:r>
+              <a:rPr lang="en-US" dirty="0" smtClean="0"/>
+              <a:t>Nathan covers architecture p2 and future plans</a:t>
+            </a:r>
+            <a:endParaRPr lang="en-US" dirty="0"/>
           </a:p>
         </p:txBody>
       </p:sp>
     </p:spTree>
     <p:extLst>
       <p:ext uri="{BB962C8B-B14F-4D97-AF65-F5344CB8AC3E}">
-        <p14:creationId xmlns:p14="http://schemas.microsoft.com/office/powerpoint/2010/main" xmlns="" val="2901842547"/>
+        <p14:creationId xmlns:p14="http://schemas.microsoft.com/office/powerpoint/2010/main" val="2231971645"/>
       </p:ext>
     </p:extLst>
   </p:cSld>
@@ -6848,6 +7747,690 @@
           <a:p>
             <a:r>
               <a:rPr lang="en-US" dirty="0" smtClean="0"/>
+              <a:t>Model View Controller</a:t>
+            </a:r>
+            <a:endParaRPr lang="en-US" dirty="0"/>
+          </a:p>
+        </p:txBody>
+      </p:sp>
+      <p:pic>
+        <p:nvPicPr>
+          <p:cNvPr id="4" name="Content Placeholder 3"/>
+          <p:cNvPicPr>
+            <a:picLocks noGrp="1" noChangeAspect="1"/>
+          </p:cNvPicPr>
+          <p:nvPr>
+            <p:ph idx="1"/>
+          </p:nvPr>
+        </p:nvPicPr>
+        <p:blipFill>
+          <a:blip r:embed="rId2">
+            <a:extLst>
+              <a:ext uri="{28A0092B-C50C-407E-A947-70E740481C1C}">
+                <a14:useLocalDpi xmlns:a14="http://schemas.microsoft.com/office/drawing/2010/main" val="0"/>
+              </a:ext>
+            </a:extLst>
+          </a:blip>
+          <a:stretch>
+            <a:fillRect/>
+          </a:stretch>
+        </p:blipFill>
+        <p:spPr>
+          <a:xfrm>
+            <a:off x="1379150" y="1803162"/>
+            <a:ext cx="6798492" cy="4580545"/>
+          </a:xfrm>
+        </p:spPr>
+      </p:pic>
+    </p:spTree>
+    <p:extLst>
+      <p:ext uri="{BB962C8B-B14F-4D97-AF65-F5344CB8AC3E}">
+        <p14:creationId xmlns:p14="http://schemas.microsoft.com/office/powerpoint/2010/main" val="2077223260"/>
+      </p:ext>
+    </p:extLst>
+  </p:cSld>
+  <p:clrMapOvr>
+    <a:masterClrMapping/>
+  </p:clrMapOvr>
+  <p:timing>
+    <p:tnLst>
+      <p:par>
+        <p:cTn id="1" dur="indefinite" restart="never" nodeType="tmRoot"/>
+      </p:par>
+    </p:tnLst>
+  </p:timing>
+</p:sld>
+</file>
+
+<file path=ppt/slides/slide15.xml><?xml version="1.0" encoding="utf-8"?>
+<p:sld xmlns:a="http://schemas.openxmlformats.org/drawingml/2006/main" xmlns:r="http://schemas.openxmlformats.org/officeDocument/2006/relationships" xmlns:p="http://schemas.openxmlformats.org/presentationml/2006/main">
+  <p:cSld>
+    <p:spTree>
+      <p:nvGrpSpPr>
+        <p:cNvPr id="1" name=""/>
+        <p:cNvGrpSpPr/>
+        <p:nvPr/>
+      </p:nvGrpSpPr>
+      <p:grpSpPr>
+        <a:xfrm>
+          <a:off x="0" y="0"/>
+          <a:ext cx="0" cy="0"/>
+          <a:chOff x="0" y="0"/>
+          <a:chExt cx="0" cy="0"/>
+        </a:xfrm>
+      </p:grpSpPr>
+      <p:sp>
+        <p:nvSpPr>
+          <p:cNvPr id="2" name="Title 1"/>
+          <p:cNvSpPr>
+            <a:spLocks noGrp="1"/>
+          </p:cNvSpPr>
+          <p:nvPr>
+            <p:ph type="title"/>
+          </p:nvPr>
+        </p:nvSpPr>
+        <p:spPr/>
+        <p:txBody>
+          <a:bodyPr/>
+          <a:lstStyle/>
+          <a:p>
+            <a:r>
+              <a:rPr lang="en-US" dirty="0" smtClean="0"/>
+              <a:t>Debugging</a:t>
+            </a:r>
+            <a:endParaRPr lang="en-US" dirty="0"/>
+          </a:p>
+        </p:txBody>
+      </p:sp>
+      <p:graphicFrame>
+        <p:nvGraphicFramePr>
+          <p:cNvPr id="4" name="Object 3"/>
+          <p:cNvGraphicFramePr>
+            <a:graphicFrameLocks noChangeAspect="1"/>
+          </p:cNvGraphicFramePr>
+          <p:nvPr>
+            <p:extLst>
+              <p:ext uri="{D42A27DB-BD31-4B8C-83A1-F6EECF244321}">
+                <p14:modId xmlns:p14="http://schemas.microsoft.com/office/powerpoint/2010/main" val="2315985902"/>
+              </p:ext>
+            </p:extLst>
+          </p:nvPr>
+        </p:nvGraphicFramePr>
+        <p:xfrm>
+          <a:off x="703659" y="2350595"/>
+          <a:ext cx="8128000" cy="1484313"/>
+        </p:xfrm>
+        <a:graphic>
+          <a:graphicData uri="http://schemas.openxmlformats.org/presentationml/2006/ole">
+            <mc:AlternateContent xmlns:mc="http://schemas.openxmlformats.org/markup-compatibility/2006">
+              <mc:Choice xmlns:v="urn:schemas-microsoft-com:vml" Requires="v">
+                <p:oleObj spid="_x0000_s3083" name="Image" r:id="rId3" imgW="17587302" imgH="3212698" progId="">
+                  <p:embed/>
+                </p:oleObj>
+              </mc:Choice>
+              <mc:Fallback>
+                <p:oleObj name="Image" r:id="rId3" imgW="17587302" imgH="3212698" progId="">
+                  <p:embed/>
+                  <p:pic>
+                    <p:nvPicPr>
+                      <p:cNvPr id="0" name="Picture 9"/>
+                      <p:cNvPicPr>
+                        <a:picLocks noChangeAspect="1" noChangeArrowheads="1"/>
+                      </p:cNvPicPr>
+                      <p:nvPr/>
+                    </p:nvPicPr>
+                    <p:blipFill>
+                      <a:blip r:embed="rId4">
+                        <a:extLst>
+                          <a:ext uri="{28A0092B-C50C-407E-A947-70E740481C1C}">
+                            <a14:useLocalDpi xmlns:a14="http://schemas.microsoft.com/office/drawing/2010/main" val="0"/>
+                          </a:ext>
+                        </a:extLst>
+                      </a:blip>
+                      <a:srcRect/>
+                      <a:stretch>
+                        <a:fillRect/>
+                      </a:stretch>
+                    </p:blipFill>
+                    <p:spPr bwMode="auto">
+                      <a:xfrm>
+                        <a:off x="703659" y="2350595"/>
+                        <a:ext cx="8128000" cy="1484313"/>
+                      </a:xfrm>
+                      <a:prstGeom prst="rect">
+                        <a:avLst/>
+                      </a:prstGeom>
+                      <a:noFill/>
+                      <a:ln w="12700">
+                        <a:solidFill>
+                          <a:schemeClr val="tx1"/>
+                        </a:solidFill>
+                        <a:miter lim="800000"/>
+                        <a:headEnd/>
+                        <a:tailEnd/>
+                      </a:ln>
+                      <a:extLst>
+                        <a:ext uri="{909E8E84-426E-40DD-AFC4-6F175D3DCCD1}">
+                          <a14:hiddenFill xmlns:a14="http://schemas.microsoft.com/office/drawing/2010/main">
+                            <a:solidFill>
+                              <a:srgbClr val="FFFFFF"/>
+                            </a:solidFill>
+                          </a14:hiddenFill>
+                        </a:ext>
+                      </a:extLst>
+                    </p:spPr>
+                  </p:pic>
+                </p:oleObj>
+              </mc:Fallback>
+            </mc:AlternateContent>
+          </a:graphicData>
+        </a:graphic>
+      </p:graphicFrame>
+    </p:spTree>
+    <p:extLst>
+      <p:ext uri="{BB962C8B-B14F-4D97-AF65-F5344CB8AC3E}">
+        <p14:creationId xmlns:p14="http://schemas.microsoft.com/office/powerpoint/2010/main" val="674115664"/>
+      </p:ext>
+    </p:extLst>
+  </p:cSld>
+  <p:clrMapOvr>
+    <a:masterClrMapping/>
+  </p:clrMapOvr>
+  <p:timing>
+    <p:tnLst>
+      <p:par>
+        <p:cTn id="1" dur="indefinite" restart="never" nodeType="tmRoot"/>
+      </p:par>
+    </p:tnLst>
+  </p:timing>
+</p:sld>
+</file>
+
+<file path=ppt/slides/slide16.xml><?xml version="1.0" encoding="utf-8"?>
+<p:sld xmlns:a="http://schemas.openxmlformats.org/drawingml/2006/main" xmlns:r="http://schemas.openxmlformats.org/officeDocument/2006/relationships" xmlns:p="http://schemas.openxmlformats.org/presentationml/2006/main">
+  <p:cSld>
+    <p:spTree>
+      <p:nvGrpSpPr>
+        <p:cNvPr id="1" name=""/>
+        <p:cNvGrpSpPr/>
+        <p:nvPr/>
+      </p:nvGrpSpPr>
+      <p:grpSpPr>
+        <a:xfrm>
+          <a:off x="0" y="0"/>
+          <a:ext cx="0" cy="0"/>
+          <a:chOff x="0" y="0"/>
+          <a:chExt cx="0" cy="0"/>
+        </a:xfrm>
+      </p:grpSpPr>
+      <p:sp>
+        <p:nvSpPr>
+          <p:cNvPr id="2" name="Title 1"/>
+          <p:cNvSpPr>
+            <a:spLocks noGrp="1"/>
+          </p:cNvSpPr>
+          <p:nvPr>
+            <p:ph type="title"/>
+          </p:nvPr>
+        </p:nvSpPr>
+        <p:spPr/>
+        <p:txBody>
+          <a:bodyPr/>
+          <a:lstStyle/>
+          <a:p>
+            <a:r>
+              <a:rPr lang="en-US" dirty="0" smtClean="0"/>
+              <a:t>Data</a:t>
+            </a:r>
+            <a:endParaRPr lang="en-US" dirty="0"/>
+          </a:p>
+        </p:txBody>
+      </p:sp>
+      <p:graphicFrame>
+        <p:nvGraphicFramePr>
+          <p:cNvPr id="5" name="Object 4"/>
+          <p:cNvGraphicFramePr>
+            <a:graphicFrameLocks noChangeAspect="1"/>
+          </p:cNvGraphicFramePr>
+          <p:nvPr>
+            <p:extLst>
+              <p:ext uri="{D42A27DB-BD31-4B8C-83A1-F6EECF244321}">
+                <p14:modId xmlns:p14="http://schemas.microsoft.com/office/powerpoint/2010/main" val="2424924107"/>
+              </p:ext>
+            </p:extLst>
+          </p:nvPr>
+        </p:nvGraphicFramePr>
+        <p:xfrm>
+          <a:off x="1396774" y="2058656"/>
+          <a:ext cx="2565626" cy="4519719"/>
+        </p:xfrm>
+        <a:graphic>
+          <a:graphicData uri="http://schemas.openxmlformats.org/presentationml/2006/ole">
+            <mc:AlternateContent xmlns:mc="http://schemas.openxmlformats.org/markup-compatibility/2006">
+              <mc:Choice xmlns:v="urn:schemas-microsoft-com:vml" Requires="v">
+                <p:oleObj spid="_x0000_s4116" name="Image" r:id="rId3" imgW="4634921" imgH="8165079" progId="">
+                  <p:embed/>
+                </p:oleObj>
+              </mc:Choice>
+              <mc:Fallback>
+                <p:oleObj name="Image" r:id="rId3" imgW="4634921" imgH="8165079" progId="">
+                  <p:embed/>
+                  <p:pic>
+                    <p:nvPicPr>
+                      <p:cNvPr id="0" name="Picture 16"/>
+                      <p:cNvPicPr>
+                        <a:picLocks noChangeAspect="1" noChangeArrowheads="1"/>
+                      </p:cNvPicPr>
+                      <p:nvPr/>
+                    </p:nvPicPr>
+                    <p:blipFill>
+                      <a:blip r:embed="rId4">
+                        <a:extLst>
+                          <a:ext uri="{28A0092B-C50C-407E-A947-70E740481C1C}">
+                            <a14:useLocalDpi xmlns:a14="http://schemas.microsoft.com/office/drawing/2010/main" val="0"/>
+                          </a:ext>
+                        </a:extLst>
+                      </a:blip>
+                      <a:srcRect/>
+                      <a:stretch>
+                        <a:fillRect/>
+                      </a:stretch>
+                    </p:blipFill>
+                    <p:spPr bwMode="auto">
+                      <a:xfrm>
+                        <a:off x="1396774" y="2058656"/>
+                        <a:ext cx="2565626" cy="4519719"/>
+                      </a:xfrm>
+                      <a:prstGeom prst="rect">
+                        <a:avLst/>
+                      </a:prstGeom>
+                      <a:noFill/>
+                      <a:ln w="12700">
+                        <a:solidFill>
+                          <a:schemeClr val="tx1"/>
+                        </a:solidFill>
+                        <a:miter lim="800000"/>
+                        <a:headEnd/>
+                        <a:tailEnd/>
+                      </a:ln>
+                      <a:extLst>
+                        <a:ext uri="{909E8E84-426E-40DD-AFC4-6F175D3DCCD1}">
+                          <a14:hiddenFill xmlns:a14="http://schemas.microsoft.com/office/drawing/2010/main">
+                            <a:solidFill>
+                              <a:srgbClr val="FFFFFF"/>
+                            </a:solidFill>
+                          </a14:hiddenFill>
+                        </a:ext>
+                      </a:extLst>
+                    </p:spPr>
+                  </p:pic>
+                </p:oleObj>
+              </mc:Fallback>
+            </mc:AlternateContent>
+          </a:graphicData>
+        </a:graphic>
+      </p:graphicFrame>
+      <p:graphicFrame>
+        <p:nvGraphicFramePr>
+          <p:cNvPr id="6" name="Object 5"/>
+          <p:cNvGraphicFramePr>
+            <a:graphicFrameLocks noChangeAspect="1"/>
+          </p:cNvGraphicFramePr>
+          <p:nvPr>
+            <p:extLst>
+              <p:ext uri="{D42A27DB-BD31-4B8C-83A1-F6EECF244321}">
+                <p14:modId xmlns:p14="http://schemas.microsoft.com/office/powerpoint/2010/main" val="1863319881"/>
+              </p:ext>
+            </p:extLst>
+          </p:nvPr>
+        </p:nvGraphicFramePr>
+        <p:xfrm>
+          <a:off x="6331632" y="1160238"/>
+          <a:ext cx="1646237" cy="5418137"/>
+        </p:xfrm>
+        <a:graphic>
+          <a:graphicData uri="http://schemas.openxmlformats.org/presentationml/2006/ole">
+            <mc:AlternateContent xmlns:mc="http://schemas.openxmlformats.org/markup-compatibility/2006">
+              <mc:Choice xmlns:v="urn:schemas-microsoft-com:vml" Requires="v">
+                <p:oleObj spid="_x0000_s4117" name="Image" r:id="rId5" imgW="3530159" imgH="11619048" progId="">
+                  <p:embed/>
+                </p:oleObj>
+              </mc:Choice>
+              <mc:Fallback>
+                <p:oleObj name="Image" r:id="rId5" imgW="3530159" imgH="11619048" progId="">
+                  <p:embed/>
+                  <p:pic>
+                    <p:nvPicPr>
+                      <p:cNvPr id="0" name="Picture 17"/>
+                      <p:cNvPicPr>
+                        <a:picLocks noChangeAspect="1" noChangeArrowheads="1"/>
+                      </p:cNvPicPr>
+                      <p:nvPr/>
+                    </p:nvPicPr>
+                    <p:blipFill>
+                      <a:blip r:embed="rId6">
+                        <a:extLst>
+                          <a:ext uri="{28A0092B-C50C-407E-A947-70E740481C1C}">
+                            <a14:useLocalDpi xmlns:a14="http://schemas.microsoft.com/office/drawing/2010/main" val="0"/>
+                          </a:ext>
+                        </a:extLst>
+                      </a:blip>
+                      <a:srcRect/>
+                      <a:stretch>
+                        <a:fillRect/>
+                      </a:stretch>
+                    </p:blipFill>
+                    <p:spPr bwMode="auto">
+                      <a:xfrm>
+                        <a:off x="6331632" y="1160238"/>
+                        <a:ext cx="1646237" cy="5418137"/>
+                      </a:xfrm>
+                      <a:prstGeom prst="rect">
+                        <a:avLst/>
+                      </a:prstGeom>
+                      <a:noFill/>
+                      <a:ln w="12700">
+                        <a:solidFill>
+                          <a:schemeClr val="tx1"/>
+                        </a:solidFill>
+                        <a:miter lim="800000"/>
+                        <a:headEnd/>
+                        <a:tailEnd/>
+                      </a:ln>
+                      <a:extLst>
+                        <a:ext uri="{909E8E84-426E-40DD-AFC4-6F175D3DCCD1}">
+                          <a14:hiddenFill xmlns:a14="http://schemas.microsoft.com/office/drawing/2010/main">
+                            <a:solidFill>
+                              <a:srgbClr val="FFFFFF"/>
+                            </a:solidFill>
+                          </a14:hiddenFill>
+                        </a:ext>
+                      </a:extLst>
+                    </p:spPr>
+                  </p:pic>
+                </p:oleObj>
+              </mc:Fallback>
+            </mc:AlternateContent>
+          </a:graphicData>
+        </a:graphic>
+      </p:graphicFrame>
+    </p:spTree>
+    <p:extLst>
+      <p:ext uri="{BB962C8B-B14F-4D97-AF65-F5344CB8AC3E}">
+        <p14:creationId xmlns:p14="http://schemas.microsoft.com/office/powerpoint/2010/main" val="2375152149"/>
+      </p:ext>
+    </p:extLst>
+  </p:cSld>
+  <p:clrMapOvr>
+    <a:masterClrMapping/>
+  </p:clrMapOvr>
+  <p:timing>
+    <p:tnLst>
+      <p:par>
+        <p:cTn id="1" dur="indefinite" restart="never" nodeType="tmRoot"/>
+      </p:par>
+    </p:tnLst>
+  </p:timing>
+</p:sld>
+</file>
+
+<file path=ppt/slides/slide17.xml><?xml version="1.0" encoding="utf-8"?>
+<p:sld xmlns:a="http://schemas.openxmlformats.org/drawingml/2006/main" xmlns:r="http://schemas.openxmlformats.org/officeDocument/2006/relationships" xmlns:p="http://schemas.openxmlformats.org/presentationml/2006/main">
+  <p:cSld>
+    <p:spTree>
+      <p:nvGrpSpPr>
+        <p:cNvPr id="1" name=""/>
+        <p:cNvGrpSpPr/>
+        <p:nvPr/>
+      </p:nvGrpSpPr>
+      <p:grpSpPr>
+        <a:xfrm>
+          <a:off x="0" y="0"/>
+          <a:ext cx="0" cy="0"/>
+          <a:chOff x="0" y="0"/>
+          <a:chExt cx="0" cy="0"/>
+        </a:xfrm>
+      </p:grpSpPr>
+      <p:graphicFrame>
+        <p:nvGraphicFramePr>
+          <p:cNvPr id="4" name="Object 3"/>
+          <p:cNvGraphicFramePr>
+            <a:graphicFrameLocks noChangeAspect="1"/>
+          </p:cNvGraphicFramePr>
+          <p:nvPr>
+            <p:extLst>
+              <p:ext uri="{D42A27DB-BD31-4B8C-83A1-F6EECF244321}">
+                <p14:modId xmlns:p14="http://schemas.microsoft.com/office/powerpoint/2010/main" val="1944986822"/>
+              </p:ext>
+            </p:extLst>
+          </p:nvPr>
+        </p:nvGraphicFramePr>
+        <p:xfrm>
+          <a:off x="1128260" y="1902534"/>
+          <a:ext cx="5388655" cy="4811004"/>
+        </p:xfrm>
+        <a:graphic>
+          <a:graphicData uri="http://schemas.openxmlformats.org/presentationml/2006/ole">
+            <mc:AlternateContent xmlns:mc="http://schemas.openxmlformats.org/markup-compatibility/2006">
+              <mc:Choice xmlns:v="urn:schemas-microsoft-com:vml" Requires="v">
+                <p:oleObj spid="_x0000_s5131" name="Image" r:id="rId3" imgW="8292063" imgH="7403175" progId="">
+                  <p:embed/>
+                </p:oleObj>
+              </mc:Choice>
+              <mc:Fallback>
+                <p:oleObj name="Image" r:id="rId3" imgW="8292063" imgH="7403175" progId="">
+                  <p:embed/>
+                  <p:pic>
+                    <p:nvPicPr>
+                      <p:cNvPr id="0" name="Picture 9"/>
+                      <p:cNvPicPr>
+                        <a:picLocks noChangeAspect="1" noChangeArrowheads="1"/>
+                      </p:cNvPicPr>
+                      <p:nvPr/>
+                    </p:nvPicPr>
+                    <p:blipFill>
+                      <a:blip r:embed="rId4">
+                        <a:extLst>
+                          <a:ext uri="{28A0092B-C50C-407E-A947-70E740481C1C}">
+                            <a14:useLocalDpi xmlns:a14="http://schemas.microsoft.com/office/drawing/2010/main" val="0"/>
+                          </a:ext>
+                        </a:extLst>
+                      </a:blip>
+                      <a:srcRect/>
+                      <a:stretch>
+                        <a:fillRect/>
+                      </a:stretch>
+                    </p:blipFill>
+                    <p:spPr bwMode="auto">
+                      <a:xfrm>
+                        <a:off x="1128260" y="1902534"/>
+                        <a:ext cx="5388655" cy="4811004"/>
+                      </a:xfrm>
+                      <a:prstGeom prst="rect">
+                        <a:avLst/>
+                      </a:prstGeom>
+                      <a:noFill/>
+                      <a:ln w="19050">
+                        <a:solidFill>
+                          <a:schemeClr val="tx1"/>
+                        </a:solidFill>
+                        <a:miter lim="800000"/>
+                        <a:headEnd/>
+                        <a:tailEnd/>
+                      </a:ln>
+                      <a:extLst>
+                        <a:ext uri="{909E8E84-426E-40DD-AFC4-6F175D3DCCD1}">
+                          <a14:hiddenFill xmlns:a14="http://schemas.microsoft.com/office/drawing/2010/main">
+                            <a:solidFill>
+                              <a:srgbClr val="FFFFFF"/>
+                            </a:solidFill>
+                          </a14:hiddenFill>
+                        </a:ext>
+                      </a:extLst>
+                    </p:spPr>
+                  </p:pic>
+                </p:oleObj>
+              </mc:Fallback>
+            </mc:AlternateContent>
+          </a:graphicData>
+        </a:graphic>
+      </p:graphicFrame>
+      <p:sp>
+        <p:nvSpPr>
+          <p:cNvPr id="2" name="Title 1"/>
+          <p:cNvSpPr>
+            <a:spLocks noGrp="1"/>
+          </p:cNvSpPr>
+          <p:nvPr>
+            <p:ph type="title"/>
+          </p:nvPr>
+        </p:nvSpPr>
+        <p:spPr/>
+        <p:txBody>
+          <a:bodyPr/>
+          <a:lstStyle/>
+          <a:p>
+            <a:r>
+              <a:rPr lang="en-US" dirty="0" smtClean="0"/>
+              <a:t>Database Controller</a:t>
+            </a:r>
+            <a:endParaRPr lang="en-US" dirty="0"/>
+          </a:p>
+        </p:txBody>
+      </p:sp>
+    </p:spTree>
+    <p:extLst>
+      <p:ext uri="{BB962C8B-B14F-4D97-AF65-F5344CB8AC3E}">
+        <p14:creationId xmlns:p14="http://schemas.microsoft.com/office/powerpoint/2010/main" val="3052568234"/>
+      </p:ext>
+    </p:extLst>
+  </p:cSld>
+  <p:clrMapOvr>
+    <a:masterClrMapping/>
+  </p:clrMapOvr>
+  <p:timing>
+    <p:tnLst>
+      <p:par>
+        <p:cTn id="1" dur="indefinite" restart="never" nodeType="tmRoot"/>
+      </p:par>
+    </p:tnLst>
+  </p:timing>
+</p:sld>
+</file>
+
+<file path=ppt/slides/slide18.xml><?xml version="1.0" encoding="utf-8"?>
+<p:sld xmlns:a="http://schemas.openxmlformats.org/drawingml/2006/main" xmlns:r="http://schemas.openxmlformats.org/officeDocument/2006/relationships" xmlns:p="http://schemas.openxmlformats.org/presentationml/2006/main">
+  <p:cSld>
+    <p:spTree>
+      <p:nvGrpSpPr>
+        <p:cNvPr id="1" name=""/>
+        <p:cNvGrpSpPr/>
+        <p:nvPr/>
+      </p:nvGrpSpPr>
+      <p:grpSpPr>
+        <a:xfrm>
+          <a:off x="0" y="0"/>
+          <a:ext cx="0" cy="0"/>
+          <a:chOff x="0" y="0"/>
+          <a:chExt cx="0" cy="0"/>
+        </a:xfrm>
+      </p:grpSpPr>
+      <p:sp>
+        <p:nvSpPr>
+          <p:cNvPr id="2" name="Title 1"/>
+          <p:cNvSpPr>
+            <a:spLocks noGrp="1"/>
+          </p:cNvSpPr>
+          <p:nvPr>
+            <p:ph type="title"/>
+          </p:nvPr>
+        </p:nvSpPr>
+        <p:spPr/>
+        <p:txBody>
+          <a:bodyPr/>
+          <a:lstStyle/>
+          <a:p>
+            <a:r>
+              <a:rPr lang="en-US" dirty="0" smtClean="0"/>
+              <a:t>Unit &amp; Integration Testing</a:t>
+            </a:r>
+            <a:endParaRPr lang="en-US" dirty="0"/>
+          </a:p>
+        </p:txBody>
+      </p:sp>
+      <p:sp>
+        <p:nvSpPr>
+          <p:cNvPr id="3" name="Content Placeholder 2"/>
+          <p:cNvSpPr>
+            <a:spLocks noGrp="1"/>
+          </p:cNvSpPr>
+          <p:nvPr>
+            <p:ph idx="1"/>
+          </p:nvPr>
+        </p:nvSpPr>
+        <p:spPr/>
+        <p:txBody>
+          <a:bodyPr/>
+          <a:lstStyle/>
+          <a:p>
+            <a:endParaRPr lang="en-US"/>
+          </a:p>
+        </p:txBody>
+      </p:sp>
+    </p:spTree>
+    <p:extLst>
+      <p:ext uri="{BB962C8B-B14F-4D97-AF65-F5344CB8AC3E}">
+        <p14:creationId xmlns:p14="http://schemas.microsoft.com/office/powerpoint/2010/main" val="2901842547"/>
+      </p:ext>
+    </p:extLst>
+  </p:cSld>
+  <p:clrMapOvr>
+    <a:masterClrMapping/>
+  </p:clrMapOvr>
+  <p:timing>
+    <p:tnLst>
+      <p:par>
+        <p:cTn id="1" dur="indefinite" restart="never" nodeType="tmRoot"/>
+      </p:par>
+    </p:tnLst>
+  </p:timing>
+</p:sld>
+</file>
+
+<file path=ppt/slides/slide19.xml><?xml version="1.0" encoding="utf-8"?>
+<p:sld xmlns:a="http://schemas.openxmlformats.org/drawingml/2006/main" xmlns:r="http://schemas.openxmlformats.org/officeDocument/2006/relationships" xmlns:p="http://schemas.openxmlformats.org/presentationml/2006/main">
+  <p:cSld>
+    <p:spTree>
+      <p:nvGrpSpPr>
+        <p:cNvPr id="1" name=""/>
+        <p:cNvGrpSpPr/>
+        <p:nvPr/>
+      </p:nvGrpSpPr>
+      <p:grpSpPr>
+        <a:xfrm>
+          <a:off x="0" y="0"/>
+          <a:ext cx="0" cy="0"/>
+          <a:chOff x="0" y="0"/>
+          <a:chExt cx="0" cy="0"/>
+        </a:xfrm>
+      </p:grpSpPr>
+      <p:sp>
+        <p:nvSpPr>
+          <p:cNvPr id="2" name="Title 1"/>
+          <p:cNvSpPr>
+            <a:spLocks noGrp="1"/>
+          </p:cNvSpPr>
+          <p:nvPr>
+            <p:ph type="title"/>
+          </p:nvPr>
+        </p:nvSpPr>
+        <p:spPr/>
+        <p:txBody>
+          <a:bodyPr/>
+          <a:lstStyle/>
+          <a:p>
+            <a:r>
+              <a:rPr lang="en-US" dirty="0" smtClean="0"/>
               <a:t>References</a:t>
             </a:r>
             <a:endParaRPr lang="en-US" dirty="0"/>
@@ -6940,7 +8523,7 @@
     </p:spTree>
     <p:extLst>
       <p:ext uri="{BB962C8B-B14F-4D97-AF65-F5344CB8AC3E}">
-        <p14:creationId xmlns:p14="http://schemas.microsoft.com/office/powerpoint/2010/main" xmlns="" val="3873660262"/>
+        <p14:creationId xmlns:p14="http://schemas.microsoft.com/office/powerpoint/2010/main" val="3873660262"/>
       </p:ext>
     </p:extLst>
   </p:cSld>
@@ -7023,7 +8606,7 @@
     </p:spTree>
     <p:extLst>
       <p:ext uri="{BB962C8B-B14F-4D97-AF65-F5344CB8AC3E}">
-        <p14:creationId xmlns:p14="http://schemas.microsoft.com/office/powerpoint/2010/main" xmlns="" val="1930367192"/>
+        <p14:creationId xmlns:p14="http://schemas.microsoft.com/office/powerpoint/2010/main" val="1930367192"/>
       </p:ext>
     </p:extLst>
   </p:cSld>
@@ -7089,7 +8672,7 @@
           <p:nvPr>
             <p:extLst>
               <p:ext uri="{D42A27DB-BD31-4B8C-83A1-F6EECF244321}">
-                <p14:modId xmlns:p14="http://schemas.microsoft.com/office/powerpoint/2010/main" xmlns="" val="611458238"/>
+                <p14:modId xmlns:p14="http://schemas.microsoft.com/office/powerpoint/2010/main" val="611458238"/>
               </p:ext>
             </p:extLst>
           </p:nvPr>
@@ -7100,16 +8683,66 @@
         </p:xfrm>
         <a:graphic>
           <a:graphicData uri="http://schemas.openxmlformats.org/presentationml/2006/ole">
-            <p:oleObj spid="_x0000_s1033" name="Image" r:id="rId3" imgW="21333333" imgH="12787302" progId="">
-              <p:embed/>
-            </p:oleObj>
+            <mc:AlternateContent xmlns:mc="http://schemas.openxmlformats.org/markup-compatibility/2006">
+              <mc:Choice xmlns:v="urn:schemas-microsoft-com:vml" Requires="v">
+                <p:oleObj spid="_x0000_s1035" name="Image" r:id="rId3" imgW="21333333" imgH="12787302" progId="">
+                  <p:embed/>
+                </p:oleObj>
+              </mc:Choice>
+              <mc:Fallback>
+                <p:oleObj name="Image" r:id="rId3" imgW="21333333" imgH="12787302" progId="">
+                  <p:embed/>
+                  <p:pic>
+                    <p:nvPicPr>
+                      <p:cNvPr id="0" name="Picture 9"/>
+                      <p:cNvPicPr>
+                        <a:picLocks noChangeAspect="1" noChangeArrowheads="1"/>
+                      </p:cNvPicPr>
+                      <p:nvPr/>
+                    </p:nvPicPr>
+                    <p:blipFill>
+                      <a:blip r:embed="rId4">
+                        <a:extLst>
+                          <a:ext uri="{28A0092B-C50C-407E-A947-70E740481C1C}">
+                            <a14:useLocalDpi xmlns:a14="http://schemas.microsoft.com/office/drawing/2010/main" val="0"/>
+                          </a:ext>
+                        </a:extLst>
+                      </a:blip>
+                      <a:srcRect/>
+                      <a:stretch>
+                        <a:fillRect/>
+                      </a:stretch>
+                    </p:blipFill>
+                    <p:spPr bwMode="auto">
+                      <a:xfrm>
+                        <a:off x="1269257" y="2022703"/>
+                        <a:ext cx="7400820" cy="4436155"/>
+                      </a:xfrm>
+                      <a:prstGeom prst="rect">
+                        <a:avLst/>
+                      </a:prstGeom>
+                      <a:noFill/>
+                      <a:extLst>
+                        <a:ext uri="{909E8E84-426E-40DD-AFC4-6F175D3DCCD1}">
+                          <a14:hiddenFill xmlns:a14="http://schemas.microsoft.com/office/drawing/2010/main">
+                            <a:solidFill>
+                              <a:srgbClr val="FFFFFF"/>
+                            </a:solidFill>
+                          </a14:hiddenFill>
+                        </a:ext>
+                      </a:extLst>
+                    </p:spPr>
+                  </p:pic>
+                </p:oleObj>
+              </mc:Fallback>
+            </mc:AlternateContent>
           </a:graphicData>
         </a:graphic>
       </p:graphicFrame>
     </p:spTree>
     <p:extLst>
       <p:ext uri="{BB962C8B-B14F-4D97-AF65-F5344CB8AC3E}">
-        <p14:creationId xmlns:p14="http://schemas.microsoft.com/office/powerpoint/2010/main" xmlns="" val="1953110351"/>
+        <p14:creationId xmlns:p14="http://schemas.microsoft.com/office/powerpoint/2010/main" val="1953110351"/>
       </p:ext>
     </p:extLst>
   </p:cSld>
@@ -7192,7 +8825,7 @@
     </p:spTree>
     <p:extLst>
       <p:ext uri="{BB962C8B-B14F-4D97-AF65-F5344CB8AC3E}">
-        <p14:creationId xmlns:p14="http://schemas.microsoft.com/office/powerpoint/2010/main" xmlns="" val="3677762619"/>
+        <p14:creationId xmlns:p14="http://schemas.microsoft.com/office/powerpoint/2010/main" val="3677762619"/>
       </p:ext>
     </p:extLst>
   </p:cSld>
@@ -7243,7 +8876,7 @@
           <a:p>
             <a:r>
               <a:rPr lang="en-US" dirty="0" smtClean="0"/>
-              <a:t>Lucas’s slides go after this</a:t>
+              <a:t>Basic Functionality</a:t>
             </a:r>
             <a:endParaRPr lang="en-US" dirty="0"/>
           </a:p>
@@ -7266,29 +8899,39 @@
           <a:p>
             <a:r>
               <a:rPr lang="en-US" dirty="0" smtClean="0"/>
-              <a:t>Lucas covers Architecture, predominately UML diagram’s and some descriptions</a:t>
-            </a:r>
-            <a:endParaRPr lang="en-US" dirty="0"/>
+              <a:t>User sends input to GUI</a:t>
+            </a:r>
+          </a:p>
+          <a:p>
+            <a:r>
+              <a:rPr lang="en-US" dirty="0" smtClean="0"/>
+              <a:t>GUI sends input to database</a:t>
+            </a:r>
+          </a:p>
+          <a:p>
+            <a:r>
+              <a:rPr lang="en-US" dirty="0" smtClean="0"/>
+              <a:t>Database sends output to GUI</a:t>
+            </a:r>
+          </a:p>
+          <a:p>
+            <a:r>
+              <a:rPr lang="en-US" dirty="0" smtClean="0"/>
+              <a:t>GUI sends output to user</a:t>
+            </a:r>
           </a:p>
         </p:txBody>
       </p:sp>
     </p:spTree>
     <p:extLst>
       <p:ext uri="{BB962C8B-B14F-4D97-AF65-F5344CB8AC3E}">
-        <p14:creationId xmlns:p14="http://schemas.microsoft.com/office/powerpoint/2010/main" xmlns="" val="2503385107"/>
+        <p14:creationId xmlns:p14="http://schemas.microsoft.com/office/powerpoint/2010/main" val="2714848111"/>
       </p:ext>
     </p:extLst>
   </p:cSld>
   <p:clrMapOvr>
     <a:masterClrMapping/>
   </p:clrMapOvr>
-  <p:timing>
-    <p:tnLst>
-      <p:par>
-        <p:cTn id="1" dur="indefinite" restart="never" nodeType="tmRoot"/>
-      </p:par>
-    </p:tnLst>
-  </p:timing>
 </p:sld>
 </file>
 
@@ -7325,56 +8968,52 @@
           <a:lstStyle/>
           <a:p>
             <a:r>
+              <a:rPr lang="en-US" dirty="0" err="1" smtClean="0"/>
+              <a:t>javax.swing</a:t>
+            </a:r>
+            <a:endParaRPr lang="en-US" dirty="0"/>
+          </a:p>
+        </p:txBody>
+      </p:sp>
+      <p:sp>
+        <p:nvSpPr>
+          <p:cNvPr id="3" name="Content Placeholder 2"/>
+          <p:cNvSpPr>
+            <a:spLocks noGrp="1"/>
+          </p:cNvSpPr>
+          <p:nvPr>
+            <p:ph idx="1"/>
+          </p:nvPr>
+        </p:nvSpPr>
+        <p:spPr/>
+        <p:txBody>
+          <a:bodyPr/>
+          <a:lstStyle/>
+          <a:p>
+            <a:r>
               <a:rPr lang="en-US" dirty="0" smtClean="0"/>
-              <a:t>Structure</a:t>
-            </a:r>
-            <a:endParaRPr lang="en-US" dirty="0"/>
-          </a:p>
-        </p:txBody>
-      </p:sp>
-      <p:graphicFrame>
-        <p:nvGraphicFramePr>
-          <p:cNvPr id="4" name="Object 3"/>
-          <p:cNvGraphicFramePr>
-            <a:graphicFrameLocks noChangeAspect="1"/>
-          </p:cNvGraphicFramePr>
-          <p:nvPr>
-            <p:extLst>
-              <p:ext uri="{D42A27DB-BD31-4B8C-83A1-F6EECF244321}">
-                <p14:modId xmlns:p14="http://schemas.microsoft.com/office/powerpoint/2010/main" xmlns="" val="2583679832"/>
-              </p:ext>
-            </p:extLst>
-          </p:nvPr>
-        </p:nvGraphicFramePr>
-        <p:xfrm>
-          <a:off x="982133" y="2057907"/>
-          <a:ext cx="7602248" cy="4009607"/>
-        </p:xfrm>
-        <a:graphic>
-          <a:graphicData uri="http://schemas.openxmlformats.org/presentationml/2006/ole">
-            <p:oleObj spid="_x0000_s2057" name="Image" r:id="rId3" imgW="8596825" imgH="4533333" progId="">
-              <p:embed/>
-            </p:oleObj>
-          </a:graphicData>
-        </a:graphic>
-      </p:graphicFrame>
+              <a:t>Standard library of lightweight display components</a:t>
+            </a:r>
+          </a:p>
+          <a:p>
+            <a:r>
+              <a:rPr lang="en-US" dirty="0" smtClean="0"/>
+              <a:t>Easily define layouts and add components</a:t>
+            </a:r>
+            <a:endParaRPr lang="en-US" dirty="0"/>
+          </a:p>
+        </p:txBody>
+      </p:sp>
     </p:spTree>
     <p:extLst>
       <p:ext uri="{BB962C8B-B14F-4D97-AF65-F5344CB8AC3E}">
-        <p14:creationId xmlns:p14="http://schemas.microsoft.com/office/powerpoint/2010/main" xmlns="" val="4097840335"/>
+        <p14:creationId xmlns:p14="http://schemas.microsoft.com/office/powerpoint/2010/main" val="3696686053"/>
       </p:ext>
     </p:extLst>
   </p:cSld>
   <p:clrMapOvr>
     <a:masterClrMapping/>
   </p:clrMapOvr>
-  <p:timing>
-    <p:tnLst>
-      <p:par>
-        <p:cTn id="1" dur="indefinite" restart="never" nodeType="tmRoot"/>
-      </p:par>
-    </p:tnLst>
-  </p:timing>
 </p:sld>
 </file>
 
@@ -7397,7 +9036,7 @@
       </p:grpSpPr>
       <p:sp>
         <p:nvSpPr>
-          <p:cNvPr id="19" name="Title 18"/>
+          <p:cNvPr id="2" name="Title 1"/>
           <p:cNvSpPr>
             <a:spLocks noGrp="1"/>
           </p:cNvSpPr>
@@ -7411,8 +9050,8 @@
           <a:lstStyle/>
           <a:p>
             <a:r>
-              <a:rPr lang="en-US" dirty="0" err="1" smtClean="0"/>
-              <a:t>InventoryController</a:t>
+              <a:rPr lang="en-US" dirty="0" smtClean="0"/>
+              <a:t>Our Design</a:t>
             </a:r>
             <a:endParaRPr lang="en-US" dirty="0"/>
           </a:p>
@@ -7420,83 +9059,66 @@
       </p:sp>
       <p:pic>
         <p:nvPicPr>
-          <p:cNvPr id="24" name="Content Placeholder 23" descr="inventoryController.jpg"/>
+          <p:cNvPr id="6146" name="Picture 2"/>
           <p:cNvPicPr>
-            <a:picLocks noGrp="1" noChangeAspect="1"/>
+            <a:picLocks noGrp="1" noChangeAspect="1" noChangeArrowheads="1"/>
           </p:cNvPicPr>
           <p:nvPr>
-            <p:ph sz="half" idx="2"/>
+            <p:ph idx="1"/>
           </p:nvPr>
         </p:nvPicPr>
         <p:blipFill>
-          <a:blip r:embed="rId2"/>
+          <a:blip r:embed="rId3">
+            <a:extLst>
+              <a:ext uri="{28A0092B-C50C-407E-A947-70E740481C1C}">
+                <a14:useLocalDpi xmlns:a14="http://schemas.microsoft.com/office/drawing/2010/main" val="0"/>
+              </a:ext>
+            </a:extLst>
+          </a:blip>
+          <a:srcRect/>
           <a:stretch>
             <a:fillRect/>
           </a:stretch>
         </p:blipFill>
-        <p:spPr>
+        <p:spPr bwMode="auto">
           <a:xfrm>
-            <a:off x="1255183" y="2529995"/>
-            <a:ext cx="3417485" cy="3560412"/>
+            <a:off x="646691" y="1960518"/>
+            <a:ext cx="7850619" cy="4472180"/>
           </a:xfrm>
+          <a:prstGeom prst="rect">
+            <a:avLst/>
+          </a:prstGeom>
+          <a:noFill/>
+          <a:ln>
+            <a:noFill/>
+          </a:ln>
+          <a:extLst>
+            <a:ext uri="{909E8E84-426E-40DD-AFC4-6F175D3DCCD1}">
+              <a14:hiddenFill xmlns:a14="http://schemas.microsoft.com/office/drawing/2010/main">
+                <a:solidFill>
+                  <a:schemeClr val="accent1"/>
+                </a:solidFill>
+              </a14:hiddenFill>
+            </a:ext>
+            <a:ext uri="{91240B29-F687-4F45-9708-019B960494DF}">
+              <a14:hiddenLine xmlns:a14="http://schemas.microsoft.com/office/drawing/2010/main" w="9525">
+                <a:solidFill>
+                  <a:schemeClr val="tx1"/>
+                </a:solidFill>
+                <a:miter lim="800000"/>
+                <a:headEnd/>
+                <a:tailEnd/>
+              </a14:hiddenLine>
+            </a:ext>
+          </a:extLst>
         </p:spPr>
       </p:pic>
-      <p:sp>
-        <p:nvSpPr>
-          <p:cNvPr id="22" name="Text Placeholder 21"/>
-          <p:cNvSpPr>
-            <a:spLocks noGrp="1"/>
-          </p:cNvSpPr>
-          <p:nvPr>
-            <p:ph type="body" sz="quarter" idx="3"/>
-          </p:nvPr>
-        </p:nvSpPr>
-        <p:spPr/>
-        <p:txBody>
-          <a:bodyPr/>
-          <a:lstStyle/>
-          <a:p>
-            <a:r>
-              <a:rPr lang="en-US" dirty="0" smtClean="0"/>
-              <a:t>What does  it do?</a:t>
-            </a:r>
-            <a:endParaRPr lang="en-US" dirty="0"/>
-          </a:p>
-        </p:txBody>
-      </p:sp>
-      <p:sp>
-        <p:nvSpPr>
-          <p:cNvPr id="23" name="Content Placeholder 22"/>
-          <p:cNvSpPr>
-            <a:spLocks noGrp="1"/>
-          </p:cNvSpPr>
-          <p:nvPr>
-            <p:ph sz="quarter" idx="4"/>
-          </p:nvPr>
-        </p:nvSpPr>
-        <p:spPr/>
-        <p:txBody>
-          <a:bodyPr/>
-          <a:lstStyle/>
-          <a:p>
-            <a:r>
-              <a:rPr lang="en-US" dirty="0" smtClean="0"/>
-              <a:t>It controls the main aspects of an inventory.</a:t>
-            </a:r>
-          </a:p>
-          <a:p>
-            <a:r>
-              <a:rPr lang="en-US" dirty="0" err="1" smtClean="0"/>
-              <a:t>InventoryController</a:t>
-            </a:r>
-            <a:r>
-              <a:rPr lang="en-US" dirty="0" smtClean="0"/>
-              <a:t> gets the ID, Name, Price, Wholesale, Category, Vendor ID, Royalty ID, Description, Picture, and Preferred Stock, </a:t>
-            </a:r>
-          </a:p>
-        </p:txBody>
-      </p:sp>
     </p:spTree>
+    <p:extLst>
+      <p:ext uri="{BB962C8B-B14F-4D97-AF65-F5344CB8AC3E}">
+        <p14:creationId xmlns:p14="http://schemas.microsoft.com/office/powerpoint/2010/main" val="527009072"/>
+      </p:ext>
+    </p:extLst>
   </p:cSld>
   <p:clrMapOvr>
     <a:masterClrMapping/>
@@ -7538,52 +9160,63 @@
           <a:p>
             <a:r>
               <a:rPr lang="en-US" dirty="0" smtClean="0"/>
-              <a:t>Nathan’s slides go after this</a:t>
-            </a:r>
-            <a:endParaRPr lang="en-US" dirty="0"/>
-          </a:p>
-        </p:txBody>
-      </p:sp>
-      <p:sp>
-        <p:nvSpPr>
-          <p:cNvPr id="3" name="Content Placeholder 2"/>
-          <p:cNvSpPr>
-            <a:spLocks noGrp="1"/>
-          </p:cNvSpPr>
-          <p:nvPr>
-            <p:ph idx="1"/>
-          </p:nvPr>
-        </p:nvSpPr>
-        <p:spPr/>
-        <p:txBody>
-          <a:bodyPr/>
-          <a:lstStyle/>
-          <a:p>
-            <a:r>
-              <a:rPr lang="en-US" dirty="0" smtClean="0"/>
-              <a:t>Nathan covers architecture p2 and future plans</a:t>
-            </a:r>
-            <a:endParaRPr lang="en-US" dirty="0"/>
-          </a:p>
-        </p:txBody>
-      </p:sp>
+              <a:t>Our Design</a:t>
+            </a:r>
+            <a:endParaRPr lang="en-US" dirty="0"/>
+          </a:p>
+        </p:txBody>
+      </p:sp>
+      <p:pic>
+        <p:nvPicPr>
+          <p:cNvPr id="7172" name="Picture 4" descr="C:\Users\Mike\AppData\Local\Temp\Untitled Diagram-1.png"/>
+          <p:cNvPicPr>
+            <a:picLocks noChangeAspect="1" noChangeArrowheads="1"/>
+          </p:cNvPicPr>
+          <p:nvPr/>
+        </p:nvPicPr>
+        <p:blipFill>
+          <a:blip r:embed="rId3">
+            <a:extLst>
+              <a:ext uri="{28A0092B-C50C-407E-A947-70E740481C1C}">
+                <a14:useLocalDpi xmlns:a14="http://schemas.microsoft.com/office/drawing/2010/main" val="0"/>
+              </a:ext>
+            </a:extLst>
+          </a:blip>
+          <a:srcRect/>
+          <a:stretch>
+            <a:fillRect/>
+          </a:stretch>
+        </p:blipFill>
+        <p:spPr bwMode="auto">
+          <a:xfrm>
+            <a:off x="136028" y="2408362"/>
+            <a:ext cx="8871945" cy="3754931"/>
+          </a:xfrm>
+          <a:prstGeom prst="rect">
+            <a:avLst/>
+          </a:prstGeom>
+          <a:noFill/>
+          <a:extLst>
+            <a:ext uri="{909E8E84-426E-40DD-AFC4-6F175D3DCCD1}">
+              <a14:hiddenFill xmlns:a14="http://schemas.microsoft.com/office/drawing/2010/main">
+                <a:solidFill>
+                  <a:srgbClr val="FFFFFF"/>
+                </a:solidFill>
+              </a14:hiddenFill>
+            </a:ext>
+          </a:extLst>
+        </p:spPr>
+      </p:pic>
     </p:spTree>
     <p:extLst>
       <p:ext uri="{BB962C8B-B14F-4D97-AF65-F5344CB8AC3E}">
-        <p14:creationId xmlns:p14="http://schemas.microsoft.com/office/powerpoint/2010/main" xmlns="" val="2231971645"/>
+        <p14:creationId xmlns:p14="http://schemas.microsoft.com/office/powerpoint/2010/main" val="3984183859"/>
       </p:ext>
     </p:extLst>
   </p:cSld>
   <p:clrMapOvr>
     <a:masterClrMapping/>
   </p:clrMapOvr>
-  <p:timing>
-    <p:tnLst>
-      <p:par>
-        <p:cTn id="1" dur="indefinite" restart="never" nodeType="tmRoot"/>
-      </p:par>
-    </p:tnLst>
-  </p:timing>
 </p:sld>
 </file>
 
@@ -7621,58 +9254,91 @@
           <a:p>
             <a:r>
               <a:rPr lang="en-US" dirty="0" smtClean="0"/>
-              <a:t>Model View Controller</a:t>
-            </a:r>
-            <a:endParaRPr lang="en-US" dirty="0"/>
-          </a:p>
-        </p:txBody>
-      </p:sp>
-      <p:pic>
-        <p:nvPicPr>
-          <p:cNvPr id="4" name="Content Placeholder 3"/>
-          <p:cNvPicPr>
-            <a:picLocks noGrp="1" noChangeAspect="1"/>
-          </p:cNvPicPr>
+              <a:t>Implementation Challenges</a:t>
+            </a:r>
+            <a:endParaRPr lang="en-US" dirty="0"/>
+          </a:p>
+        </p:txBody>
+      </p:sp>
+      <p:sp>
+        <p:nvSpPr>
+          <p:cNvPr id="3" name="Content Placeholder 2"/>
+          <p:cNvSpPr>
+            <a:spLocks noGrp="1"/>
+          </p:cNvSpPr>
           <p:nvPr>
             <p:ph idx="1"/>
           </p:nvPr>
-        </p:nvPicPr>
-        <p:blipFill>
-          <a:blip r:embed="rId2">
-            <a:extLst>
-              <a:ext uri="{28A0092B-C50C-407E-A947-70E740481C1C}">
-                <a14:useLocalDpi xmlns:a14="http://schemas.microsoft.com/office/drawing/2010/main" xmlns="" val="0"/>
-              </a:ext>
-            </a:extLst>
-          </a:blip>
-          <a:stretch>
-            <a:fillRect/>
-          </a:stretch>
-        </p:blipFill>
-        <p:spPr>
-          <a:xfrm>
-            <a:off x="1379150" y="1803162"/>
-            <a:ext cx="6798492" cy="4580545"/>
-          </a:xfrm>
-        </p:spPr>
-      </p:pic>
+        </p:nvSpPr>
+        <p:spPr/>
+        <p:txBody>
+          <a:bodyPr/>
+          <a:lstStyle/>
+          <a:p>
+            <a:r>
+              <a:rPr lang="en-US" dirty="0" smtClean="0"/>
+              <a:t>We had to write our own text wrapping function</a:t>
+            </a:r>
+          </a:p>
+          <a:p>
+            <a:r>
+              <a:rPr lang="en-US" dirty="0" smtClean="0"/>
+              <a:t>We had to make a custom </a:t>
+            </a:r>
+            <a:r>
+              <a:rPr lang="en-US" dirty="0" err="1" smtClean="0"/>
+              <a:t>JPanel</a:t>
+            </a:r>
+            <a:r>
+              <a:rPr lang="en-US" dirty="0" smtClean="0"/>
+              <a:t> class for images</a:t>
+            </a:r>
+          </a:p>
+          <a:p>
+            <a:r>
+              <a:rPr lang="en-US" dirty="0" smtClean="0"/>
+              <a:t>The subtle differences between classes such as </a:t>
+            </a:r>
+            <a:r>
+              <a:rPr lang="en-US" dirty="0" err="1" smtClean="0"/>
+              <a:t>JLabel</a:t>
+            </a:r>
+            <a:r>
+              <a:rPr lang="en-US" dirty="0" smtClean="0"/>
+              <a:t>, </a:t>
+            </a:r>
+            <a:r>
+              <a:rPr lang="en-US" dirty="0" err="1" smtClean="0"/>
+              <a:t>JTextPane</a:t>
+            </a:r>
+            <a:r>
+              <a:rPr lang="en-US" dirty="0" smtClean="0"/>
+              <a:t>, and </a:t>
+            </a:r>
+            <a:r>
+              <a:rPr lang="en-US" dirty="0" err="1" smtClean="0"/>
+              <a:t>JTextArea</a:t>
+            </a:r>
+            <a:r>
+              <a:rPr lang="en-US" dirty="0" smtClean="0"/>
+              <a:t>, as well as between different layout options, caused confusion</a:t>
+            </a:r>
+          </a:p>
+          <a:p>
+            <a:endParaRPr lang="en-US" dirty="0"/>
+          </a:p>
+        </p:txBody>
+      </p:sp>
     </p:spTree>
     <p:extLst>
       <p:ext uri="{BB962C8B-B14F-4D97-AF65-F5344CB8AC3E}">
-        <p14:creationId xmlns:p14="http://schemas.microsoft.com/office/powerpoint/2010/main" xmlns="" val="2077223260"/>
+        <p14:creationId xmlns:p14="http://schemas.microsoft.com/office/powerpoint/2010/main" val="919481294"/>
       </p:ext>
     </p:extLst>
   </p:cSld>
   <p:clrMapOvr>
     <a:masterClrMapping/>
   </p:clrMapOvr>
-  <p:timing>
-    <p:tnLst>
-      <p:par>
-        <p:cTn id="1" dur="indefinite" restart="never" nodeType="tmRoot"/>
-      </p:par>
-    </p:tnLst>
-  </p:timing>
 </p:sld>
 </file>
 
@@ -7926,8 +9592,293 @@
   <a:extraClrSchemeLst/>
   <a:extLst>
     <a:ext uri="{05A4C25C-085E-4340-85A3-A5531E510DB2}">
-      <thm15:themeFamily xmlns:thm15="http://schemas.microsoft.com/office/thememl/2012/main" xmlns="" name="Parallax" id="{3388167B-A2EB-4685-9635-1831D9AEF8C4}" vid="{93B4CCAC-FD5A-4D59-B1AC-EAF45910B5A9}"/>
+      <thm15:themeFamily xmlns="" xmlns:thm15="http://schemas.microsoft.com/office/thememl/2012/main" name="Parallax" id="{3388167B-A2EB-4685-9635-1831D9AEF8C4}" vid="{93B4CCAC-FD5A-4D59-B1AC-EAF45910B5A9}"/>
     </a:ext>
   </a:extLst>
 </a:theme>
+</file>
+
+<file path=ppt/theme/theme2.xml><?xml version="1.0" encoding="utf-8"?>
+<a:theme xmlns:a="http://schemas.openxmlformats.org/drawingml/2006/main" name="Office Theme">
+  <a:themeElements>
+    <a:clrScheme name="Office">
+      <a:dk1>
+        <a:sysClr val="windowText" lastClr="000000"/>
+      </a:dk1>
+      <a:lt1>
+        <a:sysClr val="window" lastClr="FFFFFF"/>
+      </a:lt1>
+      <a:dk2>
+        <a:srgbClr val="1F497D"/>
+      </a:dk2>
+      <a:lt2>
+        <a:srgbClr val="EEECE1"/>
+      </a:lt2>
+      <a:accent1>
+        <a:srgbClr val="4F81BD"/>
+      </a:accent1>
+      <a:accent2>
+        <a:srgbClr val="C0504D"/>
+      </a:accent2>
+      <a:accent3>
+        <a:srgbClr val="9BBB59"/>
+      </a:accent3>
+      <a:accent4>
+        <a:srgbClr val="8064A2"/>
+      </a:accent4>
+      <a:accent5>
+        <a:srgbClr val="4BACC6"/>
+      </a:accent5>
+      <a:accent6>
+        <a:srgbClr val="F79646"/>
+      </a:accent6>
+      <a:hlink>
+        <a:srgbClr val="0000FF"/>
+      </a:hlink>
+      <a:folHlink>
+        <a:srgbClr val="800080"/>
+      </a:folHlink>
+    </a:clrScheme>
+    <a:fontScheme name="Office">
+      <a:majorFont>
+        <a:latin typeface="Calibri"/>
+        <a:ea typeface=""/>
+        <a:cs typeface=""/>
+        <a:font script="Jpan" typeface="ＭＳ Ｐゴシック"/>
+        <a:font script="Hang" typeface="맑은 고딕"/>
+        <a:font script="Hans" typeface="宋体"/>
+        <a:font script="Hant" typeface="新細明體"/>
+        <a:font script="Arab" typeface="Times New Roman"/>
+        <a:font script="Hebr" typeface="Times New Roman"/>
+        <a:font script="Thai" typeface="Angsana New"/>
+        <a:font script="Ethi" typeface="Nyala"/>
+        <a:font script="Beng" typeface="Vrinda"/>
+        <a:font script="Gujr" typeface="Shruti"/>
+        <a:font script="Khmr" typeface="MoolBoran"/>
+        <a:font script="Knda" typeface="Tunga"/>
+        <a:font script="Guru" typeface="Raavi"/>
+        <a:font script="Cans" typeface="Euphemia"/>
+        <a:font script="Cher" typeface="Plantagenet Cherokee"/>
+        <a:font script="Yiii" typeface="Microsoft Yi Baiti"/>
+        <a:font script="Tibt" typeface="Microsoft Himalaya"/>
+        <a:font script="Thaa" typeface="MV Boli"/>
+        <a:font script="Deva" typeface="Mangal"/>
+        <a:font script="Telu" typeface="Gautami"/>
+        <a:font script="Taml" typeface="Latha"/>
+        <a:font script="Syrc" typeface="Estrangelo Edessa"/>
+        <a:font script="Orya" typeface="Kalinga"/>
+        <a:font script="Mlym" typeface="Kartika"/>
+        <a:font script="Laoo" typeface="DokChampa"/>
+        <a:font script="Sinh" typeface="Iskoola Pota"/>
+        <a:font script="Mong" typeface="Mongolian Baiti"/>
+        <a:font script="Viet" typeface="Times New Roman"/>
+        <a:font script="Uigh" typeface="Microsoft Uighur"/>
+        <a:font script="Geor" typeface="Sylfaen"/>
+      </a:majorFont>
+      <a:minorFont>
+        <a:latin typeface="Calibri"/>
+        <a:ea typeface=""/>
+        <a:cs typeface=""/>
+        <a:font script="Jpan" typeface="ＭＳ Ｐゴシック"/>
+        <a:font script="Hang" typeface="맑은 고딕"/>
+        <a:font script="Hans" typeface="宋体"/>
+        <a:font script="Hant" typeface="新細明體"/>
+        <a:font script="Arab" typeface="Arial"/>
+        <a:font script="Hebr" typeface="Arial"/>
+        <a:font script="Thai" typeface="Cordia New"/>
+        <a:font script="Ethi" typeface="Nyala"/>
+        <a:font script="Beng" typeface="Vrinda"/>
+        <a:font script="Gujr" typeface="Shruti"/>
+        <a:font script="Khmr" typeface="DaunPenh"/>
+        <a:font script="Knda" typeface="Tunga"/>
+        <a:font script="Guru" typeface="Raavi"/>
+        <a:font script="Cans" typeface="Euphemia"/>
+        <a:font script="Cher" typeface="Plantagenet Cherokee"/>
+        <a:font script="Yiii" typeface="Microsoft Yi Baiti"/>
+        <a:font script="Tibt" typeface="Microsoft Himalaya"/>
+        <a:font script="Thaa" typeface="MV Boli"/>
+        <a:font script="Deva" typeface="Mangal"/>
+        <a:font script="Telu" typeface="Gautami"/>
+        <a:font script="Taml" typeface="Latha"/>
+        <a:font script="Syrc" typeface="Estrangelo Edessa"/>
+        <a:font script="Orya" typeface="Kalinga"/>
+        <a:font script="Mlym" typeface="Kartika"/>
+        <a:font script="Laoo" typeface="DokChampa"/>
+        <a:font script="Sinh" typeface="Iskoola Pota"/>
+        <a:font script="Mong" typeface="Mongolian Baiti"/>
+        <a:font script="Viet" typeface="Arial"/>
+        <a:font script="Uigh" typeface="Microsoft Uighur"/>
+        <a:font script="Geor" typeface="Sylfaen"/>
+      </a:minorFont>
+    </a:fontScheme>
+    <a:fmtScheme name="Office">
+      <a:fillStyleLst>
+        <a:solidFill>
+          <a:schemeClr val="phClr"/>
+        </a:solidFill>
+        <a:gradFill rotWithShape="1">
+          <a:gsLst>
+            <a:gs pos="0">
+              <a:schemeClr val="phClr">
+                <a:tint val="50000"/>
+                <a:satMod val="300000"/>
+              </a:schemeClr>
+            </a:gs>
+            <a:gs pos="35000">
+              <a:schemeClr val="phClr">
+                <a:tint val="37000"/>
+                <a:satMod val="300000"/>
+              </a:schemeClr>
+            </a:gs>
+            <a:gs pos="100000">
+              <a:schemeClr val="phClr">
+                <a:tint val="15000"/>
+                <a:satMod val="350000"/>
+              </a:schemeClr>
+            </a:gs>
+          </a:gsLst>
+          <a:lin ang="16200000" scaled="1"/>
+        </a:gradFill>
+        <a:gradFill rotWithShape="1">
+          <a:gsLst>
+            <a:gs pos="0">
+              <a:schemeClr val="phClr">
+                <a:shade val="51000"/>
+                <a:satMod val="130000"/>
+              </a:schemeClr>
+            </a:gs>
+            <a:gs pos="80000">
+              <a:schemeClr val="phClr">
+                <a:shade val="93000"/>
+                <a:satMod val="130000"/>
+              </a:schemeClr>
+            </a:gs>
+            <a:gs pos="100000">
+              <a:schemeClr val="phClr">
+                <a:shade val="94000"/>
+                <a:satMod val="135000"/>
+              </a:schemeClr>
+            </a:gs>
+          </a:gsLst>
+          <a:lin ang="16200000" scaled="0"/>
+        </a:gradFill>
+      </a:fillStyleLst>
+      <a:lnStyleLst>
+        <a:ln w="9525" cap="flat" cmpd="sng" algn="ctr">
+          <a:solidFill>
+            <a:schemeClr val="phClr">
+              <a:shade val="95000"/>
+              <a:satMod val="105000"/>
+            </a:schemeClr>
+          </a:solidFill>
+          <a:prstDash val="solid"/>
+        </a:ln>
+        <a:ln w="25400" cap="flat" cmpd="sng" algn="ctr">
+          <a:solidFill>
+            <a:schemeClr val="phClr"/>
+          </a:solidFill>
+          <a:prstDash val="solid"/>
+        </a:ln>
+        <a:ln w="38100" cap="flat" cmpd="sng" algn="ctr">
+          <a:solidFill>
+            <a:schemeClr val="phClr"/>
+          </a:solidFill>
+          <a:prstDash val="solid"/>
+        </a:ln>
+      </a:lnStyleLst>
+      <a:effectStyleLst>
+        <a:effectStyle>
+          <a:effectLst>
+            <a:outerShdw blurRad="40000" dist="20000" dir="5400000" rotWithShape="0">
+              <a:srgbClr val="000000">
+                <a:alpha val="38000"/>
+              </a:srgbClr>
+            </a:outerShdw>
+          </a:effectLst>
+        </a:effectStyle>
+        <a:effectStyle>
+          <a:effectLst>
+            <a:outerShdw blurRad="40000" dist="23000" dir="5400000" rotWithShape="0">
+              <a:srgbClr val="000000">
+                <a:alpha val="35000"/>
+              </a:srgbClr>
+            </a:outerShdw>
+          </a:effectLst>
+        </a:effectStyle>
+        <a:effectStyle>
+          <a:effectLst>
+            <a:outerShdw blurRad="40000" dist="23000" dir="5400000" rotWithShape="0">
+              <a:srgbClr val="000000">
+                <a:alpha val="35000"/>
+              </a:srgbClr>
+            </a:outerShdw>
+          </a:effectLst>
+          <a:scene3d>
+            <a:camera prst="orthographicFront">
+              <a:rot lat="0" lon="0" rev="0"/>
+            </a:camera>
+            <a:lightRig rig="threePt" dir="t">
+              <a:rot lat="0" lon="0" rev="1200000"/>
+            </a:lightRig>
+          </a:scene3d>
+          <a:sp3d>
+            <a:bevelT w="63500" h="25400"/>
+          </a:sp3d>
+        </a:effectStyle>
+      </a:effectStyleLst>
+      <a:bgFillStyleLst>
+        <a:solidFill>
+          <a:schemeClr val="phClr"/>
+        </a:solidFill>
+        <a:gradFill rotWithShape="1">
+          <a:gsLst>
+            <a:gs pos="0">
+              <a:schemeClr val="phClr">
+                <a:tint val="40000"/>
+                <a:satMod val="350000"/>
+              </a:schemeClr>
+            </a:gs>
+            <a:gs pos="40000">
+              <a:schemeClr val="phClr">
+                <a:tint val="45000"/>
+                <a:shade val="99000"/>
+                <a:satMod val="350000"/>
+              </a:schemeClr>
+            </a:gs>
+            <a:gs pos="100000">
+              <a:schemeClr val="phClr">
+                <a:shade val="20000"/>
+                <a:satMod val="255000"/>
+              </a:schemeClr>
+            </a:gs>
+          </a:gsLst>
+          <a:path path="circle">
+            <a:fillToRect l="50000" t="-80000" r="50000" b="180000"/>
+          </a:path>
+        </a:gradFill>
+        <a:gradFill rotWithShape="1">
+          <a:gsLst>
+            <a:gs pos="0">
+              <a:schemeClr val="phClr">
+                <a:tint val="80000"/>
+                <a:satMod val="300000"/>
+              </a:schemeClr>
+            </a:gs>
+            <a:gs pos="100000">
+              <a:schemeClr val="phClr">
+                <a:shade val="30000"/>
+                <a:satMod val="200000"/>
+              </a:schemeClr>
+            </a:gs>
+          </a:gsLst>
+          <a:path path="circle">
+            <a:fillToRect l="50000" t="50000" r="50000" b="50000"/>
+          </a:path>
+        </a:gradFill>
+      </a:bgFillStyleLst>
+    </a:fmtScheme>
+  </a:themeElements>
+  <a:objectDefaults/>
+  <a:extraClrSchemeLst/>
+</a:theme>
 </file>
</xml_diff>